<commit_message>
Complete the registration info construction description
Signed-off-by: Ralph Castain <rhc@open-mpi.org>
</commit_message>
<xml_diff>
--- a/figs/drawings.pptx
+++ b/figs/drawings.pptx
@@ -6,6 +6,9 @@
   </p:sldMasterIdLst>
   <p:sldIdLst>
     <p:sldId id="256" r:id="rId2"/>
+    <p:sldId id="259" r:id="rId3"/>
+    <p:sldId id="258" r:id="rId4"/>
+    <p:sldId id="257" r:id="rId5"/>
   </p:sldIdLst>
   <p:sldSz cx="12192000" cy="6858000"/>
   <p:notesSz cx="6858000" cy="9144000"/>
@@ -3370,7 +3373,7 @@
         </p:nvSpPr>
         <p:spPr>
           <a:xfrm>
-            <a:off x="2509090" y="1558200"/>
+            <a:off x="2017600" y="1558200"/>
             <a:ext cx="881973" cy="646331"/>
           </a:xfrm>
           <a:prstGeom prst="rect">
@@ -3413,7 +3416,7 @@
         </p:nvSpPr>
         <p:spPr>
           <a:xfrm>
-            <a:off x="2572409" y="2432695"/>
+            <a:off x="2080919" y="2432695"/>
             <a:ext cx="755335" cy="646331"/>
           </a:xfrm>
           <a:prstGeom prst="rect">
@@ -3456,7 +3459,7 @@
         </p:nvSpPr>
         <p:spPr>
           <a:xfrm>
-            <a:off x="1379685" y="712519"/>
+            <a:off x="1151085" y="712519"/>
             <a:ext cx="611065" cy="646331"/>
           </a:xfrm>
           <a:prstGeom prst="rect">
@@ -3499,7 +3502,7 @@
         </p:nvSpPr>
         <p:spPr>
           <a:xfrm>
-            <a:off x="2509090" y="712519"/>
+            <a:off x="2017600" y="712519"/>
             <a:ext cx="881973" cy="646331"/>
           </a:xfrm>
           <a:prstGeom prst="rect">
@@ -3546,7 +3549,7 @@
         <p:spPr>
           <a:xfrm>
             <a:off x="913669" y="1035684"/>
-            <a:ext cx="466016" cy="1"/>
+            <a:ext cx="237416" cy="1"/>
           </a:xfrm>
           <a:prstGeom prst="line">
             <a:avLst/>
@@ -3584,8 +3587,8 @@
         </p:nvCxnSpPr>
         <p:spPr>
           <a:xfrm>
-            <a:off x="1990750" y="1035685"/>
-            <a:ext cx="518340" cy="0"/>
+            <a:off x="1762150" y="1035685"/>
+            <a:ext cx="255450" cy="0"/>
           </a:xfrm>
           <a:prstGeom prst="line">
             <a:avLst/>
@@ -3624,7 +3627,7 @@
         </p:nvCxnSpPr>
         <p:spPr>
           <a:xfrm>
-            <a:off x="2950077" y="1358850"/>
+            <a:off x="2458587" y="1358850"/>
             <a:ext cx="0" cy="199350"/>
           </a:xfrm>
           <a:prstGeom prst="line">
@@ -3664,7 +3667,7 @@
         </p:nvCxnSpPr>
         <p:spPr>
           <a:xfrm>
-            <a:off x="2950077" y="2204531"/>
+            <a:off x="2458587" y="2204531"/>
             <a:ext cx="0" cy="228164"/>
           </a:xfrm>
           <a:prstGeom prst="line">
@@ -3700,7 +3703,7 @@
         </p:nvSpPr>
         <p:spPr>
           <a:xfrm>
-            <a:off x="3899279" y="712519"/>
+            <a:off x="3167759" y="712519"/>
             <a:ext cx="545534" cy="646331"/>
           </a:xfrm>
           <a:prstGeom prst="rect">
@@ -3743,7 +3746,7 @@
         </p:nvSpPr>
         <p:spPr>
           <a:xfrm>
-            <a:off x="3921016" y="1558199"/>
+            <a:off x="3189496" y="1558199"/>
             <a:ext cx="502061" cy="646331"/>
           </a:xfrm>
           <a:prstGeom prst="rect">
@@ -3786,7 +3789,7 @@
         </p:nvSpPr>
         <p:spPr>
           <a:xfrm>
-            <a:off x="3825637" y="2403879"/>
+            <a:off x="3094117" y="2403879"/>
             <a:ext cx="692818" cy="646331"/>
           </a:xfrm>
           <a:prstGeom prst="rect">
@@ -3829,7 +3832,7 @@
         </p:nvSpPr>
         <p:spPr>
           <a:xfrm>
-            <a:off x="3872381" y="3249559"/>
+            <a:off x="3140861" y="3249559"/>
             <a:ext cx="599331" cy="646331"/>
           </a:xfrm>
           <a:prstGeom prst="rect">
@@ -3872,7 +3875,7 @@
         </p:nvSpPr>
         <p:spPr>
           <a:xfrm>
-            <a:off x="3907583" y="4095239"/>
+            <a:off x="3176063" y="4095239"/>
             <a:ext cx="528927" cy="646331"/>
           </a:xfrm>
           <a:prstGeom prst="rect">
@@ -3918,8 +3921,8 @@
         </p:nvCxnSpPr>
         <p:spPr>
           <a:xfrm>
-            <a:off x="3391063" y="1035685"/>
-            <a:ext cx="508216" cy="0"/>
+            <a:off x="2899573" y="1035685"/>
+            <a:ext cx="268186" cy="0"/>
           </a:xfrm>
           <a:prstGeom prst="line">
             <a:avLst/>
@@ -3954,7 +3957,7 @@
         </p:nvCxnSpPr>
         <p:spPr>
           <a:xfrm>
-            <a:off x="4172046" y="1358850"/>
+            <a:off x="3440526" y="1358850"/>
             <a:ext cx="1" cy="199349"/>
           </a:xfrm>
           <a:prstGeom prst="line">
@@ -3990,7 +3993,7 @@
         </p:nvCxnSpPr>
         <p:spPr>
           <a:xfrm flipH="1">
-            <a:off x="4172046" y="2204530"/>
+            <a:off x="3440526" y="2204530"/>
             <a:ext cx="1" cy="199349"/>
           </a:xfrm>
           <a:prstGeom prst="line">
@@ -4026,7 +4029,7 @@
         </p:nvCxnSpPr>
         <p:spPr>
           <a:xfrm>
-            <a:off x="4172046" y="3050210"/>
+            <a:off x="3440526" y="3050210"/>
             <a:ext cx="1" cy="199349"/>
           </a:xfrm>
           <a:prstGeom prst="line">
@@ -4062,7 +4065,7 @@
         </p:nvCxnSpPr>
         <p:spPr>
           <a:xfrm>
-            <a:off x="4172046" y="3895890"/>
+            <a:off x="3440526" y="3895890"/>
             <a:ext cx="0" cy="199349"/>
           </a:xfrm>
           <a:prstGeom prst="line">
@@ -4098,7 +4101,7 @@
         </p:nvSpPr>
         <p:spPr>
           <a:xfrm>
-            <a:off x="3826150" y="4940919"/>
+            <a:off x="3094630" y="4940919"/>
             <a:ext cx="692305" cy="646331"/>
           </a:xfrm>
           <a:prstGeom prst="rect">
@@ -4144,7 +4147,7 @@
         </p:nvCxnSpPr>
         <p:spPr>
           <a:xfrm>
-            <a:off x="4172047" y="4741570"/>
+            <a:off x="3440527" y="4741570"/>
             <a:ext cx="256" cy="199349"/>
           </a:xfrm>
           <a:prstGeom prst="line">
@@ -4180,7 +4183,7 @@
         </p:nvSpPr>
         <p:spPr>
           <a:xfrm>
-            <a:off x="4888105" y="712518"/>
+            <a:off x="3939415" y="712518"/>
             <a:ext cx="561372" cy="646331"/>
           </a:xfrm>
           <a:prstGeom prst="rect">
@@ -4223,7 +4226,7 @@
         </p:nvSpPr>
         <p:spPr>
           <a:xfrm>
-            <a:off x="4862458" y="1558198"/>
+            <a:off x="3913768" y="1558198"/>
             <a:ext cx="612668" cy="646331"/>
           </a:xfrm>
           <a:prstGeom prst="rect">
@@ -4266,7 +4269,7 @@
         </p:nvSpPr>
         <p:spPr>
           <a:xfrm>
-            <a:off x="4888105" y="2403878"/>
+            <a:off x="3939415" y="2403878"/>
             <a:ext cx="561371" cy="646331"/>
           </a:xfrm>
           <a:prstGeom prst="rect">
@@ -4309,7 +4312,7 @@
         </p:nvSpPr>
         <p:spPr>
           <a:xfrm>
-            <a:off x="4888104" y="3249558"/>
+            <a:off x="3939414" y="3249558"/>
             <a:ext cx="561371" cy="646331"/>
           </a:xfrm>
           <a:prstGeom prst="rect">
@@ -4352,7 +4355,7 @@
         </p:nvCxnSpPr>
         <p:spPr>
           <a:xfrm>
-            <a:off x="5168791" y="1358849"/>
+            <a:off x="4220101" y="1358849"/>
             <a:ext cx="1" cy="199349"/>
           </a:xfrm>
           <a:prstGeom prst="line">
@@ -4388,7 +4391,7 @@
         </p:nvCxnSpPr>
         <p:spPr>
           <a:xfrm flipH="1">
-            <a:off x="5168791" y="2204529"/>
+            <a:off x="4220101" y="2204529"/>
             <a:ext cx="1" cy="199349"/>
           </a:xfrm>
           <a:prstGeom prst="line">
@@ -4424,7 +4427,7 @@
         </p:nvCxnSpPr>
         <p:spPr>
           <a:xfrm>
-            <a:off x="5168791" y="3050209"/>
+            <a:off x="4220101" y="3050209"/>
             <a:ext cx="1" cy="199349"/>
           </a:xfrm>
           <a:prstGeom prst="line">
@@ -4460,7 +4463,7 @@
         </p:nvSpPr>
         <p:spPr>
           <a:xfrm>
-            <a:off x="5833539" y="712518"/>
+            <a:off x="4652813" y="712518"/>
             <a:ext cx="561372" cy="646331"/>
           </a:xfrm>
           <a:prstGeom prst="rect">
@@ -4503,7 +4506,7 @@
         </p:nvSpPr>
         <p:spPr>
           <a:xfrm>
-            <a:off x="5807892" y="1558198"/>
+            <a:off x="5445058" y="4940916"/>
             <a:ext cx="612668" cy="646331"/>
           </a:xfrm>
           <a:prstGeom prst="rect">
@@ -4546,7 +4549,7 @@
         </p:nvSpPr>
         <p:spPr>
           <a:xfrm>
-            <a:off x="5833539" y="2403878"/>
+            <a:off x="4652814" y="2403878"/>
             <a:ext cx="561371" cy="646331"/>
           </a:xfrm>
           <a:prstGeom prst="rect">
@@ -4589,7 +4592,7 @@
         </p:nvSpPr>
         <p:spPr>
           <a:xfrm>
-            <a:off x="5833538" y="3249558"/>
+            <a:off x="4652814" y="3249558"/>
             <a:ext cx="561371" cy="646331"/>
           </a:xfrm>
           <a:prstGeom prst="rect">
@@ -4632,7 +4635,7 @@
         </p:nvCxnSpPr>
         <p:spPr>
           <a:xfrm>
-            <a:off x="6035119" y="1358849"/>
+            <a:off x="4933499" y="1358849"/>
             <a:ext cx="1" cy="199349"/>
           </a:xfrm>
           <a:prstGeom prst="line">
@@ -4668,7 +4671,7 @@
         </p:nvCxnSpPr>
         <p:spPr>
           <a:xfrm flipH="1">
-            <a:off x="6035119" y="2204529"/>
+            <a:off x="4933499" y="2204529"/>
             <a:ext cx="1" cy="199349"/>
           </a:xfrm>
           <a:prstGeom prst="line">
@@ -4704,7 +4707,7 @@
         </p:nvCxnSpPr>
         <p:spPr>
           <a:xfrm>
-            <a:off x="6035119" y="3050209"/>
+            <a:off x="4933499" y="3050209"/>
             <a:ext cx="1" cy="199349"/>
           </a:xfrm>
           <a:prstGeom prst="line">
@@ -4736,6 +4739,7 @@
             </a:extLst>
           </p:cNvPr>
           <p:cNvCxnSpPr>
+            <a:cxnSpLocks/>
             <a:stCxn id="19" idx="3"/>
             <a:endCxn id="38" idx="1"/>
           </p:cNvCxnSpPr>
@@ -4743,8 +4747,8 @@
         </p:nvCxnSpPr>
         <p:spPr>
           <a:xfrm flipV="1">
-            <a:off x="4444813" y="1035684"/>
-            <a:ext cx="443292" cy="1"/>
+            <a:off x="3713293" y="1035684"/>
+            <a:ext cx="226122" cy="1"/>
           </a:xfrm>
           <a:prstGeom prst="line">
             <a:avLst/>
@@ -4775,15 +4779,1366 @@
             </a:extLst>
           </p:cNvPr>
           <p:cNvCxnSpPr>
-            <a:stCxn id="38" idx="3"/>
-            <a:endCxn id="49" idx="1"/>
+            <a:cxnSpLocks/>
           </p:cNvCxnSpPr>
           <p:nvPr/>
         </p:nvCxnSpPr>
         <p:spPr>
           <a:xfrm>
-            <a:off x="5449477" y="1035684"/>
-            <a:ext cx="384062" cy="0"/>
+            <a:off x="4463553" y="1035684"/>
+            <a:ext cx="254093" cy="0"/>
+          </a:xfrm>
+          <a:prstGeom prst="line">
+            <a:avLst/>
+          </a:prstGeom>
+        </p:spPr>
+        <p:style>
+          <a:lnRef idx="1">
+            <a:schemeClr val="accent1"/>
+          </a:lnRef>
+          <a:fillRef idx="0">
+            <a:schemeClr val="accent1"/>
+          </a:fillRef>
+          <a:effectRef idx="0">
+            <a:schemeClr val="accent1"/>
+          </a:effectRef>
+          <a:fontRef idx="minor">
+            <a:schemeClr val="tx1"/>
+          </a:fontRef>
+        </p:style>
+      </p:cxnSp>
+      <p:sp>
+        <p:nvSpPr>
+          <p:cNvPr id="60" name="TextBox 59">
+            <a:extLst>
+              <a:ext uri="{FF2B5EF4-FFF2-40B4-BE49-F238E27FC236}">
+                <a16:creationId xmlns:a16="http://schemas.microsoft.com/office/drawing/2014/main" id="{62A19214-DDB9-D44B-8EA3-4249B46AC799}"/>
+              </a:ext>
+            </a:extLst>
+          </p:cNvPr>
+          <p:cNvSpPr txBox="1"/>
+          <p:nvPr/>
+        </p:nvSpPr>
+        <p:spPr>
+          <a:xfrm>
+            <a:off x="5451727" y="712518"/>
+            <a:ext cx="599331" cy="646331"/>
+          </a:xfrm>
+          <a:prstGeom prst="rect">
+            <a:avLst/>
+          </a:prstGeom>
+          <a:noFill/>
+        </p:spPr>
+        <p:txBody>
+          <a:bodyPr wrap="none" rtlCol="0">
+            <a:spAutoFit/>
+          </a:bodyPr>
+          <a:lstStyle/>
+          <a:p>
+            <a:pPr algn="ctr"/>
+            <a:r>
+              <a:rPr lang="en-US" dirty="0"/>
+              <a:t>Proc</a:t>
+            </a:r>
+          </a:p>
+          <a:p>
+            <a:pPr algn="ctr"/>
+            <a:r>
+              <a:rPr lang="en-US" dirty="0"/>
+              <a:t>data</a:t>
+            </a:r>
+          </a:p>
+        </p:txBody>
+      </p:sp>
+      <p:sp>
+        <p:nvSpPr>
+          <p:cNvPr id="61" name="TextBox 60">
+            <a:extLst>
+              <a:ext uri="{FF2B5EF4-FFF2-40B4-BE49-F238E27FC236}">
+                <a16:creationId xmlns:a16="http://schemas.microsoft.com/office/drawing/2014/main" id="{FFDD76B8-A872-B544-A1DF-BEAB9A738EB1}"/>
+              </a:ext>
+            </a:extLst>
+          </p:cNvPr>
+          <p:cNvSpPr txBox="1"/>
+          <p:nvPr/>
+        </p:nvSpPr>
+        <p:spPr>
+          <a:xfrm>
+            <a:off x="5428226" y="1696697"/>
+            <a:ext cx="646332" cy="369332"/>
+          </a:xfrm>
+          <a:prstGeom prst="rect">
+            <a:avLst/>
+          </a:prstGeom>
+          <a:noFill/>
+        </p:spPr>
+        <p:txBody>
+          <a:bodyPr wrap="none" rtlCol="0">
+            <a:spAutoFit/>
+          </a:bodyPr>
+          <a:lstStyle/>
+          <a:p>
+            <a:pPr algn="ctr"/>
+            <a:r>
+              <a:rPr lang="en-US" dirty="0"/>
+              <a:t>Rank</a:t>
+            </a:r>
+          </a:p>
+        </p:txBody>
+      </p:sp>
+      <p:sp>
+        <p:nvSpPr>
+          <p:cNvPr id="62" name="TextBox 61">
+            <a:extLst>
+              <a:ext uri="{FF2B5EF4-FFF2-40B4-BE49-F238E27FC236}">
+                <a16:creationId xmlns:a16="http://schemas.microsoft.com/office/drawing/2014/main" id="{A48B029F-CDC6-5C4F-A940-90C104B226ED}"/>
+              </a:ext>
+            </a:extLst>
+          </p:cNvPr>
+          <p:cNvSpPr txBox="1"/>
+          <p:nvPr/>
+        </p:nvSpPr>
+        <p:spPr>
+          <a:xfrm>
+            <a:off x="5419571" y="2403878"/>
+            <a:ext cx="663643" cy="646331"/>
+          </a:xfrm>
+          <a:prstGeom prst="rect">
+            <a:avLst/>
+          </a:prstGeom>
+          <a:noFill/>
+        </p:spPr>
+        <p:txBody>
+          <a:bodyPr wrap="none" rtlCol="0">
+            <a:spAutoFit/>
+          </a:bodyPr>
+          <a:lstStyle/>
+          <a:p>
+            <a:r>
+              <a:rPr lang="en-US" dirty="0"/>
+              <a:t>Local</a:t>
+            </a:r>
+          </a:p>
+          <a:p>
+            <a:pPr algn="ctr"/>
+            <a:r>
+              <a:rPr lang="en-US" dirty="0"/>
+              <a:t>rank</a:t>
+            </a:r>
+          </a:p>
+        </p:txBody>
+      </p:sp>
+      <p:sp>
+        <p:nvSpPr>
+          <p:cNvPr id="63" name="TextBox 62">
+            <a:extLst>
+              <a:ext uri="{FF2B5EF4-FFF2-40B4-BE49-F238E27FC236}">
+                <a16:creationId xmlns:a16="http://schemas.microsoft.com/office/drawing/2014/main" id="{79FD4E88-2A50-DF47-A743-AFAA1A91BBFF}"/>
+              </a:ext>
+            </a:extLst>
+          </p:cNvPr>
+          <p:cNvSpPr txBox="1"/>
+          <p:nvPr/>
+        </p:nvSpPr>
+        <p:spPr>
+          <a:xfrm>
+            <a:off x="5404983" y="3249558"/>
+            <a:ext cx="692818" cy="646331"/>
+          </a:xfrm>
+          <a:prstGeom prst="rect">
+            <a:avLst/>
+          </a:prstGeom>
+          <a:noFill/>
+        </p:spPr>
+        <p:txBody>
+          <a:bodyPr wrap="none" rtlCol="0">
+            <a:spAutoFit/>
+          </a:bodyPr>
+          <a:lstStyle/>
+          <a:p>
+            <a:pPr algn="ctr"/>
+            <a:r>
+              <a:rPr lang="en-US" dirty="0"/>
+              <a:t>Node</a:t>
+            </a:r>
+          </a:p>
+          <a:p>
+            <a:pPr algn="ctr"/>
+            <a:r>
+              <a:rPr lang="en-US" dirty="0"/>
+              <a:t>rank</a:t>
+            </a:r>
+          </a:p>
+        </p:txBody>
+      </p:sp>
+      <p:cxnSp>
+        <p:nvCxnSpPr>
+          <p:cNvPr id="64" name="Straight Connector 63">
+            <a:extLst>
+              <a:ext uri="{FF2B5EF4-FFF2-40B4-BE49-F238E27FC236}">
+                <a16:creationId xmlns:a16="http://schemas.microsoft.com/office/drawing/2014/main" id="{74E8F246-1F8A-904B-80E7-158023549607}"/>
+              </a:ext>
+            </a:extLst>
+          </p:cNvPr>
+          <p:cNvCxnSpPr/>
+          <p:nvPr/>
+        </p:nvCxnSpPr>
+        <p:spPr>
+          <a:xfrm>
+            <a:off x="5751392" y="1358849"/>
+            <a:ext cx="1" cy="199349"/>
+          </a:xfrm>
+          <a:prstGeom prst="line">
+            <a:avLst/>
+          </a:prstGeom>
+        </p:spPr>
+        <p:style>
+          <a:lnRef idx="1">
+            <a:schemeClr val="accent1"/>
+          </a:lnRef>
+          <a:fillRef idx="0">
+            <a:schemeClr val="accent1"/>
+          </a:fillRef>
+          <a:effectRef idx="0">
+            <a:schemeClr val="accent1"/>
+          </a:effectRef>
+          <a:fontRef idx="minor">
+            <a:schemeClr val="tx1"/>
+          </a:fontRef>
+        </p:style>
+      </p:cxnSp>
+      <p:cxnSp>
+        <p:nvCxnSpPr>
+          <p:cNvPr id="65" name="Straight Connector 64">
+            <a:extLst>
+              <a:ext uri="{FF2B5EF4-FFF2-40B4-BE49-F238E27FC236}">
+                <a16:creationId xmlns:a16="http://schemas.microsoft.com/office/drawing/2014/main" id="{377F01F5-6EC2-B546-A3B3-1DDBE770A1B5}"/>
+              </a:ext>
+            </a:extLst>
+          </p:cNvPr>
+          <p:cNvCxnSpPr/>
+          <p:nvPr/>
+        </p:nvCxnSpPr>
+        <p:spPr>
+          <a:xfrm flipH="1">
+            <a:off x="5751392" y="2204529"/>
+            <a:ext cx="1" cy="199349"/>
+          </a:xfrm>
+          <a:prstGeom prst="line">
+            <a:avLst/>
+          </a:prstGeom>
+        </p:spPr>
+        <p:style>
+          <a:lnRef idx="1">
+            <a:schemeClr val="accent1"/>
+          </a:lnRef>
+          <a:fillRef idx="0">
+            <a:schemeClr val="accent1"/>
+          </a:fillRef>
+          <a:effectRef idx="0">
+            <a:schemeClr val="accent1"/>
+          </a:effectRef>
+          <a:fontRef idx="minor">
+            <a:schemeClr val="tx1"/>
+          </a:fontRef>
+        </p:style>
+      </p:cxnSp>
+      <p:cxnSp>
+        <p:nvCxnSpPr>
+          <p:cNvPr id="66" name="Straight Connector 65">
+            <a:extLst>
+              <a:ext uri="{FF2B5EF4-FFF2-40B4-BE49-F238E27FC236}">
+                <a16:creationId xmlns:a16="http://schemas.microsoft.com/office/drawing/2014/main" id="{D3CB4E89-F368-A04C-9623-6A6BC4991DEE}"/>
+              </a:ext>
+            </a:extLst>
+          </p:cNvPr>
+          <p:cNvCxnSpPr/>
+          <p:nvPr/>
+        </p:nvCxnSpPr>
+        <p:spPr>
+          <a:xfrm>
+            <a:off x="5751392" y="3050209"/>
+            <a:ext cx="1" cy="199349"/>
+          </a:xfrm>
+          <a:prstGeom prst="line">
+            <a:avLst/>
+          </a:prstGeom>
+        </p:spPr>
+        <p:style>
+          <a:lnRef idx="1">
+            <a:schemeClr val="accent1"/>
+          </a:lnRef>
+          <a:fillRef idx="0">
+            <a:schemeClr val="accent1"/>
+          </a:fillRef>
+          <a:effectRef idx="0">
+            <a:schemeClr val="accent1"/>
+          </a:effectRef>
+          <a:fontRef idx="minor">
+            <a:schemeClr val="tx1"/>
+          </a:fontRef>
+        </p:style>
+      </p:cxnSp>
+      <p:sp>
+        <p:nvSpPr>
+          <p:cNvPr id="67" name="TextBox 66">
+            <a:extLst>
+              <a:ext uri="{FF2B5EF4-FFF2-40B4-BE49-F238E27FC236}">
+                <a16:creationId xmlns:a16="http://schemas.microsoft.com/office/drawing/2014/main" id="{4A9B3D7D-28A7-F84C-A301-F36EC557B2EC}"/>
+              </a:ext>
+            </a:extLst>
+          </p:cNvPr>
+          <p:cNvSpPr txBox="1"/>
+          <p:nvPr/>
+        </p:nvSpPr>
+        <p:spPr>
+          <a:xfrm>
+            <a:off x="5404983" y="4095238"/>
+            <a:ext cx="692818" cy="646331"/>
+          </a:xfrm>
+          <a:prstGeom prst="rect">
+            <a:avLst/>
+          </a:prstGeom>
+          <a:noFill/>
+        </p:spPr>
+        <p:txBody>
+          <a:bodyPr wrap="none" rtlCol="0">
+            <a:spAutoFit/>
+          </a:bodyPr>
+          <a:lstStyle/>
+          <a:p>
+            <a:pPr algn="ctr"/>
+            <a:r>
+              <a:rPr lang="en-US" dirty="0"/>
+              <a:t>Node</a:t>
+            </a:r>
+          </a:p>
+          <a:p>
+            <a:pPr algn="ctr"/>
+            <a:r>
+              <a:rPr lang="en-US" dirty="0"/>
+              <a:t>ID</a:t>
+            </a:r>
+          </a:p>
+        </p:txBody>
+      </p:sp>
+      <p:cxnSp>
+        <p:nvCxnSpPr>
+          <p:cNvPr id="69" name="Straight Connector 68">
+            <a:extLst>
+              <a:ext uri="{FF2B5EF4-FFF2-40B4-BE49-F238E27FC236}">
+                <a16:creationId xmlns:a16="http://schemas.microsoft.com/office/drawing/2014/main" id="{1ED66996-2B56-A842-BD26-C327605089B4}"/>
+              </a:ext>
+            </a:extLst>
+          </p:cNvPr>
+          <p:cNvCxnSpPr/>
+          <p:nvPr/>
+        </p:nvCxnSpPr>
+        <p:spPr>
+          <a:xfrm>
+            <a:off x="5751392" y="3895889"/>
+            <a:ext cx="0" cy="199349"/>
+          </a:xfrm>
+          <a:prstGeom prst="line">
+            <a:avLst/>
+          </a:prstGeom>
+        </p:spPr>
+        <p:style>
+          <a:lnRef idx="1">
+            <a:schemeClr val="accent1"/>
+          </a:lnRef>
+          <a:fillRef idx="0">
+            <a:schemeClr val="accent1"/>
+          </a:fillRef>
+          <a:effectRef idx="0">
+            <a:schemeClr val="accent1"/>
+          </a:effectRef>
+          <a:fontRef idx="minor">
+            <a:schemeClr val="tx1"/>
+          </a:fontRef>
+        </p:style>
+      </p:cxnSp>
+      <p:sp>
+        <p:nvSpPr>
+          <p:cNvPr id="75" name="TextBox 74">
+            <a:extLst>
+              <a:ext uri="{FF2B5EF4-FFF2-40B4-BE49-F238E27FC236}">
+                <a16:creationId xmlns:a16="http://schemas.microsoft.com/office/drawing/2014/main" id="{4A342577-CFD8-454C-AE7A-D909C51FEE91}"/>
+              </a:ext>
+            </a:extLst>
+          </p:cNvPr>
+          <p:cNvSpPr txBox="1"/>
+          <p:nvPr/>
+        </p:nvSpPr>
+        <p:spPr>
+          <a:xfrm>
+            <a:off x="6296594" y="712518"/>
+            <a:ext cx="599331" cy="646331"/>
+          </a:xfrm>
+          <a:prstGeom prst="rect">
+            <a:avLst/>
+          </a:prstGeom>
+          <a:noFill/>
+        </p:spPr>
+        <p:txBody>
+          <a:bodyPr wrap="none" rtlCol="0">
+            <a:spAutoFit/>
+          </a:bodyPr>
+          <a:lstStyle/>
+          <a:p>
+            <a:pPr algn="ctr"/>
+            <a:r>
+              <a:rPr lang="en-US" dirty="0"/>
+              <a:t>Proc</a:t>
+            </a:r>
+          </a:p>
+          <a:p>
+            <a:pPr algn="ctr"/>
+            <a:r>
+              <a:rPr lang="en-US" dirty="0"/>
+              <a:t>data</a:t>
+            </a:r>
+          </a:p>
+        </p:txBody>
+      </p:sp>
+      <p:sp>
+        <p:nvSpPr>
+          <p:cNvPr id="76" name="TextBox 75">
+            <a:extLst>
+              <a:ext uri="{FF2B5EF4-FFF2-40B4-BE49-F238E27FC236}">
+                <a16:creationId xmlns:a16="http://schemas.microsoft.com/office/drawing/2014/main" id="{B634D407-5EA6-2E47-9CAC-AB1365D9AF29}"/>
+              </a:ext>
+            </a:extLst>
+          </p:cNvPr>
+          <p:cNvSpPr txBox="1"/>
+          <p:nvPr/>
+        </p:nvSpPr>
+        <p:spPr>
+          <a:xfrm>
+            <a:off x="6273093" y="1696697"/>
+            <a:ext cx="646332" cy="369332"/>
+          </a:xfrm>
+          <a:prstGeom prst="rect">
+            <a:avLst/>
+          </a:prstGeom>
+          <a:noFill/>
+        </p:spPr>
+        <p:txBody>
+          <a:bodyPr wrap="none" rtlCol="0">
+            <a:spAutoFit/>
+          </a:bodyPr>
+          <a:lstStyle/>
+          <a:p>
+            <a:pPr algn="ctr"/>
+            <a:r>
+              <a:rPr lang="en-US" dirty="0"/>
+              <a:t>Rank</a:t>
+            </a:r>
+          </a:p>
+        </p:txBody>
+      </p:sp>
+      <p:sp>
+        <p:nvSpPr>
+          <p:cNvPr id="77" name="TextBox 76">
+            <a:extLst>
+              <a:ext uri="{FF2B5EF4-FFF2-40B4-BE49-F238E27FC236}">
+                <a16:creationId xmlns:a16="http://schemas.microsoft.com/office/drawing/2014/main" id="{5A20C28E-4AFB-CD42-9188-A70FE00B9C7B}"/>
+              </a:ext>
+            </a:extLst>
+          </p:cNvPr>
+          <p:cNvSpPr txBox="1"/>
+          <p:nvPr/>
+        </p:nvSpPr>
+        <p:spPr>
+          <a:xfrm>
+            <a:off x="6264438" y="2403878"/>
+            <a:ext cx="663643" cy="646331"/>
+          </a:xfrm>
+          <a:prstGeom prst="rect">
+            <a:avLst/>
+          </a:prstGeom>
+          <a:noFill/>
+        </p:spPr>
+        <p:txBody>
+          <a:bodyPr wrap="none" rtlCol="0">
+            <a:spAutoFit/>
+          </a:bodyPr>
+          <a:lstStyle/>
+          <a:p>
+            <a:r>
+              <a:rPr lang="en-US" dirty="0"/>
+              <a:t>Local</a:t>
+            </a:r>
+          </a:p>
+          <a:p>
+            <a:pPr algn="ctr"/>
+            <a:r>
+              <a:rPr lang="en-US" dirty="0"/>
+              <a:t>rank</a:t>
+            </a:r>
+          </a:p>
+        </p:txBody>
+      </p:sp>
+      <p:sp>
+        <p:nvSpPr>
+          <p:cNvPr id="78" name="TextBox 77">
+            <a:extLst>
+              <a:ext uri="{FF2B5EF4-FFF2-40B4-BE49-F238E27FC236}">
+                <a16:creationId xmlns:a16="http://schemas.microsoft.com/office/drawing/2014/main" id="{6CEA9C1A-E1F6-3049-98A9-FD2FB905D02E}"/>
+              </a:ext>
+            </a:extLst>
+          </p:cNvPr>
+          <p:cNvSpPr txBox="1"/>
+          <p:nvPr/>
+        </p:nvSpPr>
+        <p:spPr>
+          <a:xfrm>
+            <a:off x="6249850" y="3249558"/>
+            <a:ext cx="692818" cy="646331"/>
+          </a:xfrm>
+          <a:prstGeom prst="rect">
+            <a:avLst/>
+          </a:prstGeom>
+          <a:noFill/>
+        </p:spPr>
+        <p:txBody>
+          <a:bodyPr wrap="none" rtlCol="0">
+            <a:spAutoFit/>
+          </a:bodyPr>
+          <a:lstStyle/>
+          <a:p>
+            <a:pPr algn="ctr"/>
+            <a:r>
+              <a:rPr lang="en-US" dirty="0"/>
+              <a:t>Node</a:t>
+            </a:r>
+          </a:p>
+          <a:p>
+            <a:pPr algn="ctr"/>
+            <a:r>
+              <a:rPr lang="en-US" dirty="0"/>
+              <a:t>rank</a:t>
+            </a:r>
+          </a:p>
+        </p:txBody>
+      </p:sp>
+      <p:cxnSp>
+        <p:nvCxnSpPr>
+          <p:cNvPr id="79" name="Straight Connector 78">
+            <a:extLst>
+              <a:ext uri="{FF2B5EF4-FFF2-40B4-BE49-F238E27FC236}">
+                <a16:creationId xmlns:a16="http://schemas.microsoft.com/office/drawing/2014/main" id="{B4C369BD-FAFD-FC43-9EEF-FDD99CEA84A4}"/>
+              </a:ext>
+            </a:extLst>
+          </p:cNvPr>
+          <p:cNvCxnSpPr/>
+          <p:nvPr/>
+        </p:nvCxnSpPr>
+        <p:spPr>
+          <a:xfrm>
+            <a:off x="6596259" y="1358849"/>
+            <a:ext cx="1" cy="199349"/>
+          </a:xfrm>
+          <a:prstGeom prst="line">
+            <a:avLst/>
+          </a:prstGeom>
+        </p:spPr>
+        <p:style>
+          <a:lnRef idx="1">
+            <a:schemeClr val="accent1"/>
+          </a:lnRef>
+          <a:fillRef idx="0">
+            <a:schemeClr val="accent1"/>
+          </a:fillRef>
+          <a:effectRef idx="0">
+            <a:schemeClr val="accent1"/>
+          </a:effectRef>
+          <a:fontRef idx="minor">
+            <a:schemeClr val="tx1"/>
+          </a:fontRef>
+        </p:style>
+      </p:cxnSp>
+      <p:cxnSp>
+        <p:nvCxnSpPr>
+          <p:cNvPr id="80" name="Straight Connector 79">
+            <a:extLst>
+              <a:ext uri="{FF2B5EF4-FFF2-40B4-BE49-F238E27FC236}">
+                <a16:creationId xmlns:a16="http://schemas.microsoft.com/office/drawing/2014/main" id="{54EC3F33-DA39-884C-870C-3E44DDB20386}"/>
+              </a:ext>
+            </a:extLst>
+          </p:cNvPr>
+          <p:cNvCxnSpPr/>
+          <p:nvPr/>
+        </p:nvCxnSpPr>
+        <p:spPr>
+          <a:xfrm flipH="1">
+            <a:off x="6596259" y="2204529"/>
+            <a:ext cx="1" cy="199349"/>
+          </a:xfrm>
+          <a:prstGeom prst="line">
+            <a:avLst/>
+          </a:prstGeom>
+        </p:spPr>
+        <p:style>
+          <a:lnRef idx="1">
+            <a:schemeClr val="accent1"/>
+          </a:lnRef>
+          <a:fillRef idx="0">
+            <a:schemeClr val="accent1"/>
+          </a:fillRef>
+          <a:effectRef idx="0">
+            <a:schemeClr val="accent1"/>
+          </a:effectRef>
+          <a:fontRef idx="minor">
+            <a:schemeClr val="tx1"/>
+          </a:fontRef>
+        </p:style>
+      </p:cxnSp>
+      <p:cxnSp>
+        <p:nvCxnSpPr>
+          <p:cNvPr id="81" name="Straight Connector 80">
+            <a:extLst>
+              <a:ext uri="{FF2B5EF4-FFF2-40B4-BE49-F238E27FC236}">
+                <a16:creationId xmlns:a16="http://schemas.microsoft.com/office/drawing/2014/main" id="{65F6DAA8-B3F2-B141-BC95-6F0B73B85BC4}"/>
+              </a:ext>
+            </a:extLst>
+          </p:cNvPr>
+          <p:cNvCxnSpPr/>
+          <p:nvPr/>
+        </p:nvCxnSpPr>
+        <p:spPr>
+          <a:xfrm>
+            <a:off x="6596259" y="3050209"/>
+            <a:ext cx="1" cy="199349"/>
+          </a:xfrm>
+          <a:prstGeom prst="line">
+            <a:avLst/>
+          </a:prstGeom>
+        </p:spPr>
+        <p:style>
+          <a:lnRef idx="1">
+            <a:schemeClr val="accent1"/>
+          </a:lnRef>
+          <a:fillRef idx="0">
+            <a:schemeClr val="accent1"/>
+          </a:fillRef>
+          <a:effectRef idx="0">
+            <a:schemeClr val="accent1"/>
+          </a:effectRef>
+          <a:fontRef idx="minor">
+            <a:schemeClr val="tx1"/>
+          </a:fontRef>
+        </p:style>
+      </p:cxnSp>
+      <p:sp>
+        <p:nvSpPr>
+          <p:cNvPr id="82" name="TextBox 81">
+            <a:extLst>
+              <a:ext uri="{FF2B5EF4-FFF2-40B4-BE49-F238E27FC236}">
+                <a16:creationId xmlns:a16="http://schemas.microsoft.com/office/drawing/2014/main" id="{8AAC0D2A-D35F-284E-A6A3-79EC0A2E0BC9}"/>
+              </a:ext>
+            </a:extLst>
+          </p:cNvPr>
+          <p:cNvSpPr txBox="1"/>
+          <p:nvPr/>
+        </p:nvSpPr>
+        <p:spPr>
+          <a:xfrm>
+            <a:off x="6249850" y="4095238"/>
+            <a:ext cx="692818" cy="646331"/>
+          </a:xfrm>
+          <a:prstGeom prst="rect">
+            <a:avLst/>
+          </a:prstGeom>
+          <a:noFill/>
+        </p:spPr>
+        <p:txBody>
+          <a:bodyPr wrap="none" rtlCol="0">
+            <a:spAutoFit/>
+          </a:bodyPr>
+          <a:lstStyle/>
+          <a:p>
+            <a:pPr algn="ctr"/>
+            <a:r>
+              <a:rPr lang="en-US" dirty="0"/>
+              <a:t>Node</a:t>
+            </a:r>
+          </a:p>
+          <a:p>
+            <a:pPr algn="ctr"/>
+            <a:r>
+              <a:rPr lang="en-US" dirty="0"/>
+              <a:t>ID</a:t>
+            </a:r>
+          </a:p>
+        </p:txBody>
+      </p:sp>
+      <p:cxnSp>
+        <p:nvCxnSpPr>
+          <p:cNvPr id="83" name="Straight Connector 82">
+            <a:extLst>
+              <a:ext uri="{FF2B5EF4-FFF2-40B4-BE49-F238E27FC236}">
+                <a16:creationId xmlns:a16="http://schemas.microsoft.com/office/drawing/2014/main" id="{6EB5D8C6-469A-2847-85FA-512C5286FD7D}"/>
+              </a:ext>
+            </a:extLst>
+          </p:cNvPr>
+          <p:cNvCxnSpPr/>
+          <p:nvPr/>
+        </p:nvCxnSpPr>
+        <p:spPr>
+          <a:xfrm>
+            <a:off x="6596259" y="3895889"/>
+            <a:ext cx="0" cy="199349"/>
+          </a:xfrm>
+          <a:prstGeom prst="line">
+            <a:avLst/>
+          </a:prstGeom>
+        </p:spPr>
+        <p:style>
+          <a:lnRef idx="1">
+            <a:schemeClr val="accent1"/>
+          </a:lnRef>
+          <a:fillRef idx="0">
+            <a:schemeClr val="accent1"/>
+          </a:fillRef>
+          <a:effectRef idx="0">
+            <a:schemeClr val="accent1"/>
+          </a:effectRef>
+          <a:fontRef idx="minor">
+            <a:schemeClr val="tx1"/>
+          </a:fontRef>
+        </p:style>
+      </p:cxnSp>
+      <p:sp>
+        <p:nvSpPr>
+          <p:cNvPr id="86" name="TextBox 85">
+            <a:extLst>
+              <a:ext uri="{FF2B5EF4-FFF2-40B4-BE49-F238E27FC236}">
+                <a16:creationId xmlns:a16="http://schemas.microsoft.com/office/drawing/2014/main" id="{9002B021-64D9-C147-8D04-0E6FCC6091D6}"/>
+              </a:ext>
+            </a:extLst>
+          </p:cNvPr>
+          <p:cNvSpPr txBox="1"/>
+          <p:nvPr/>
+        </p:nvSpPr>
+        <p:spPr>
+          <a:xfrm>
+            <a:off x="4627165" y="1540179"/>
+            <a:ext cx="612668" cy="646331"/>
+          </a:xfrm>
+          <a:prstGeom prst="rect">
+            <a:avLst/>
+          </a:prstGeom>
+          <a:noFill/>
+        </p:spPr>
+        <p:txBody>
+          <a:bodyPr wrap="none" rtlCol="0">
+            <a:spAutoFit/>
+          </a:bodyPr>
+          <a:lstStyle/>
+          <a:p>
+            <a:pPr algn="ctr"/>
+            <a:r>
+              <a:rPr lang="en-US" dirty="0"/>
+              <a:t>App</a:t>
+            </a:r>
+          </a:p>
+          <a:p>
+            <a:pPr algn="ctr"/>
+            <a:r>
+              <a:rPr lang="en-US" dirty="0"/>
+              <a:t>num</a:t>
+            </a:r>
+          </a:p>
+        </p:txBody>
+      </p:sp>
+      <p:sp>
+        <p:nvSpPr>
+          <p:cNvPr id="87" name="TextBox 86">
+            <a:extLst>
+              <a:ext uri="{FF2B5EF4-FFF2-40B4-BE49-F238E27FC236}">
+                <a16:creationId xmlns:a16="http://schemas.microsoft.com/office/drawing/2014/main" id="{5C023A20-2E89-3441-9C21-496202A9E368}"/>
+              </a:ext>
+            </a:extLst>
+          </p:cNvPr>
+          <p:cNvSpPr txBox="1"/>
+          <p:nvPr/>
+        </p:nvSpPr>
+        <p:spPr>
+          <a:xfrm>
+            <a:off x="6289925" y="4940915"/>
+            <a:ext cx="612668" cy="646331"/>
+          </a:xfrm>
+          <a:prstGeom prst="rect">
+            <a:avLst/>
+          </a:prstGeom>
+          <a:noFill/>
+        </p:spPr>
+        <p:txBody>
+          <a:bodyPr wrap="none" rtlCol="0">
+            <a:spAutoFit/>
+          </a:bodyPr>
+          <a:lstStyle/>
+          <a:p>
+            <a:pPr algn="ctr"/>
+            <a:r>
+              <a:rPr lang="en-US" dirty="0"/>
+              <a:t>App</a:t>
+            </a:r>
+          </a:p>
+          <a:p>
+            <a:pPr algn="ctr"/>
+            <a:r>
+              <a:rPr lang="en-US" dirty="0"/>
+              <a:t>num</a:t>
+            </a:r>
+          </a:p>
+        </p:txBody>
+      </p:sp>
+      <p:cxnSp>
+        <p:nvCxnSpPr>
+          <p:cNvPr id="89" name="Straight Connector 88">
+            <a:extLst>
+              <a:ext uri="{FF2B5EF4-FFF2-40B4-BE49-F238E27FC236}">
+                <a16:creationId xmlns:a16="http://schemas.microsoft.com/office/drawing/2014/main" id="{F1ED18F2-5E96-2D41-BD19-E2F56833BBCE}"/>
+              </a:ext>
+            </a:extLst>
+          </p:cNvPr>
+          <p:cNvCxnSpPr>
+            <a:stCxn id="67" idx="2"/>
+            <a:endCxn id="50" idx="0"/>
+          </p:cNvCxnSpPr>
+          <p:nvPr/>
+        </p:nvCxnSpPr>
+        <p:spPr>
+          <a:xfrm>
+            <a:off x="5751392" y="4741569"/>
+            <a:ext cx="0" cy="199347"/>
+          </a:xfrm>
+          <a:prstGeom prst="line">
+            <a:avLst/>
+          </a:prstGeom>
+        </p:spPr>
+        <p:style>
+          <a:lnRef idx="1">
+            <a:schemeClr val="accent1"/>
+          </a:lnRef>
+          <a:fillRef idx="0">
+            <a:schemeClr val="accent1"/>
+          </a:fillRef>
+          <a:effectRef idx="0">
+            <a:schemeClr val="accent1"/>
+          </a:effectRef>
+          <a:fontRef idx="minor">
+            <a:schemeClr val="tx1"/>
+          </a:fontRef>
+        </p:style>
+      </p:cxnSp>
+      <p:cxnSp>
+        <p:nvCxnSpPr>
+          <p:cNvPr id="91" name="Straight Connector 90">
+            <a:extLst>
+              <a:ext uri="{FF2B5EF4-FFF2-40B4-BE49-F238E27FC236}">
+                <a16:creationId xmlns:a16="http://schemas.microsoft.com/office/drawing/2014/main" id="{EE06345D-33F8-8E43-8337-01A3216111C8}"/>
+              </a:ext>
+            </a:extLst>
+          </p:cNvPr>
+          <p:cNvCxnSpPr>
+            <a:stCxn id="82" idx="2"/>
+            <a:endCxn id="87" idx="0"/>
+          </p:cNvCxnSpPr>
+          <p:nvPr/>
+        </p:nvCxnSpPr>
+        <p:spPr>
+          <a:xfrm>
+            <a:off x="6596259" y="4741569"/>
+            <a:ext cx="0" cy="199346"/>
+          </a:xfrm>
+          <a:prstGeom prst="line">
+            <a:avLst/>
+          </a:prstGeom>
+        </p:spPr>
+        <p:style>
+          <a:lnRef idx="1">
+            <a:schemeClr val="accent1"/>
+          </a:lnRef>
+          <a:fillRef idx="0">
+            <a:schemeClr val="accent1"/>
+          </a:fillRef>
+          <a:effectRef idx="0">
+            <a:schemeClr val="accent1"/>
+          </a:effectRef>
+          <a:fontRef idx="minor">
+            <a:schemeClr val="tx1"/>
+          </a:fontRef>
+        </p:style>
+      </p:cxnSp>
+      <p:sp>
+        <p:nvSpPr>
+          <p:cNvPr id="92" name="TextBox 91">
+            <a:extLst>
+              <a:ext uri="{FF2B5EF4-FFF2-40B4-BE49-F238E27FC236}">
+                <a16:creationId xmlns:a16="http://schemas.microsoft.com/office/drawing/2014/main" id="{4E0D321F-5FC9-9D44-A195-591F9962C813}"/>
+              </a:ext>
+            </a:extLst>
+          </p:cNvPr>
+          <p:cNvSpPr txBox="1"/>
+          <p:nvPr/>
+        </p:nvSpPr>
+        <p:spPr>
+          <a:xfrm>
+            <a:off x="5459484" y="5786592"/>
+            <a:ext cx="596702" cy="646331"/>
+          </a:xfrm>
+          <a:prstGeom prst="rect">
+            <a:avLst/>
+          </a:prstGeom>
+          <a:noFill/>
+        </p:spPr>
+        <p:txBody>
+          <a:bodyPr wrap="none" rtlCol="0">
+            <a:spAutoFit/>
+          </a:bodyPr>
+          <a:lstStyle/>
+          <a:p>
+            <a:pPr algn="ctr"/>
+            <a:r>
+              <a:rPr lang="en-US" dirty="0"/>
+              <a:t>App</a:t>
+            </a:r>
+          </a:p>
+          <a:p>
+            <a:pPr algn="ctr"/>
+            <a:r>
+              <a:rPr lang="en-US" dirty="0"/>
+              <a:t>rank</a:t>
+            </a:r>
+          </a:p>
+        </p:txBody>
+      </p:sp>
+      <p:sp>
+        <p:nvSpPr>
+          <p:cNvPr id="93" name="TextBox 92">
+            <a:extLst>
+              <a:ext uri="{FF2B5EF4-FFF2-40B4-BE49-F238E27FC236}">
+                <a16:creationId xmlns:a16="http://schemas.microsoft.com/office/drawing/2014/main" id="{F4B8634C-970D-9E43-8CD1-66942CFB581A}"/>
+              </a:ext>
+            </a:extLst>
+          </p:cNvPr>
+          <p:cNvSpPr txBox="1"/>
+          <p:nvPr/>
+        </p:nvSpPr>
+        <p:spPr>
+          <a:xfrm>
+            <a:off x="6304351" y="5786591"/>
+            <a:ext cx="596702" cy="646331"/>
+          </a:xfrm>
+          <a:prstGeom prst="rect">
+            <a:avLst/>
+          </a:prstGeom>
+          <a:noFill/>
+        </p:spPr>
+        <p:txBody>
+          <a:bodyPr wrap="none" rtlCol="0">
+            <a:spAutoFit/>
+          </a:bodyPr>
+          <a:lstStyle/>
+          <a:p>
+            <a:pPr algn="ctr"/>
+            <a:r>
+              <a:rPr lang="en-US" dirty="0"/>
+              <a:t>App</a:t>
+            </a:r>
+          </a:p>
+          <a:p>
+            <a:pPr algn="ctr"/>
+            <a:r>
+              <a:rPr lang="en-US" dirty="0"/>
+              <a:t>rank</a:t>
+            </a:r>
+          </a:p>
+        </p:txBody>
+      </p:sp>
+      <p:cxnSp>
+        <p:nvCxnSpPr>
+          <p:cNvPr id="94" name="Straight Connector 93">
+            <a:extLst>
+              <a:ext uri="{FF2B5EF4-FFF2-40B4-BE49-F238E27FC236}">
+                <a16:creationId xmlns:a16="http://schemas.microsoft.com/office/drawing/2014/main" id="{10A69FE0-5DC4-AF40-9740-354D5DACBFEA}"/>
+              </a:ext>
+            </a:extLst>
+          </p:cNvPr>
+          <p:cNvCxnSpPr>
+            <a:endCxn id="92" idx="0"/>
+          </p:cNvCxnSpPr>
+          <p:nvPr/>
+        </p:nvCxnSpPr>
+        <p:spPr>
+          <a:xfrm>
+            <a:off x="5757835" y="5587245"/>
+            <a:ext cx="0" cy="199347"/>
+          </a:xfrm>
+          <a:prstGeom prst="line">
+            <a:avLst/>
+          </a:prstGeom>
+        </p:spPr>
+        <p:style>
+          <a:lnRef idx="1">
+            <a:schemeClr val="accent1"/>
+          </a:lnRef>
+          <a:fillRef idx="0">
+            <a:schemeClr val="accent1"/>
+          </a:fillRef>
+          <a:effectRef idx="0">
+            <a:schemeClr val="accent1"/>
+          </a:effectRef>
+          <a:fontRef idx="minor">
+            <a:schemeClr val="tx1"/>
+          </a:fontRef>
+        </p:style>
+      </p:cxnSp>
+      <p:cxnSp>
+        <p:nvCxnSpPr>
+          <p:cNvPr id="95" name="Straight Connector 94">
+            <a:extLst>
+              <a:ext uri="{FF2B5EF4-FFF2-40B4-BE49-F238E27FC236}">
+                <a16:creationId xmlns:a16="http://schemas.microsoft.com/office/drawing/2014/main" id="{262F9C48-C4B1-E44E-BB10-C40F883755AC}"/>
+              </a:ext>
+            </a:extLst>
+          </p:cNvPr>
+          <p:cNvCxnSpPr>
+            <a:endCxn id="93" idx="0"/>
+          </p:cNvCxnSpPr>
+          <p:nvPr/>
+        </p:nvCxnSpPr>
+        <p:spPr>
+          <a:xfrm>
+            <a:off x="6602702" y="5587245"/>
+            <a:ext cx="0" cy="199346"/>
+          </a:xfrm>
+          <a:prstGeom prst="line">
+            <a:avLst/>
+          </a:prstGeom>
+        </p:spPr>
+        <p:style>
+          <a:lnRef idx="1">
+            <a:schemeClr val="accent1"/>
+          </a:lnRef>
+          <a:fillRef idx="0">
+            <a:schemeClr val="accent1"/>
+          </a:fillRef>
+          <a:effectRef idx="0">
+            <a:schemeClr val="accent1"/>
+          </a:effectRef>
+          <a:fontRef idx="minor">
+            <a:schemeClr val="tx1"/>
+          </a:fontRef>
+        </p:style>
+      </p:cxnSp>
+      <p:cxnSp>
+        <p:nvCxnSpPr>
+          <p:cNvPr id="97" name="Straight Connector 96">
+            <a:extLst>
+              <a:ext uri="{FF2B5EF4-FFF2-40B4-BE49-F238E27FC236}">
+                <a16:creationId xmlns:a16="http://schemas.microsoft.com/office/drawing/2014/main" id="{CE2CE82A-421A-7B43-9976-2ECE5EF10870}"/>
+              </a:ext>
+            </a:extLst>
+          </p:cNvPr>
+          <p:cNvCxnSpPr>
+            <a:stCxn id="49" idx="3"/>
+            <a:endCxn id="60" idx="1"/>
+          </p:cNvCxnSpPr>
+          <p:nvPr/>
+        </p:nvCxnSpPr>
+        <p:spPr>
+          <a:xfrm>
+            <a:off x="5214185" y="1035684"/>
+            <a:ext cx="237542" cy="0"/>
+          </a:xfrm>
+          <a:prstGeom prst="line">
+            <a:avLst/>
+          </a:prstGeom>
+        </p:spPr>
+        <p:style>
+          <a:lnRef idx="1">
+            <a:schemeClr val="accent1"/>
+          </a:lnRef>
+          <a:fillRef idx="0">
+            <a:schemeClr val="accent1"/>
+          </a:fillRef>
+          <a:effectRef idx="0">
+            <a:schemeClr val="accent1"/>
+          </a:effectRef>
+          <a:fontRef idx="minor">
+            <a:schemeClr val="tx1"/>
+          </a:fontRef>
+        </p:style>
+      </p:cxnSp>
+      <p:cxnSp>
+        <p:nvCxnSpPr>
+          <p:cNvPr id="99" name="Straight Connector 98">
+            <a:extLst>
+              <a:ext uri="{FF2B5EF4-FFF2-40B4-BE49-F238E27FC236}">
+                <a16:creationId xmlns:a16="http://schemas.microsoft.com/office/drawing/2014/main" id="{7BA386BA-2A4C-0E41-9328-8FD4E747BE4E}"/>
+              </a:ext>
+            </a:extLst>
+          </p:cNvPr>
+          <p:cNvCxnSpPr>
+            <a:stCxn id="60" idx="3"/>
+            <a:endCxn id="75" idx="1"/>
+          </p:cNvCxnSpPr>
+          <p:nvPr/>
+        </p:nvCxnSpPr>
+        <p:spPr>
+          <a:xfrm>
+            <a:off x="6051058" y="1035684"/>
+            <a:ext cx="245536" cy="0"/>
+          </a:xfrm>
+          <a:prstGeom prst="line">
+            <a:avLst/>
+          </a:prstGeom>
+        </p:spPr>
+        <p:style>
+          <a:lnRef idx="1">
+            <a:schemeClr val="accent1"/>
+          </a:lnRef>
+          <a:fillRef idx="0">
+            <a:schemeClr val="accent1"/>
+          </a:fillRef>
+          <a:effectRef idx="0">
+            <a:schemeClr val="accent1"/>
+          </a:effectRef>
+          <a:fontRef idx="minor">
+            <a:schemeClr val="tx1"/>
+          </a:fontRef>
+        </p:style>
+      </p:cxnSp>
+      <p:sp>
+        <p:nvSpPr>
+          <p:cNvPr id="100" name="TextBox 99">
+            <a:extLst>
+              <a:ext uri="{FF2B5EF4-FFF2-40B4-BE49-F238E27FC236}">
+                <a16:creationId xmlns:a16="http://schemas.microsoft.com/office/drawing/2014/main" id="{EC46BA77-2CF3-AE4F-9A14-D7479B364762}"/>
+              </a:ext>
+            </a:extLst>
+          </p:cNvPr>
+          <p:cNvSpPr txBox="1"/>
+          <p:nvPr/>
+        </p:nvSpPr>
+        <p:spPr>
+          <a:xfrm>
+            <a:off x="7218493" y="1235032"/>
+            <a:ext cx="663643" cy="646331"/>
+          </a:xfrm>
+          <a:prstGeom prst="rect">
+            <a:avLst/>
+          </a:prstGeom>
+          <a:noFill/>
+        </p:spPr>
+        <p:txBody>
+          <a:bodyPr wrap="none" rtlCol="0">
+            <a:spAutoFit/>
+          </a:bodyPr>
+          <a:lstStyle/>
+          <a:p>
+            <a:pPr algn="ctr"/>
+            <a:r>
+              <a:rPr lang="en-US" dirty="0"/>
+              <a:t>Local</a:t>
+            </a:r>
+          </a:p>
+          <a:p>
+            <a:pPr algn="ctr"/>
+            <a:r>
+              <a:rPr lang="en-US" dirty="0"/>
+              <a:t>size</a:t>
+            </a:r>
+          </a:p>
+        </p:txBody>
+      </p:sp>
+      <p:sp>
+        <p:nvSpPr>
+          <p:cNvPr id="101" name="TextBox 100">
+            <a:extLst>
+              <a:ext uri="{FF2B5EF4-FFF2-40B4-BE49-F238E27FC236}">
+                <a16:creationId xmlns:a16="http://schemas.microsoft.com/office/drawing/2014/main" id="{0403CB6B-2185-E345-B2A9-26A44FE64D7D}"/>
+              </a:ext>
+            </a:extLst>
+          </p:cNvPr>
+          <p:cNvSpPr txBox="1"/>
+          <p:nvPr/>
+        </p:nvSpPr>
+        <p:spPr>
+          <a:xfrm>
+            <a:off x="7202591" y="2137410"/>
+            <a:ext cx="695447" cy="646331"/>
+          </a:xfrm>
+          <a:prstGeom prst="rect">
+            <a:avLst/>
+          </a:prstGeom>
+          <a:noFill/>
+        </p:spPr>
+        <p:txBody>
+          <a:bodyPr wrap="none" rtlCol="0">
+            <a:spAutoFit/>
+          </a:bodyPr>
+          <a:lstStyle/>
+          <a:p>
+            <a:pPr algn="ctr"/>
+            <a:r>
+              <a:rPr lang="en-US" dirty="0"/>
+              <a:t>Local</a:t>
+            </a:r>
+          </a:p>
+          <a:p>
+            <a:pPr algn="ctr"/>
+            <a:r>
+              <a:rPr lang="en-US" dirty="0"/>
+              <a:t>Peers</a:t>
+            </a:r>
+          </a:p>
+        </p:txBody>
+      </p:sp>
+      <p:sp>
+        <p:nvSpPr>
+          <p:cNvPr id="102" name="TextBox 101">
+            <a:extLst>
+              <a:ext uri="{FF2B5EF4-FFF2-40B4-BE49-F238E27FC236}">
+                <a16:creationId xmlns:a16="http://schemas.microsoft.com/office/drawing/2014/main" id="{21F3EB8D-599D-8D4A-BA9E-663B115FBD0E}"/>
+              </a:ext>
+            </a:extLst>
+          </p:cNvPr>
+          <p:cNvSpPr txBox="1"/>
+          <p:nvPr/>
+        </p:nvSpPr>
+        <p:spPr>
+          <a:xfrm>
+            <a:off x="7101922" y="3039788"/>
+            <a:ext cx="896784" cy="646331"/>
+          </a:xfrm>
+          <a:prstGeom prst="rect">
+            <a:avLst/>
+          </a:prstGeom>
+          <a:noFill/>
+        </p:spPr>
+        <p:txBody>
+          <a:bodyPr wrap="none" rtlCol="0">
+            <a:spAutoFit/>
+          </a:bodyPr>
+          <a:lstStyle/>
+          <a:p>
+            <a:pPr algn="ctr"/>
+            <a:r>
+              <a:rPr lang="en-US" dirty="0"/>
+              <a:t>Local</a:t>
+            </a:r>
+          </a:p>
+          <a:p>
+            <a:pPr algn="ctr"/>
+            <a:r>
+              <a:rPr lang="en-US" dirty="0"/>
+              <a:t>cpusets</a:t>
+            </a:r>
+          </a:p>
+        </p:txBody>
+      </p:sp>
+      <p:cxnSp>
+        <p:nvCxnSpPr>
+          <p:cNvPr id="106" name="Elbow Connector 105">
+            <a:extLst>
+              <a:ext uri="{FF2B5EF4-FFF2-40B4-BE49-F238E27FC236}">
+                <a16:creationId xmlns:a16="http://schemas.microsoft.com/office/drawing/2014/main" id="{647CD32D-8412-C74D-BA31-5552A783E01F}"/>
+              </a:ext>
+            </a:extLst>
+          </p:cNvPr>
+          <p:cNvCxnSpPr>
+            <a:stCxn id="75" idx="3"/>
+            <a:endCxn id="100" idx="0"/>
+          </p:cNvCxnSpPr>
+          <p:nvPr/>
+        </p:nvCxnSpPr>
+        <p:spPr>
+          <a:xfrm>
+            <a:off x="6895925" y="1035684"/>
+            <a:ext cx="654390" cy="199348"/>
+          </a:xfrm>
+          <a:prstGeom prst="bentConnector2">
+            <a:avLst/>
+          </a:prstGeom>
+        </p:spPr>
+        <p:style>
+          <a:lnRef idx="1">
+            <a:schemeClr val="accent1"/>
+          </a:lnRef>
+          <a:fillRef idx="0">
+            <a:schemeClr val="accent1"/>
+          </a:fillRef>
+          <a:effectRef idx="0">
+            <a:schemeClr val="accent1"/>
+          </a:effectRef>
+          <a:fontRef idx="minor">
+            <a:schemeClr val="tx1"/>
+          </a:fontRef>
+        </p:style>
+      </p:cxnSp>
+      <p:cxnSp>
+        <p:nvCxnSpPr>
+          <p:cNvPr id="108" name="Straight Connector 107">
+            <a:extLst>
+              <a:ext uri="{FF2B5EF4-FFF2-40B4-BE49-F238E27FC236}">
+                <a16:creationId xmlns:a16="http://schemas.microsoft.com/office/drawing/2014/main" id="{A4AFC405-89C4-1842-B4F6-4DB3EE7D8F3B}"/>
+              </a:ext>
+            </a:extLst>
+          </p:cNvPr>
+          <p:cNvCxnSpPr>
+            <a:stCxn id="100" idx="2"/>
+            <a:endCxn id="101" idx="0"/>
+          </p:cNvCxnSpPr>
+          <p:nvPr/>
+        </p:nvCxnSpPr>
+        <p:spPr>
+          <a:xfrm>
+            <a:off x="7550315" y="1881363"/>
+            <a:ext cx="0" cy="256047"/>
+          </a:xfrm>
+          <a:prstGeom prst="line">
+            <a:avLst/>
+          </a:prstGeom>
+        </p:spPr>
+        <p:style>
+          <a:lnRef idx="1">
+            <a:schemeClr val="accent1"/>
+          </a:lnRef>
+          <a:fillRef idx="0">
+            <a:schemeClr val="accent1"/>
+          </a:fillRef>
+          <a:effectRef idx="0">
+            <a:schemeClr val="accent1"/>
+          </a:effectRef>
+          <a:fontRef idx="minor">
+            <a:schemeClr val="tx1"/>
+          </a:fontRef>
+        </p:style>
+      </p:cxnSp>
+      <p:cxnSp>
+        <p:nvCxnSpPr>
+          <p:cNvPr id="110" name="Straight Connector 109">
+            <a:extLst>
+              <a:ext uri="{FF2B5EF4-FFF2-40B4-BE49-F238E27FC236}">
+                <a16:creationId xmlns:a16="http://schemas.microsoft.com/office/drawing/2014/main" id="{A8665300-0F8F-0D4F-AC30-EDABA39E937A}"/>
+              </a:ext>
+            </a:extLst>
+          </p:cNvPr>
+          <p:cNvCxnSpPr>
+            <a:stCxn id="101" idx="2"/>
+            <a:endCxn id="102" idx="0"/>
+          </p:cNvCxnSpPr>
+          <p:nvPr/>
+        </p:nvCxnSpPr>
+        <p:spPr>
+          <a:xfrm flipH="1">
+            <a:off x="7550314" y="2783741"/>
+            <a:ext cx="1" cy="256047"/>
           </a:xfrm>
           <a:prstGeom prst="line">
             <a:avLst/>
@@ -4808,6 +6163,186 @@
     <p:extLst>
       <p:ext uri="{BB962C8B-B14F-4D97-AF65-F5344CB8AC3E}">
         <p14:creationId xmlns:p14="http://schemas.microsoft.com/office/powerpoint/2010/main" val="1669200641"/>
+      </p:ext>
+    </p:extLst>
+  </p:cSld>
+  <p:clrMapOvr>
+    <a:masterClrMapping/>
+  </p:clrMapOvr>
+</p:sld>
+</file>
+
+<file path=ppt/slides/slide2.xml><?xml version="1.0" encoding="utf-8"?>
+<p:sld xmlns:a="http://schemas.openxmlformats.org/drawingml/2006/main" xmlns:r="http://schemas.openxmlformats.org/officeDocument/2006/relationships" xmlns:p="http://schemas.openxmlformats.org/presentationml/2006/main">
+  <p:cSld>
+    <p:spTree>
+      <p:nvGrpSpPr>
+        <p:cNvPr id="1" name=""/>
+        <p:cNvGrpSpPr/>
+        <p:nvPr/>
+      </p:nvGrpSpPr>
+      <p:grpSpPr>
+        <a:xfrm>
+          <a:off x="0" y="0"/>
+          <a:ext cx="0" cy="0"/>
+          <a:chOff x="0" y="0"/>
+          <a:chExt cx="0" cy="0"/>
+        </a:xfrm>
+      </p:grpSpPr>
+      <p:pic>
+        <p:nvPicPr>
+          <p:cNvPr id="2" name="Picture 1">
+            <a:extLst>
+              <a:ext uri="{FF2B5EF4-FFF2-40B4-BE49-F238E27FC236}">
+                <a16:creationId xmlns:a16="http://schemas.microsoft.com/office/drawing/2014/main" id="{D51E8901-6623-A143-AB69-50DEC0E7E1F1}"/>
+              </a:ext>
+            </a:extLst>
+          </p:cNvPr>
+          <p:cNvPicPr>
+            <a:picLocks noChangeAspect="1"/>
+          </p:cNvPicPr>
+          <p:nvPr/>
+        </p:nvPicPr>
+        <p:blipFill>
+          <a:blip r:embed="rId2"/>
+          <a:stretch>
+            <a:fillRect/>
+          </a:stretch>
+        </p:blipFill>
+        <p:spPr>
+          <a:xfrm>
+            <a:off x="157480" y="260350"/>
+            <a:ext cx="8470900" cy="6337300"/>
+          </a:xfrm>
+          <a:prstGeom prst="rect">
+            <a:avLst/>
+          </a:prstGeom>
+        </p:spPr>
+      </p:pic>
+    </p:spTree>
+    <p:extLst>
+      <p:ext uri="{BB962C8B-B14F-4D97-AF65-F5344CB8AC3E}">
+        <p14:creationId xmlns:p14="http://schemas.microsoft.com/office/powerpoint/2010/main" val="3173592403"/>
+      </p:ext>
+    </p:extLst>
+  </p:cSld>
+  <p:clrMapOvr>
+    <a:masterClrMapping/>
+  </p:clrMapOvr>
+</p:sld>
+</file>
+
+<file path=ppt/slides/slide3.xml><?xml version="1.0" encoding="utf-8"?>
+<p:sld xmlns:a="http://schemas.openxmlformats.org/drawingml/2006/main" xmlns:r="http://schemas.openxmlformats.org/officeDocument/2006/relationships" xmlns:p="http://schemas.openxmlformats.org/presentationml/2006/main">
+  <p:cSld>
+    <p:spTree>
+      <p:nvGrpSpPr>
+        <p:cNvPr id="1" name=""/>
+        <p:cNvGrpSpPr/>
+        <p:nvPr/>
+      </p:nvGrpSpPr>
+      <p:grpSpPr>
+        <a:xfrm>
+          <a:off x="0" y="0"/>
+          <a:ext cx="0" cy="0"/>
+          <a:chOff x="0" y="0"/>
+          <a:chExt cx="0" cy="0"/>
+        </a:xfrm>
+      </p:grpSpPr>
+      <p:pic>
+        <p:nvPicPr>
+          <p:cNvPr id="5" name="Picture 4">
+            <a:extLst>
+              <a:ext uri="{FF2B5EF4-FFF2-40B4-BE49-F238E27FC236}">
+                <a16:creationId xmlns:a16="http://schemas.microsoft.com/office/drawing/2014/main" id="{115EDD8A-2E55-A542-B220-F16E65B95950}"/>
+              </a:ext>
+            </a:extLst>
+          </p:cNvPr>
+          <p:cNvPicPr>
+            <a:picLocks noChangeAspect="1"/>
+          </p:cNvPicPr>
+          <p:nvPr/>
+        </p:nvPicPr>
+        <p:blipFill>
+          <a:blip r:embed="rId2"/>
+          <a:stretch>
+            <a:fillRect/>
+          </a:stretch>
+        </p:blipFill>
+        <p:spPr>
+          <a:xfrm>
+            <a:off x="468630" y="254000"/>
+            <a:ext cx="7391400" cy="6464300"/>
+          </a:xfrm>
+          <a:prstGeom prst="rect">
+            <a:avLst/>
+          </a:prstGeom>
+        </p:spPr>
+      </p:pic>
+    </p:spTree>
+    <p:extLst>
+      <p:ext uri="{BB962C8B-B14F-4D97-AF65-F5344CB8AC3E}">
+        <p14:creationId xmlns:p14="http://schemas.microsoft.com/office/powerpoint/2010/main" val="1703306950"/>
+      </p:ext>
+    </p:extLst>
+  </p:cSld>
+  <p:clrMapOvr>
+    <a:masterClrMapping/>
+  </p:clrMapOvr>
+</p:sld>
+</file>
+
+<file path=ppt/slides/slide4.xml><?xml version="1.0" encoding="utf-8"?>
+<p:sld xmlns:a="http://schemas.openxmlformats.org/drawingml/2006/main" xmlns:r="http://schemas.openxmlformats.org/officeDocument/2006/relationships" xmlns:p="http://schemas.openxmlformats.org/presentationml/2006/main">
+  <p:cSld>
+    <p:spTree>
+      <p:nvGrpSpPr>
+        <p:cNvPr id="1" name=""/>
+        <p:cNvGrpSpPr/>
+        <p:nvPr/>
+      </p:nvGrpSpPr>
+      <p:grpSpPr>
+        <a:xfrm>
+          <a:off x="0" y="0"/>
+          <a:ext cx="0" cy="0"/>
+          <a:chOff x="0" y="0"/>
+          <a:chExt cx="0" cy="0"/>
+        </a:xfrm>
+      </p:grpSpPr>
+      <p:pic>
+        <p:nvPicPr>
+          <p:cNvPr id="2" name="Picture 1">
+            <a:extLst>
+              <a:ext uri="{FF2B5EF4-FFF2-40B4-BE49-F238E27FC236}">
+                <a16:creationId xmlns:a16="http://schemas.microsoft.com/office/drawing/2014/main" id="{B72365FC-C5BC-4F4F-94C7-60B514829B72}"/>
+              </a:ext>
+            </a:extLst>
+          </p:cNvPr>
+          <p:cNvPicPr>
+            <a:picLocks noChangeAspect="1"/>
+          </p:cNvPicPr>
+          <p:nvPr/>
+        </p:nvPicPr>
+        <p:blipFill>
+          <a:blip r:embed="rId2"/>
+          <a:stretch>
+            <a:fillRect/>
+          </a:stretch>
+        </p:blipFill>
+        <p:spPr>
+          <a:xfrm>
+            <a:off x="1018540" y="392430"/>
+            <a:ext cx="6794500" cy="5524500"/>
+          </a:xfrm>
+          <a:prstGeom prst="rect">
+            <a:avLst/>
+          </a:prstGeom>
+        </p:spPr>
+      </p:pic>
+    </p:spTree>
+    <p:extLst>
+      <p:ext uri="{BB962C8B-B14F-4D97-AF65-F5344CB8AC3E}">
+        <p14:creationId xmlns:p14="http://schemas.microsoft.com/office/powerpoint/2010/main" val="3071618879"/>
       </p:ext>
     </p:extLst>
   </p:cSld>

</xml_diff>

<commit_message>
Clarify hierarchical nesting of info level arrays
The various info level arrays can be nested into hierarchical topologies
as required for clear communication of information. For example, the job
array might contain a node array, each element containing job-level
values for that node.

Signed-off-by: Ralph Castain <rhc@pmix.org>
(cherry picked from commit 0eb757a97ac248f39552e5fa1c93af58a8d8e4bb)
(cherry picked from commit 52f559812a350e0e38b8ed1d6c90f275eb8be680)
</commit_message>
<xml_diff>
--- a/figs/drawings.pptx
+++ b/figs/drawings.pptx
@@ -9,6 +9,7 @@
     <p:sldId id="259" r:id="rId3"/>
     <p:sldId id="258" r:id="rId4"/>
     <p:sldId id="257" r:id="rId5"/>
+    <p:sldId id="260" r:id="rId6"/>
   </p:sldIdLst>
   <p:sldSz cx="12192000" cy="6858000"/>
   <p:notesSz cx="6858000" cy="9144000"/>
@@ -107,6 +108,11 @@
       </a:defRPr>
     </a:lvl9pPr>
   </p:defaultTextStyle>
+  <p:extLst>
+    <p:ext uri="{EFAFB233-063F-42B5-8137-9DF3F51BA10A}">
+      <p15:sldGuideLst xmlns:p15="http://schemas.microsoft.com/office/powerpoint/2012/main"/>
+    </p:ext>
+  </p:extLst>
 </p:presentation>
 </file>
 
@@ -257,7 +263,7 @@
           <a:p>
             <a:fld id="{4597F392-DBDF-6842-8400-5A8310564639}" type="datetimeFigureOut">
               <a:rPr lang="en-US" smtClean="0"/>
-              <a:t>11/15/18</a:t>
+              <a:t>1/16/19</a:t>
             </a:fld>
             <a:endParaRPr lang="en-US" dirty="0"/>
           </a:p>
@@ -455,7 +461,7 @@
           <a:p>
             <a:fld id="{4597F392-DBDF-6842-8400-5A8310564639}" type="datetimeFigureOut">
               <a:rPr lang="en-US" smtClean="0"/>
-              <a:t>11/15/18</a:t>
+              <a:t>1/16/19</a:t>
             </a:fld>
             <a:endParaRPr lang="en-US" dirty="0"/>
           </a:p>
@@ -663,7 +669,7 @@
           <a:p>
             <a:fld id="{4597F392-DBDF-6842-8400-5A8310564639}" type="datetimeFigureOut">
               <a:rPr lang="en-US" smtClean="0"/>
-              <a:t>11/15/18</a:t>
+              <a:t>1/16/19</a:t>
             </a:fld>
             <a:endParaRPr lang="en-US" dirty="0"/>
           </a:p>
@@ -861,7 +867,7 @@
           <a:p>
             <a:fld id="{4597F392-DBDF-6842-8400-5A8310564639}" type="datetimeFigureOut">
               <a:rPr lang="en-US" smtClean="0"/>
-              <a:t>11/15/18</a:t>
+              <a:t>1/16/19</a:t>
             </a:fld>
             <a:endParaRPr lang="en-US" dirty="0"/>
           </a:p>
@@ -1136,7 +1142,7 @@
           <a:p>
             <a:fld id="{4597F392-DBDF-6842-8400-5A8310564639}" type="datetimeFigureOut">
               <a:rPr lang="en-US" smtClean="0"/>
-              <a:t>11/15/18</a:t>
+              <a:t>1/16/19</a:t>
             </a:fld>
             <a:endParaRPr lang="en-US" dirty="0"/>
           </a:p>
@@ -1401,7 +1407,7 @@
           <a:p>
             <a:fld id="{4597F392-DBDF-6842-8400-5A8310564639}" type="datetimeFigureOut">
               <a:rPr lang="en-US" smtClean="0"/>
-              <a:t>11/15/18</a:t>
+              <a:t>1/16/19</a:t>
             </a:fld>
             <a:endParaRPr lang="en-US" dirty="0"/>
           </a:p>
@@ -1813,7 +1819,7 @@
           <a:p>
             <a:fld id="{4597F392-DBDF-6842-8400-5A8310564639}" type="datetimeFigureOut">
               <a:rPr lang="en-US" smtClean="0"/>
-              <a:t>11/15/18</a:t>
+              <a:t>1/16/19</a:t>
             </a:fld>
             <a:endParaRPr lang="en-US" dirty="0"/>
           </a:p>
@@ -1954,7 +1960,7 @@
           <a:p>
             <a:fld id="{4597F392-DBDF-6842-8400-5A8310564639}" type="datetimeFigureOut">
               <a:rPr lang="en-US" smtClean="0"/>
-              <a:t>11/15/18</a:t>
+              <a:t>1/16/19</a:t>
             </a:fld>
             <a:endParaRPr lang="en-US" dirty="0"/>
           </a:p>
@@ -2067,7 +2073,7 @@
           <a:p>
             <a:fld id="{4597F392-DBDF-6842-8400-5A8310564639}" type="datetimeFigureOut">
               <a:rPr lang="en-US" smtClean="0"/>
-              <a:t>11/15/18</a:t>
+              <a:t>1/16/19</a:t>
             </a:fld>
             <a:endParaRPr lang="en-US" dirty="0"/>
           </a:p>
@@ -2378,7 +2384,7 @@
           <a:p>
             <a:fld id="{4597F392-DBDF-6842-8400-5A8310564639}" type="datetimeFigureOut">
               <a:rPr lang="en-US" smtClean="0"/>
-              <a:t>11/15/18</a:t>
+              <a:t>1/16/19</a:t>
             </a:fld>
             <a:endParaRPr lang="en-US" dirty="0"/>
           </a:p>
@@ -2666,7 +2672,7 @@
           <a:p>
             <a:fld id="{4597F392-DBDF-6842-8400-5A8310564639}" type="datetimeFigureOut">
               <a:rPr lang="en-US" smtClean="0"/>
-              <a:t>11/15/18</a:t>
+              <a:t>1/16/19</a:t>
             </a:fld>
             <a:endParaRPr lang="en-US" dirty="0"/>
           </a:p>
@@ -2907,7 +2913,7 @@
           <a:p>
             <a:fld id="{4597F392-DBDF-6842-8400-5A8310564639}" type="datetimeFigureOut">
               <a:rPr lang="en-US" smtClean="0"/>
-              <a:t>11/15/18</a:t>
+              <a:t>1/16/19</a:t>
             </a:fld>
             <a:endParaRPr lang="en-US" dirty="0"/>
           </a:p>
@@ -4101,7 +4107,7 @@
         </p:nvSpPr>
         <p:spPr>
           <a:xfrm>
-            <a:off x="3094630" y="4940919"/>
+            <a:off x="3094374" y="4940919"/>
             <a:ext cx="692305" cy="646331"/>
           </a:xfrm>
           <a:prstGeom prst="rect">
@@ -4148,7 +4154,7 @@
         <p:spPr>
           <a:xfrm>
             <a:off x="3440527" y="4741570"/>
-            <a:ext cx="256" cy="199349"/>
+            <a:ext cx="0" cy="199349"/>
           </a:xfrm>
           <a:prstGeom prst="line">
             <a:avLst/>
@@ -4731,46 +4737,6 @@
       </p:cxnSp>
       <p:cxnSp>
         <p:nvCxnSpPr>
-          <p:cNvPr id="57" name="Straight Connector 56">
-            <a:extLst>
-              <a:ext uri="{FF2B5EF4-FFF2-40B4-BE49-F238E27FC236}">
-                <a16:creationId xmlns:a16="http://schemas.microsoft.com/office/drawing/2014/main" id="{81827CE1-59FE-8040-A4CB-A826632B61EC}"/>
-              </a:ext>
-            </a:extLst>
-          </p:cNvPr>
-          <p:cNvCxnSpPr>
-            <a:cxnSpLocks/>
-            <a:stCxn id="19" idx="3"/>
-            <a:endCxn id="38" idx="1"/>
-          </p:cNvCxnSpPr>
-          <p:nvPr/>
-        </p:nvCxnSpPr>
-        <p:spPr>
-          <a:xfrm flipV="1">
-            <a:off x="3713293" y="1035684"/>
-            <a:ext cx="226122" cy="1"/>
-          </a:xfrm>
-          <a:prstGeom prst="line">
-            <a:avLst/>
-          </a:prstGeom>
-        </p:spPr>
-        <p:style>
-          <a:lnRef idx="1">
-            <a:schemeClr val="accent1"/>
-          </a:lnRef>
-          <a:fillRef idx="0">
-            <a:schemeClr val="accent1"/>
-          </a:fillRef>
-          <a:effectRef idx="0">
-            <a:schemeClr val="accent1"/>
-          </a:effectRef>
-          <a:fontRef idx="minor">
-            <a:schemeClr val="tx1"/>
-          </a:fontRef>
-        </p:style>
-      </p:cxnSp>
-      <p:cxnSp>
-        <p:nvCxnSpPr>
           <p:cNvPr id="59" name="Straight Connector 58">
             <a:extLst>
               <a:ext uri="{FF2B5EF4-FFF2-40B4-BE49-F238E27FC236}">
@@ -5837,23 +5803,23 @@
       </p:cxnSp>
       <p:cxnSp>
         <p:nvCxnSpPr>
-          <p:cNvPr id="97" name="Straight Connector 96">
-            <a:extLst>
-              <a:ext uri="{FF2B5EF4-FFF2-40B4-BE49-F238E27FC236}">
-                <a16:creationId xmlns:a16="http://schemas.microsoft.com/office/drawing/2014/main" id="{CE2CE82A-421A-7B43-9976-2ECE5EF10870}"/>
+          <p:cNvPr id="99" name="Straight Connector 98">
+            <a:extLst>
+              <a:ext uri="{FF2B5EF4-FFF2-40B4-BE49-F238E27FC236}">
+                <a16:creationId xmlns:a16="http://schemas.microsoft.com/office/drawing/2014/main" id="{7BA386BA-2A4C-0E41-9328-8FD4E747BE4E}"/>
               </a:ext>
             </a:extLst>
           </p:cNvPr>
           <p:cNvCxnSpPr>
-            <a:stCxn id="49" idx="3"/>
-            <a:endCxn id="60" idx="1"/>
+            <a:stCxn id="60" idx="3"/>
+            <a:endCxn id="75" idx="1"/>
           </p:cNvCxnSpPr>
           <p:nvPr/>
         </p:nvCxnSpPr>
         <p:spPr>
           <a:xfrm>
-            <a:off x="5214185" y="1035684"/>
-            <a:ext cx="237542" cy="0"/>
+            <a:off x="6051058" y="1035684"/>
+            <a:ext cx="245536" cy="0"/>
           </a:xfrm>
           <a:prstGeom prst="line">
             <a:avLst/>
@@ -5874,45 +5840,6 @@
           </a:fontRef>
         </p:style>
       </p:cxnSp>
-      <p:cxnSp>
-        <p:nvCxnSpPr>
-          <p:cNvPr id="99" name="Straight Connector 98">
-            <a:extLst>
-              <a:ext uri="{FF2B5EF4-FFF2-40B4-BE49-F238E27FC236}">
-                <a16:creationId xmlns:a16="http://schemas.microsoft.com/office/drawing/2014/main" id="{7BA386BA-2A4C-0E41-9328-8FD4E747BE4E}"/>
-              </a:ext>
-            </a:extLst>
-          </p:cNvPr>
-          <p:cNvCxnSpPr>
-            <a:stCxn id="60" idx="3"/>
-            <a:endCxn id="75" idx="1"/>
-          </p:cNvCxnSpPr>
-          <p:nvPr/>
-        </p:nvCxnSpPr>
-        <p:spPr>
-          <a:xfrm>
-            <a:off x="6051058" y="1035684"/>
-            <a:ext cx="245536" cy="0"/>
-          </a:xfrm>
-          <a:prstGeom prst="line">
-            <a:avLst/>
-          </a:prstGeom>
-        </p:spPr>
-        <p:style>
-          <a:lnRef idx="1">
-            <a:schemeClr val="accent1"/>
-          </a:lnRef>
-          <a:fillRef idx="0">
-            <a:schemeClr val="accent1"/>
-          </a:fillRef>
-          <a:effectRef idx="0">
-            <a:schemeClr val="accent1"/>
-          </a:effectRef>
-          <a:fontRef idx="minor">
-            <a:schemeClr val="tx1"/>
-          </a:fontRef>
-        </p:style>
-      </p:cxnSp>
       <p:sp>
         <p:nvSpPr>
           <p:cNvPr id="100" name="TextBox 99">
@@ -6052,6 +5979,7 @@
             </a:extLst>
           </p:cNvPr>
           <p:cNvCxnSpPr>
+            <a:cxnSpLocks/>
             <a:stCxn id="75" idx="3"/>
             <a:endCxn id="100" idx="0"/>
           </p:cNvCxnSpPr>
@@ -6139,6 +6067,767 @@
           <a:xfrm flipH="1">
             <a:off x="7550314" y="2783741"/>
             <a:ext cx="1" cy="256047"/>
+          </a:xfrm>
+          <a:prstGeom prst="line">
+            <a:avLst/>
+          </a:prstGeom>
+        </p:spPr>
+        <p:style>
+          <a:lnRef idx="1">
+            <a:schemeClr val="accent1"/>
+          </a:lnRef>
+          <a:fillRef idx="0">
+            <a:schemeClr val="accent1"/>
+          </a:fillRef>
+          <a:effectRef idx="0">
+            <a:schemeClr val="accent1"/>
+          </a:effectRef>
+          <a:fontRef idx="minor">
+            <a:schemeClr val="tx1"/>
+          </a:fontRef>
+        </p:style>
+      </p:cxnSp>
+      <p:sp>
+        <p:nvSpPr>
+          <p:cNvPr id="2" name="TextBox 1">
+            <a:extLst>
+              <a:ext uri="{FF2B5EF4-FFF2-40B4-BE49-F238E27FC236}">
+                <a16:creationId xmlns:a16="http://schemas.microsoft.com/office/drawing/2014/main" id="{7AF29462-8D73-764D-8BE4-DAAD5F24FDA9}"/>
+              </a:ext>
+            </a:extLst>
+          </p:cNvPr>
+          <p:cNvSpPr txBox="1"/>
+          <p:nvPr/>
+        </p:nvSpPr>
+        <p:spPr>
+          <a:xfrm>
+            <a:off x="3094117" y="5723437"/>
+            <a:ext cx="692818" cy="646331"/>
+          </a:xfrm>
+          <a:prstGeom prst="rect">
+            <a:avLst/>
+          </a:prstGeom>
+          <a:noFill/>
+        </p:spPr>
+        <p:txBody>
+          <a:bodyPr wrap="none" rtlCol="0">
+            <a:spAutoFit/>
+          </a:bodyPr>
+          <a:lstStyle/>
+          <a:p>
+            <a:pPr algn="ctr"/>
+            <a:r>
+              <a:rPr lang="en-US" dirty="0"/>
+              <a:t>Node</a:t>
+            </a:r>
+          </a:p>
+          <a:p>
+            <a:pPr algn="ctr"/>
+            <a:r>
+              <a:rPr lang="en-US" dirty="0"/>
+              <a:t>Info</a:t>
+            </a:r>
+          </a:p>
+        </p:txBody>
+      </p:sp>
+      <p:cxnSp>
+        <p:nvCxnSpPr>
+          <p:cNvPr id="74" name="Straight Connector 73">
+            <a:extLst>
+              <a:ext uri="{FF2B5EF4-FFF2-40B4-BE49-F238E27FC236}">
+                <a16:creationId xmlns:a16="http://schemas.microsoft.com/office/drawing/2014/main" id="{1538EC28-49F6-A840-AC37-FDED36ED1184}"/>
+              </a:ext>
+            </a:extLst>
+          </p:cNvPr>
+          <p:cNvCxnSpPr>
+            <a:cxnSpLocks/>
+          </p:cNvCxnSpPr>
+          <p:nvPr/>
+        </p:nvCxnSpPr>
+        <p:spPr>
+          <a:xfrm flipH="1">
+            <a:off x="3440270" y="5587250"/>
+            <a:ext cx="512" cy="199341"/>
+          </a:xfrm>
+          <a:prstGeom prst="line">
+            <a:avLst/>
+          </a:prstGeom>
+        </p:spPr>
+        <p:style>
+          <a:lnRef idx="1">
+            <a:schemeClr val="accent1"/>
+          </a:lnRef>
+          <a:fillRef idx="0">
+            <a:schemeClr val="accent1"/>
+          </a:fillRef>
+          <a:effectRef idx="0">
+            <a:schemeClr val="accent1"/>
+          </a:effectRef>
+          <a:fontRef idx="minor">
+            <a:schemeClr val="tx1"/>
+          </a:fontRef>
+        </p:style>
+      </p:cxnSp>
+      <p:sp>
+        <p:nvSpPr>
+          <p:cNvPr id="11" name="TextBox 10">
+            <a:extLst>
+              <a:ext uri="{FF2B5EF4-FFF2-40B4-BE49-F238E27FC236}">
+                <a16:creationId xmlns:a16="http://schemas.microsoft.com/office/drawing/2014/main" id="{65175EE8-6188-A246-9732-832CFC32269B}"/>
+              </a:ext>
+            </a:extLst>
+          </p:cNvPr>
+          <p:cNvSpPr txBox="1"/>
+          <p:nvPr/>
+        </p:nvSpPr>
+        <p:spPr>
+          <a:xfrm>
+            <a:off x="1983934" y="5861936"/>
+            <a:ext cx="809837" cy="369332"/>
+          </a:xfrm>
+          <a:prstGeom prst="rect">
+            <a:avLst/>
+          </a:prstGeom>
+          <a:noFill/>
+        </p:spPr>
+        <p:txBody>
+          <a:bodyPr wrap="none" rtlCol="0">
+            <a:spAutoFit/>
+          </a:bodyPr>
+          <a:lstStyle/>
+          <a:p>
+            <a:r>
+              <a:rPr lang="en-US" dirty="0"/>
+              <a:t>Node1</a:t>
+            </a:r>
+          </a:p>
+        </p:txBody>
+      </p:sp>
+      <p:cxnSp>
+        <p:nvCxnSpPr>
+          <p:cNvPr id="15" name="Straight Connector 14">
+            <a:extLst>
+              <a:ext uri="{FF2B5EF4-FFF2-40B4-BE49-F238E27FC236}">
+                <a16:creationId xmlns:a16="http://schemas.microsoft.com/office/drawing/2014/main" id="{C1D611FD-172B-B141-8D03-101CD9D8F69B}"/>
+              </a:ext>
+            </a:extLst>
+          </p:cNvPr>
+          <p:cNvCxnSpPr>
+            <a:stCxn id="2" idx="1"/>
+            <a:endCxn id="11" idx="3"/>
+          </p:cNvCxnSpPr>
+          <p:nvPr/>
+        </p:nvCxnSpPr>
+        <p:spPr>
+          <a:xfrm flipH="1" flipV="1">
+            <a:off x="2793771" y="6046602"/>
+            <a:ext cx="300346" cy="1"/>
+          </a:xfrm>
+          <a:prstGeom prst="line">
+            <a:avLst/>
+          </a:prstGeom>
+        </p:spPr>
+        <p:style>
+          <a:lnRef idx="1">
+            <a:schemeClr val="accent1"/>
+          </a:lnRef>
+          <a:fillRef idx="0">
+            <a:schemeClr val="accent1"/>
+          </a:fillRef>
+          <a:effectRef idx="0">
+            <a:schemeClr val="accent1"/>
+          </a:effectRef>
+          <a:fontRef idx="minor">
+            <a:schemeClr val="tx1"/>
+          </a:fontRef>
+        </p:style>
+      </p:cxnSp>
+      <p:sp>
+        <p:nvSpPr>
+          <p:cNvPr id="17" name="TextBox 16">
+            <a:extLst>
+              <a:ext uri="{FF2B5EF4-FFF2-40B4-BE49-F238E27FC236}">
+                <a16:creationId xmlns:a16="http://schemas.microsoft.com/office/drawing/2014/main" id="{4EF02C3B-A3C7-E445-B9F9-C1F9384639D3}"/>
+              </a:ext>
+            </a:extLst>
+          </p:cNvPr>
+          <p:cNvSpPr txBox="1"/>
+          <p:nvPr/>
+        </p:nvSpPr>
+        <p:spPr>
+          <a:xfrm>
+            <a:off x="2057031" y="4328070"/>
+            <a:ext cx="663643" cy="646331"/>
+          </a:xfrm>
+          <a:prstGeom prst="rect">
+            <a:avLst/>
+          </a:prstGeom>
+          <a:noFill/>
+        </p:spPr>
+        <p:txBody>
+          <a:bodyPr wrap="none" rtlCol="0">
+            <a:spAutoFit/>
+          </a:bodyPr>
+          <a:lstStyle/>
+          <a:p>
+            <a:pPr algn="ctr"/>
+            <a:r>
+              <a:rPr lang="en-US" dirty="0"/>
+              <a:t>Local</a:t>
+            </a:r>
+          </a:p>
+          <a:p>
+            <a:pPr algn="ctr"/>
+            <a:r>
+              <a:rPr lang="en-US" dirty="0"/>
+              <a:t>Ldr</a:t>
+            </a:r>
+          </a:p>
+        </p:txBody>
+      </p:sp>
+      <p:cxnSp>
+        <p:nvCxnSpPr>
+          <p:cNvPr id="21" name="Straight Connector 20">
+            <a:extLst>
+              <a:ext uri="{FF2B5EF4-FFF2-40B4-BE49-F238E27FC236}">
+                <a16:creationId xmlns:a16="http://schemas.microsoft.com/office/drawing/2014/main" id="{B48A10B2-FE14-9744-89F5-7486A28C4A7B}"/>
+              </a:ext>
+            </a:extLst>
+          </p:cNvPr>
+          <p:cNvCxnSpPr/>
+          <p:nvPr/>
+        </p:nvCxnSpPr>
+        <p:spPr>
+          <a:xfrm>
+            <a:off x="2388852" y="4974401"/>
+            <a:ext cx="0" cy="274691"/>
+          </a:xfrm>
+          <a:prstGeom prst="line">
+            <a:avLst/>
+          </a:prstGeom>
+        </p:spPr>
+        <p:style>
+          <a:lnRef idx="1">
+            <a:schemeClr val="accent1"/>
+          </a:lnRef>
+          <a:fillRef idx="0">
+            <a:schemeClr val="accent1"/>
+          </a:fillRef>
+          <a:effectRef idx="0">
+            <a:schemeClr val="accent1"/>
+          </a:effectRef>
+          <a:fontRef idx="minor">
+            <a:schemeClr val="tx1"/>
+          </a:fontRef>
+        </p:style>
+      </p:cxnSp>
+      <p:sp>
+        <p:nvSpPr>
+          <p:cNvPr id="25" name="TextBox 24">
+            <a:extLst>
+              <a:ext uri="{FF2B5EF4-FFF2-40B4-BE49-F238E27FC236}">
+                <a16:creationId xmlns:a16="http://schemas.microsoft.com/office/drawing/2014/main" id="{E8BE766A-2E3D-554B-8066-0D9AD5D19408}"/>
+              </a:ext>
+            </a:extLst>
+          </p:cNvPr>
+          <p:cNvSpPr txBox="1"/>
+          <p:nvPr/>
+        </p:nvSpPr>
+        <p:spPr>
+          <a:xfrm>
+            <a:off x="2044303" y="3482394"/>
+            <a:ext cx="689099" cy="646331"/>
+          </a:xfrm>
+          <a:prstGeom prst="rect">
+            <a:avLst/>
+          </a:prstGeom>
+          <a:noFill/>
+        </p:spPr>
+        <p:txBody>
+          <a:bodyPr wrap="none" rtlCol="0">
+            <a:spAutoFit/>
+          </a:bodyPr>
+          <a:lstStyle/>
+          <a:p>
+            <a:r>
+              <a:rPr lang="en-US" dirty="0"/>
+              <a:t>Max</a:t>
+            </a:r>
+          </a:p>
+          <a:p>
+            <a:r>
+              <a:rPr lang="en-US" dirty="0"/>
+              <a:t>Procs</a:t>
+            </a:r>
+          </a:p>
+        </p:txBody>
+      </p:sp>
+      <p:cxnSp>
+        <p:nvCxnSpPr>
+          <p:cNvPr id="29" name="Straight Connector 28">
+            <a:extLst>
+              <a:ext uri="{FF2B5EF4-FFF2-40B4-BE49-F238E27FC236}">
+                <a16:creationId xmlns:a16="http://schemas.microsoft.com/office/drawing/2014/main" id="{8E7CA5FA-04E5-9D44-A2ED-8D83B0403908}"/>
+              </a:ext>
+            </a:extLst>
+          </p:cNvPr>
+          <p:cNvCxnSpPr/>
+          <p:nvPr/>
+        </p:nvCxnSpPr>
+        <p:spPr>
+          <a:xfrm>
+            <a:off x="2388852" y="4128725"/>
+            <a:ext cx="0" cy="199345"/>
+          </a:xfrm>
+          <a:prstGeom prst="line">
+            <a:avLst/>
+          </a:prstGeom>
+        </p:spPr>
+        <p:style>
+          <a:lnRef idx="1">
+            <a:schemeClr val="accent1"/>
+          </a:lnRef>
+          <a:fillRef idx="0">
+            <a:schemeClr val="accent1"/>
+          </a:fillRef>
+          <a:effectRef idx="0">
+            <a:schemeClr val="accent1"/>
+          </a:effectRef>
+          <a:fontRef idx="minor">
+            <a:schemeClr val="tx1"/>
+          </a:fontRef>
+        </p:style>
+      </p:cxnSp>
+      <p:sp>
+        <p:nvSpPr>
+          <p:cNvPr id="31" name="TextBox 30">
+            <a:extLst>
+              <a:ext uri="{FF2B5EF4-FFF2-40B4-BE49-F238E27FC236}">
+                <a16:creationId xmlns:a16="http://schemas.microsoft.com/office/drawing/2014/main" id="{80338AC9-3F53-8A40-872C-EDE1AC2D797B}"/>
+              </a:ext>
+            </a:extLst>
+          </p:cNvPr>
+          <p:cNvSpPr txBox="1"/>
+          <p:nvPr/>
+        </p:nvSpPr>
+        <p:spPr>
+          <a:xfrm>
+            <a:off x="1815298" y="5299800"/>
+            <a:ext cx="1147109" cy="369332"/>
+          </a:xfrm>
+          <a:prstGeom prst="rect">
+            <a:avLst/>
+          </a:prstGeom>
+          <a:noFill/>
+        </p:spPr>
+        <p:txBody>
+          <a:bodyPr wrap="none" rtlCol="0">
+            <a:spAutoFit/>
+          </a:bodyPr>
+          <a:lstStyle/>
+          <a:p>
+            <a:r>
+              <a:rPr lang="en-US" dirty="0"/>
+              <a:t>Hostname</a:t>
+            </a:r>
+          </a:p>
+        </p:txBody>
+      </p:sp>
+      <p:cxnSp>
+        <p:nvCxnSpPr>
+          <p:cNvPr id="36" name="Straight Connector 35">
+            <a:extLst>
+              <a:ext uri="{FF2B5EF4-FFF2-40B4-BE49-F238E27FC236}">
+                <a16:creationId xmlns:a16="http://schemas.microsoft.com/office/drawing/2014/main" id="{1DF6A928-A166-2948-A01A-6BB393646112}"/>
+              </a:ext>
+            </a:extLst>
+          </p:cNvPr>
+          <p:cNvCxnSpPr/>
+          <p:nvPr/>
+        </p:nvCxnSpPr>
+        <p:spPr>
+          <a:xfrm>
+            <a:off x="2388852" y="5669132"/>
+            <a:ext cx="0" cy="192804"/>
+          </a:xfrm>
+          <a:prstGeom prst="line">
+            <a:avLst/>
+          </a:prstGeom>
+        </p:spPr>
+        <p:style>
+          <a:lnRef idx="1">
+            <a:schemeClr val="accent1"/>
+          </a:lnRef>
+          <a:fillRef idx="0">
+            <a:schemeClr val="accent1"/>
+          </a:fillRef>
+          <a:effectRef idx="0">
+            <a:schemeClr val="accent1"/>
+          </a:effectRef>
+          <a:fontRef idx="minor">
+            <a:schemeClr val="tx1"/>
+          </a:fontRef>
+        </p:style>
+      </p:cxnSp>
+      <p:sp>
+        <p:nvSpPr>
+          <p:cNvPr id="90" name="TextBox 89">
+            <a:extLst>
+              <a:ext uri="{FF2B5EF4-FFF2-40B4-BE49-F238E27FC236}">
+                <a16:creationId xmlns:a16="http://schemas.microsoft.com/office/drawing/2014/main" id="{D9434412-29BA-914E-8C7E-DD9EEFFF4EA1}"/>
+              </a:ext>
+            </a:extLst>
+          </p:cNvPr>
+          <p:cNvSpPr txBox="1"/>
+          <p:nvPr/>
+        </p:nvSpPr>
+        <p:spPr>
+          <a:xfrm>
+            <a:off x="833595" y="5861936"/>
+            <a:ext cx="809837" cy="369332"/>
+          </a:xfrm>
+          <a:prstGeom prst="rect">
+            <a:avLst/>
+          </a:prstGeom>
+          <a:noFill/>
+        </p:spPr>
+        <p:txBody>
+          <a:bodyPr wrap="none" rtlCol="0">
+            <a:spAutoFit/>
+          </a:bodyPr>
+          <a:lstStyle/>
+          <a:p>
+            <a:r>
+              <a:rPr lang="en-US" dirty="0"/>
+              <a:t>Node2</a:t>
+            </a:r>
+          </a:p>
+        </p:txBody>
+      </p:sp>
+      <p:cxnSp>
+        <p:nvCxnSpPr>
+          <p:cNvPr id="96" name="Straight Connector 95">
+            <a:extLst>
+              <a:ext uri="{FF2B5EF4-FFF2-40B4-BE49-F238E27FC236}">
+                <a16:creationId xmlns:a16="http://schemas.microsoft.com/office/drawing/2014/main" id="{17F3A6AB-58C0-724F-B4BB-CB0AA7FD366F}"/>
+              </a:ext>
+            </a:extLst>
+          </p:cNvPr>
+          <p:cNvCxnSpPr>
+            <a:endCxn id="90" idx="3"/>
+          </p:cNvCxnSpPr>
+          <p:nvPr/>
+        </p:nvCxnSpPr>
+        <p:spPr>
+          <a:xfrm flipH="1" flipV="1">
+            <a:off x="1643432" y="6046602"/>
+            <a:ext cx="300347" cy="2"/>
+          </a:xfrm>
+          <a:prstGeom prst="line">
+            <a:avLst/>
+          </a:prstGeom>
+        </p:spPr>
+        <p:style>
+          <a:lnRef idx="1">
+            <a:schemeClr val="accent1"/>
+          </a:lnRef>
+          <a:fillRef idx="0">
+            <a:schemeClr val="accent1"/>
+          </a:fillRef>
+          <a:effectRef idx="0">
+            <a:schemeClr val="accent1"/>
+          </a:effectRef>
+          <a:fontRef idx="minor">
+            <a:schemeClr val="tx1"/>
+          </a:fontRef>
+        </p:style>
+      </p:cxnSp>
+      <p:sp>
+        <p:nvSpPr>
+          <p:cNvPr id="98" name="TextBox 97">
+            <a:extLst>
+              <a:ext uri="{FF2B5EF4-FFF2-40B4-BE49-F238E27FC236}">
+                <a16:creationId xmlns:a16="http://schemas.microsoft.com/office/drawing/2014/main" id="{C364944A-3810-8343-8F26-6FBA77E05B2D}"/>
+              </a:ext>
+            </a:extLst>
+          </p:cNvPr>
+          <p:cNvSpPr txBox="1"/>
+          <p:nvPr/>
+        </p:nvSpPr>
+        <p:spPr>
+          <a:xfrm>
+            <a:off x="906692" y="4328070"/>
+            <a:ext cx="663643" cy="646331"/>
+          </a:xfrm>
+          <a:prstGeom prst="rect">
+            <a:avLst/>
+          </a:prstGeom>
+          <a:noFill/>
+        </p:spPr>
+        <p:txBody>
+          <a:bodyPr wrap="none" rtlCol="0">
+            <a:spAutoFit/>
+          </a:bodyPr>
+          <a:lstStyle/>
+          <a:p>
+            <a:pPr algn="ctr"/>
+            <a:r>
+              <a:rPr lang="en-US" dirty="0"/>
+              <a:t>Local</a:t>
+            </a:r>
+          </a:p>
+          <a:p>
+            <a:pPr algn="ctr"/>
+            <a:r>
+              <a:rPr lang="en-US" dirty="0"/>
+              <a:t>Ldr</a:t>
+            </a:r>
+          </a:p>
+        </p:txBody>
+      </p:sp>
+      <p:cxnSp>
+        <p:nvCxnSpPr>
+          <p:cNvPr id="103" name="Straight Connector 102">
+            <a:extLst>
+              <a:ext uri="{FF2B5EF4-FFF2-40B4-BE49-F238E27FC236}">
+                <a16:creationId xmlns:a16="http://schemas.microsoft.com/office/drawing/2014/main" id="{029BA5FF-11AE-2745-A347-7F83F33A1301}"/>
+              </a:ext>
+            </a:extLst>
+          </p:cNvPr>
+          <p:cNvCxnSpPr/>
+          <p:nvPr/>
+        </p:nvCxnSpPr>
+        <p:spPr>
+          <a:xfrm>
+            <a:off x="1238513" y="4974401"/>
+            <a:ext cx="0" cy="274691"/>
+          </a:xfrm>
+          <a:prstGeom prst="line">
+            <a:avLst/>
+          </a:prstGeom>
+        </p:spPr>
+        <p:style>
+          <a:lnRef idx="1">
+            <a:schemeClr val="accent1"/>
+          </a:lnRef>
+          <a:fillRef idx="0">
+            <a:schemeClr val="accent1"/>
+          </a:fillRef>
+          <a:effectRef idx="0">
+            <a:schemeClr val="accent1"/>
+          </a:effectRef>
+          <a:fontRef idx="minor">
+            <a:schemeClr val="tx1"/>
+          </a:fontRef>
+        </p:style>
+      </p:cxnSp>
+      <p:sp>
+        <p:nvSpPr>
+          <p:cNvPr id="104" name="TextBox 103">
+            <a:extLst>
+              <a:ext uri="{FF2B5EF4-FFF2-40B4-BE49-F238E27FC236}">
+                <a16:creationId xmlns:a16="http://schemas.microsoft.com/office/drawing/2014/main" id="{C68301C1-F563-8347-A9D3-20927D12128F}"/>
+              </a:ext>
+            </a:extLst>
+          </p:cNvPr>
+          <p:cNvSpPr txBox="1"/>
+          <p:nvPr/>
+        </p:nvSpPr>
+        <p:spPr>
+          <a:xfrm>
+            <a:off x="893964" y="3482394"/>
+            <a:ext cx="689099" cy="646331"/>
+          </a:xfrm>
+          <a:prstGeom prst="rect">
+            <a:avLst/>
+          </a:prstGeom>
+          <a:noFill/>
+        </p:spPr>
+        <p:txBody>
+          <a:bodyPr wrap="none" rtlCol="0">
+            <a:spAutoFit/>
+          </a:bodyPr>
+          <a:lstStyle/>
+          <a:p>
+            <a:r>
+              <a:rPr lang="en-US" dirty="0"/>
+              <a:t>Max</a:t>
+            </a:r>
+          </a:p>
+          <a:p>
+            <a:r>
+              <a:rPr lang="en-US" dirty="0"/>
+              <a:t>Procs</a:t>
+            </a:r>
+          </a:p>
+        </p:txBody>
+      </p:sp>
+      <p:cxnSp>
+        <p:nvCxnSpPr>
+          <p:cNvPr id="105" name="Straight Connector 104">
+            <a:extLst>
+              <a:ext uri="{FF2B5EF4-FFF2-40B4-BE49-F238E27FC236}">
+                <a16:creationId xmlns:a16="http://schemas.microsoft.com/office/drawing/2014/main" id="{836A3160-4106-664A-9371-892D8E973452}"/>
+              </a:ext>
+            </a:extLst>
+          </p:cNvPr>
+          <p:cNvCxnSpPr/>
+          <p:nvPr/>
+        </p:nvCxnSpPr>
+        <p:spPr>
+          <a:xfrm>
+            <a:off x="1238513" y="4128725"/>
+            <a:ext cx="0" cy="199345"/>
+          </a:xfrm>
+          <a:prstGeom prst="line">
+            <a:avLst/>
+          </a:prstGeom>
+        </p:spPr>
+        <p:style>
+          <a:lnRef idx="1">
+            <a:schemeClr val="accent1"/>
+          </a:lnRef>
+          <a:fillRef idx="0">
+            <a:schemeClr val="accent1"/>
+          </a:fillRef>
+          <a:effectRef idx="0">
+            <a:schemeClr val="accent1"/>
+          </a:effectRef>
+          <a:fontRef idx="minor">
+            <a:schemeClr val="tx1"/>
+          </a:fontRef>
+        </p:style>
+      </p:cxnSp>
+      <p:sp>
+        <p:nvSpPr>
+          <p:cNvPr id="107" name="TextBox 106">
+            <a:extLst>
+              <a:ext uri="{FF2B5EF4-FFF2-40B4-BE49-F238E27FC236}">
+                <a16:creationId xmlns:a16="http://schemas.microsoft.com/office/drawing/2014/main" id="{591E13DD-C01D-AF4C-9329-2B298758A6CB}"/>
+              </a:ext>
+            </a:extLst>
+          </p:cNvPr>
+          <p:cNvSpPr txBox="1"/>
+          <p:nvPr/>
+        </p:nvSpPr>
+        <p:spPr>
+          <a:xfrm>
+            <a:off x="664959" y="5299800"/>
+            <a:ext cx="1147109" cy="369332"/>
+          </a:xfrm>
+          <a:prstGeom prst="rect">
+            <a:avLst/>
+          </a:prstGeom>
+          <a:noFill/>
+        </p:spPr>
+        <p:txBody>
+          <a:bodyPr wrap="none" rtlCol="0">
+            <a:spAutoFit/>
+          </a:bodyPr>
+          <a:lstStyle/>
+          <a:p>
+            <a:r>
+              <a:rPr lang="en-US" dirty="0"/>
+              <a:t>Hostname</a:t>
+            </a:r>
+          </a:p>
+        </p:txBody>
+      </p:sp>
+      <p:cxnSp>
+        <p:nvCxnSpPr>
+          <p:cNvPr id="109" name="Straight Connector 108">
+            <a:extLst>
+              <a:ext uri="{FF2B5EF4-FFF2-40B4-BE49-F238E27FC236}">
+                <a16:creationId xmlns:a16="http://schemas.microsoft.com/office/drawing/2014/main" id="{4E118943-7F19-0043-9152-59C73B45A3DD}"/>
+              </a:ext>
+            </a:extLst>
+          </p:cNvPr>
+          <p:cNvCxnSpPr/>
+          <p:nvPr/>
+        </p:nvCxnSpPr>
+        <p:spPr>
+          <a:xfrm>
+            <a:off x="1238513" y="5669132"/>
+            <a:ext cx="0" cy="192804"/>
+          </a:xfrm>
+          <a:prstGeom prst="line">
+            <a:avLst/>
+          </a:prstGeom>
+        </p:spPr>
+        <p:style>
+          <a:lnRef idx="1">
+            <a:schemeClr val="accent1"/>
+          </a:lnRef>
+          <a:fillRef idx="0">
+            <a:schemeClr val="accent1"/>
+          </a:fillRef>
+          <a:effectRef idx="0">
+            <a:schemeClr val="accent1"/>
+          </a:effectRef>
+          <a:fontRef idx="minor">
+            <a:schemeClr val="tx1"/>
+          </a:fontRef>
+        </p:style>
+      </p:cxnSp>
+      <p:cxnSp>
+        <p:nvCxnSpPr>
+          <p:cNvPr id="46" name="Straight Connector 45">
+            <a:extLst>
+              <a:ext uri="{FF2B5EF4-FFF2-40B4-BE49-F238E27FC236}">
+                <a16:creationId xmlns:a16="http://schemas.microsoft.com/office/drawing/2014/main" id="{9297217F-E776-A649-87C3-3BB2E17974A9}"/>
+              </a:ext>
+            </a:extLst>
+          </p:cNvPr>
+          <p:cNvCxnSpPr>
+            <a:cxnSpLocks/>
+            <a:stCxn id="19" idx="3"/>
+            <a:endCxn id="38" idx="1"/>
+          </p:cNvCxnSpPr>
+          <p:nvPr/>
+        </p:nvCxnSpPr>
+        <p:spPr>
+          <a:xfrm flipV="1">
+            <a:off x="3713293" y="1035684"/>
+            <a:ext cx="226122" cy="1"/>
+          </a:xfrm>
+          <a:prstGeom prst="line">
+            <a:avLst/>
+          </a:prstGeom>
+        </p:spPr>
+        <p:style>
+          <a:lnRef idx="1">
+            <a:schemeClr val="accent1"/>
+          </a:lnRef>
+          <a:fillRef idx="0">
+            <a:schemeClr val="accent1"/>
+          </a:fillRef>
+          <a:effectRef idx="0">
+            <a:schemeClr val="accent1"/>
+          </a:effectRef>
+          <a:fontRef idx="minor">
+            <a:schemeClr val="tx1"/>
+          </a:fontRef>
+        </p:style>
+      </p:cxnSp>
+      <p:cxnSp>
+        <p:nvCxnSpPr>
+          <p:cNvPr id="48" name="Straight Connector 47">
+            <a:extLst>
+              <a:ext uri="{FF2B5EF4-FFF2-40B4-BE49-F238E27FC236}">
+                <a16:creationId xmlns:a16="http://schemas.microsoft.com/office/drawing/2014/main" id="{8382D462-55A7-7C4B-B09F-013187683700}"/>
+              </a:ext>
+            </a:extLst>
+          </p:cNvPr>
+          <p:cNvCxnSpPr>
+            <a:cxnSpLocks/>
+            <a:stCxn id="49" idx="3"/>
+          </p:cNvCxnSpPr>
+          <p:nvPr/>
+        </p:nvCxnSpPr>
+        <p:spPr>
+          <a:xfrm>
+            <a:off x="5214185" y="1035684"/>
+            <a:ext cx="358712" cy="0"/>
           </a:xfrm>
           <a:prstGeom prst="line">
             <a:avLst/>
@@ -6191,10 +6880,10 @@
       </p:grpSpPr>
       <p:pic>
         <p:nvPicPr>
-          <p:cNvPr id="2" name="Picture 1">
-            <a:extLst>
-              <a:ext uri="{FF2B5EF4-FFF2-40B4-BE49-F238E27FC236}">
-                <a16:creationId xmlns:a16="http://schemas.microsoft.com/office/drawing/2014/main" id="{D51E8901-6623-A143-AB69-50DEC0E7E1F1}"/>
+          <p:cNvPr id="4" name="Picture 3">
+            <a:extLst>
+              <a:ext uri="{FF2B5EF4-FFF2-40B4-BE49-F238E27FC236}">
+                <a16:creationId xmlns:a16="http://schemas.microsoft.com/office/drawing/2014/main" id="{5110F769-AD01-CB40-8BE9-C3CE95591BD8}"/>
               </a:ext>
             </a:extLst>
           </p:cNvPr>
@@ -6211,8 +6900,8 @@
         </p:blipFill>
         <p:spPr>
           <a:xfrm>
-            <a:off x="157480" y="260350"/>
-            <a:ext cx="8470900" cy="6337300"/>
+            <a:off x="2165350" y="450850"/>
+            <a:ext cx="7861300" cy="5956300"/>
           </a:xfrm>
           <a:prstGeom prst="rect">
             <a:avLst/>
@@ -6251,10 +6940,10 @@
       </p:grpSpPr>
       <p:pic>
         <p:nvPicPr>
-          <p:cNvPr id="5" name="Picture 4">
-            <a:extLst>
-              <a:ext uri="{FF2B5EF4-FFF2-40B4-BE49-F238E27FC236}">
-                <a16:creationId xmlns:a16="http://schemas.microsoft.com/office/drawing/2014/main" id="{115EDD8A-2E55-A542-B220-F16E65B95950}"/>
+          <p:cNvPr id="3" name="Picture 2">
+            <a:extLst>
+              <a:ext uri="{FF2B5EF4-FFF2-40B4-BE49-F238E27FC236}">
+                <a16:creationId xmlns:a16="http://schemas.microsoft.com/office/drawing/2014/main" id="{32F6E2A8-036B-1543-8D46-C06D7943EFB3}"/>
               </a:ext>
             </a:extLst>
           </p:cNvPr>
@@ -6271,8 +6960,8 @@
         </p:blipFill>
         <p:spPr>
           <a:xfrm>
-            <a:off x="468630" y="254000"/>
-            <a:ext cx="7391400" cy="6464300"/>
+            <a:off x="2705100" y="450850"/>
+            <a:ext cx="6781800" cy="5956300"/>
           </a:xfrm>
           <a:prstGeom prst="rect">
             <a:avLst/>
@@ -6311,10 +7000,10 @@
       </p:grpSpPr>
       <p:pic>
         <p:nvPicPr>
-          <p:cNvPr id="2" name="Picture 1">
-            <a:extLst>
-              <a:ext uri="{FF2B5EF4-FFF2-40B4-BE49-F238E27FC236}">
-                <a16:creationId xmlns:a16="http://schemas.microsoft.com/office/drawing/2014/main" id="{B72365FC-C5BC-4F4F-94C7-60B514829B72}"/>
+          <p:cNvPr id="5" name="Picture 4">
+            <a:extLst>
+              <a:ext uri="{FF2B5EF4-FFF2-40B4-BE49-F238E27FC236}">
+                <a16:creationId xmlns:a16="http://schemas.microsoft.com/office/drawing/2014/main" id="{06047370-8C47-214F-9D09-022A0138440C}"/>
               </a:ext>
             </a:extLst>
           </p:cNvPr>
@@ -6331,8 +7020,8 @@
         </p:blipFill>
         <p:spPr>
           <a:xfrm>
-            <a:off x="1018540" y="392430"/>
-            <a:ext cx="6794500" cy="5524500"/>
+            <a:off x="3581400" y="450850"/>
+            <a:ext cx="5029200" cy="5956300"/>
           </a:xfrm>
           <a:prstGeom prst="rect">
             <a:avLst/>
@@ -6343,6 +7032,66 @@
     <p:extLst>
       <p:ext uri="{BB962C8B-B14F-4D97-AF65-F5344CB8AC3E}">
         <p14:creationId xmlns:p14="http://schemas.microsoft.com/office/powerpoint/2010/main" val="3071618879"/>
+      </p:ext>
+    </p:extLst>
+  </p:cSld>
+  <p:clrMapOvr>
+    <a:masterClrMapping/>
+  </p:clrMapOvr>
+</p:sld>
+</file>
+
+<file path=ppt/slides/slide5.xml><?xml version="1.0" encoding="utf-8"?>
+<p:sld xmlns:a="http://schemas.openxmlformats.org/drawingml/2006/main" xmlns:r="http://schemas.openxmlformats.org/officeDocument/2006/relationships" xmlns:p="http://schemas.openxmlformats.org/presentationml/2006/main">
+  <p:cSld>
+    <p:spTree>
+      <p:nvGrpSpPr>
+        <p:cNvPr id="1" name=""/>
+        <p:cNvGrpSpPr/>
+        <p:nvPr/>
+      </p:nvGrpSpPr>
+      <p:grpSpPr>
+        <a:xfrm>
+          <a:off x="0" y="0"/>
+          <a:ext cx="0" cy="0"/>
+          <a:chOff x="0" y="0"/>
+          <a:chExt cx="0" cy="0"/>
+        </a:xfrm>
+      </p:grpSpPr>
+      <p:pic>
+        <p:nvPicPr>
+          <p:cNvPr id="7" name="Picture 6">
+            <a:extLst>
+              <a:ext uri="{FF2B5EF4-FFF2-40B4-BE49-F238E27FC236}">
+                <a16:creationId xmlns:a16="http://schemas.microsoft.com/office/drawing/2014/main" id="{EC3122CA-186A-4444-A88F-502125CAC83C}"/>
+              </a:ext>
+            </a:extLst>
+          </p:cNvPr>
+          <p:cNvPicPr>
+            <a:picLocks noChangeAspect="1"/>
+          </p:cNvPicPr>
+          <p:nvPr/>
+        </p:nvPicPr>
+        <p:blipFill>
+          <a:blip r:embed="rId2"/>
+          <a:stretch>
+            <a:fillRect/>
+          </a:stretch>
+        </p:blipFill>
+        <p:spPr>
+          <a:xfrm>
+            <a:off x="4311650" y="450850"/>
+            <a:ext cx="3568700" cy="5956300"/>
+          </a:xfrm>
+          <a:prstGeom prst="rect">
+            <a:avLst/>
+          </a:prstGeom>
+        </p:spPr>
+      </p:pic>
+    </p:spTree>
+    <p:extLst>
+      <p:ext uri="{BB962C8B-B14F-4D97-AF65-F5344CB8AC3E}">
+        <p14:creationId xmlns:p14="http://schemas.microsoft.com/office/powerpoint/2010/main" val="2906055141"/>
       </p:ext>
     </p:extLst>
   </p:cSld>

</xml_diff>

<commit_message>
Report supported attributes for specified functions
Provide a mechanism by which users can request a list of the supported
attributes for a given function. Add a new API by which the host
environment can register their support - the PMIx library will register
its own supported attributes internally during init.

Signed-off-by: Ralph Castain <rhc@pmix.org>

Extend pmix_regattr_t per discussion

Include both human-readable and machine-parsable descriptions of valid
values. Add attributes for PMIX_MAX_VALUE, PMIX_MIN_VALUE, and
PMIX_ENUM_VALUE to support the machine-parsable descriptions so they can
be provided in their native type (e.g., integer) instead of strings.

NOTE: will need to adjust the PMIX_REGATTR_LOAD macro to handle
machine-parsable descriptions

Signed-off-by: Ralph Castain <rhc@pmix.org>
</commit_message>
<xml_diff>
--- a/figs/drawings.pptx
+++ b/figs/drawings.pptx
@@ -10,6 +10,7 @@
     <p:sldId id="258" r:id="rId4"/>
     <p:sldId id="257" r:id="rId5"/>
     <p:sldId id="260" r:id="rId6"/>
+    <p:sldId id="261" r:id="rId7"/>
   </p:sldIdLst>
   <p:sldSz cx="12192000" cy="6858000"/>
   <p:notesSz cx="6858000" cy="9144000"/>
@@ -263,7 +264,7 @@
           <a:p>
             <a:fld id="{4597F392-DBDF-6842-8400-5A8310564639}" type="datetimeFigureOut">
               <a:rPr lang="en-US" smtClean="0"/>
-              <a:t>1/16/19</a:t>
+              <a:t>1/25/19</a:t>
             </a:fld>
             <a:endParaRPr lang="en-US" dirty="0"/>
           </a:p>
@@ -461,7 +462,7 @@
           <a:p>
             <a:fld id="{4597F392-DBDF-6842-8400-5A8310564639}" type="datetimeFigureOut">
               <a:rPr lang="en-US" smtClean="0"/>
-              <a:t>1/16/19</a:t>
+              <a:t>1/25/19</a:t>
             </a:fld>
             <a:endParaRPr lang="en-US" dirty="0"/>
           </a:p>
@@ -669,7 +670,7 @@
           <a:p>
             <a:fld id="{4597F392-DBDF-6842-8400-5A8310564639}" type="datetimeFigureOut">
               <a:rPr lang="en-US" smtClean="0"/>
-              <a:t>1/16/19</a:t>
+              <a:t>1/25/19</a:t>
             </a:fld>
             <a:endParaRPr lang="en-US" dirty="0"/>
           </a:p>
@@ -867,7 +868,7 @@
           <a:p>
             <a:fld id="{4597F392-DBDF-6842-8400-5A8310564639}" type="datetimeFigureOut">
               <a:rPr lang="en-US" smtClean="0"/>
-              <a:t>1/16/19</a:t>
+              <a:t>1/25/19</a:t>
             </a:fld>
             <a:endParaRPr lang="en-US" dirty="0"/>
           </a:p>
@@ -1142,7 +1143,7 @@
           <a:p>
             <a:fld id="{4597F392-DBDF-6842-8400-5A8310564639}" type="datetimeFigureOut">
               <a:rPr lang="en-US" smtClean="0"/>
-              <a:t>1/16/19</a:t>
+              <a:t>1/25/19</a:t>
             </a:fld>
             <a:endParaRPr lang="en-US" dirty="0"/>
           </a:p>
@@ -1407,7 +1408,7 @@
           <a:p>
             <a:fld id="{4597F392-DBDF-6842-8400-5A8310564639}" type="datetimeFigureOut">
               <a:rPr lang="en-US" smtClean="0"/>
-              <a:t>1/16/19</a:t>
+              <a:t>1/25/19</a:t>
             </a:fld>
             <a:endParaRPr lang="en-US" dirty="0"/>
           </a:p>
@@ -1819,7 +1820,7 @@
           <a:p>
             <a:fld id="{4597F392-DBDF-6842-8400-5A8310564639}" type="datetimeFigureOut">
               <a:rPr lang="en-US" smtClean="0"/>
-              <a:t>1/16/19</a:t>
+              <a:t>1/25/19</a:t>
             </a:fld>
             <a:endParaRPr lang="en-US" dirty="0"/>
           </a:p>
@@ -1960,7 +1961,7 @@
           <a:p>
             <a:fld id="{4597F392-DBDF-6842-8400-5A8310564639}" type="datetimeFigureOut">
               <a:rPr lang="en-US" smtClean="0"/>
-              <a:t>1/16/19</a:t>
+              <a:t>1/25/19</a:t>
             </a:fld>
             <a:endParaRPr lang="en-US" dirty="0"/>
           </a:p>
@@ -2073,7 +2074,7 @@
           <a:p>
             <a:fld id="{4597F392-DBDF-6842-8400-5A8310564639}" type="datetimeFigureOut">
               <a:rPr lang="en-US" smtClean="0"/>
-              <a:t>1/16/19</a:t>
+              <a:t>1/25/19</a:t>
             </a:fld>
             <a:endParaRPr lang="en-US" dirty="0"/>
           </a:p>
@@ -2384,7 +2385,7 @@
           <a:p>
             <a:fld id="{4597F392-DBDF-6842-8400-5A8310564639}" type="datetimeFigureOut">
               <a:rPr lang="en-US" smtClean="0"/>
-              <a:t>1/16/19</a:t>
+              <a:t>1/25/19</a:t>
             </a:fld>
             <a:endParaRPr lang="en-US" dirty="0"/>
           </a:p>
@@ -2672,7 +2673,7 @@
           <a:p>
             <a:fld id="{4597F392-DBDF-6842-8400-5A8310564639}" type="datetimeFigureOut">
               <a:rPr lang="en-US" smtClean="0"/>
-              <a:t>1/16/19</a:t>
+              <a:t>1/25/19</a:t>
             </a:fld>
             <a:endParaRPr lang="en-US" dirty="0"/>
           </a:p>
@@ -2913,7 +2914,7 @@
           <a:p>
             <a:fld id="{4597F392-DBDF-6842-8400-5A8310564639}" type="datetimeFigureOut">
               <a:rPr lang="en-US" smtClean="0"/>
-              <a:t>1/16/19</a:t>
+              <a:t>1/25/19</a:t>
             </a:fld>
             <a:endParaRPr lang="en-US" dirty="0"/>
           </a:p>
@@ -7101,6 +7102,1788 @@
 </p:sld>
 </file>
 
+<file path=ppt/slides/slide6.xml><?xml version="1.0" encoding="utf-8"?>
+<p:sld xmlns:a="http://schemas.openxmlformats.org/drawingml/2006/main" xmlns:r="http://schemas.openxmlformats.org/officeDocument/2006/relationships" xmlns:p="http://schemas.openxmlformats.org/presentationml/2006/main">
+  <p:cSld>
+    <p:spTree>
+      <p:nvGrpSpPr>
+        <p:cNvPr id="1" name=""/>
+        <p:cNvGrpSpPr/>
+        <p:nvPr/>
+      </p:nvGrpSpPr>
+      <p:grpSpPr>
+        <a:xfrm>
+          <a:off x="0" y="0"/>
+          <a:ext cx="0" cy="0"/>
+          <a:chOff x="0" y="0"/>
+          <a:chExt cx="0" cy="0"/>
+        </a:xfrm>
+      </p:grpSpPr>
+      <p:sp>
+        <p:nvSpPr>
+          <p:cNvPr id="4" name="TextBox 3">
+            <a:extLst>
+              <a:ext uri="{FF2B5EF4-FFF2-40B4-BE49-F238E27FC236}">
+                <a16:creationId xmlns:a16="http://schemas.microsoft.com/office/drawing/2014/main" id="{A3483589-1922-6F42-83C8-650708800853}"/>
+              </a:ext>
+            </a:extLst>
+          </p:cNvPr>
+          <p:cNvSpPr txBox="1"/>
+          <p:nvPr/>
+        </p:nvSpPr>
+        <p:spPr>
+          <a:xfrm>
+            <a:off x="1151085" y="851018"/>
+            <a:ext cx="1109984" cy="369332"/>
+          </a:xfrm>
+          <a:prstGeom prst="rect">
+            <a:avLst/>
+          </a:prstGeom>
+          <a:noFill/>
+          <a:ln w="28575">
+            <a:solidFill>
+              <a:srgbClr val="00B050"/>
+            </a:solidFill>
+          </a:ln>
+        </p:spPr>
+        <p:txBody>
+          <a:bodyPr wrap="none" rtlCol="0">
+            <a:spAutoFit/>
+          </a:bodyPr>
+          <a:lstStyle/>
+          <a:p>
+            <a:r>
+              <a:rPr lang="en-US" dirty="0"/>
+              <a:t>PMIx_Get</a:t>
+            </a:r>
+          </a:p>
+        </p:txBody>
+      </p:sp>
+      <p:sp>
+        <p:nvSpPr>
+          <p:cNvPr id="5" name="TextBox 4">
+            <a:extLst>
+              <a:ext uri="{FF2B5EF4-FFF2-40B4-BE49-F238E27FC236}">
+                <a16:creationId xmlns:a16="http://schemas.microsoft.com/office/drawing/2014/main" id="{B57A6A91-4113-D846-9746-0684BB02A3B8}"/>
+              </a:ext>
+            </a:extLst>
+          </p:cNvPr>
+          <p:cNvSpPr txBox="1"/>
+          <p:nvPr/>
+        </p:nvSpPr>
+        <p:spPr>
+          <a:xfrm>
+            <a:off x="1343093" y="1721795"/>
+            <a:ext cx="725968" cy="646331"/>
+          </a:xfrm>
+          <a:prstGeom prst="rect">
+            <a:avLst/>
+          </a:prstGeom>
+          <a:noFill/>
+          <a:ln w="28575">
+            <a:solidFill>
+              <a:srgbClr val="00B050"/>
+            </a:solidFill>
+          </a:ln>
+        </p:spPr>
+        <p:txBody>
+          <a:bodyPr wrap="none" rtlCol="0">
+            <a:spAutoFit/>
+          </a:bodyPr>
+          <a:lstStyle/>
+          <a:p>
+            <a:pPr algn="ctr"/>
+            <a:r>
+              <a:rPr lang="en-US" dirty="0"/>
+              <a:t>Client</a:t>
+            </a:r>
+          </a:p>
+          <a:p>
+            <a:pPr algn="ctr"/>
+            <a:r>
+              <a:rPr lang="en-US" dirty="0"/>
+              <a:t>Level</a:t>
+            </a:r>
+          </a:p>
+        </p:txBody>
+      </p:sp>
+      <p:sp>
+        <p:nvSpPr>
+          <p:cNvPr id="6" name="TextBox 5">
+            <a:extLst>
+              <a:ext uri="{FF2B5EF4-FFF2-40B4-BE49-F238E27FC236}">
+                <a16:creationId xmlns:a16="http://schemas.microsoft.com/office/drawing/2014/main" id="{06C79402-E2BB-D742-8F94-B9A21876D25C}"/>
+              </a:ext>
+            </a:extLst>
+          </p:cNvPr>
+          <p:cNvSpPr txBox="1"/>
+          <p:nvPr/>
+        </p:nvSpPr>
+        <p:spPr>
+          <a:xfrm>
+            <a:off x="1313245" y="2869572"/>
+            <a:ext cx="785664" cy="646331"/>
+          </a:xfrm>
+          <a:prstGeom prst="rect">
+            <a:avLst/>
+          </a:prstGeom>
+          <a:noFill/>
+          <a:ln w="28575">
+            <a:solidFill>
+              <a:srgbClr val="00B050"/>
+            </a:solidFill>
+          </a:ln>
+        </p:spPr>
+        <p:txBody>
+          <a:bodyPr wrap="none" rtlCol="0">
+            <a:spAutoFit/>
+          </a:bodyPr>
+          <a:lstStyle/>
+          <a:p>
+            <a:pPr algn="ctr"/>
+            <a:r>
+              <a:rPr lang="en-US" dirty="0"/>
+              <a:t>Server</a:t>
+            </a:r>
+          </a:p>
+          <a:p>
+            <a:pPr algn="ctr"/>
+            <a:r>
+              <a:rPr lang="en-US" dirty="0"/>
+              <a:t>Level</a:t>
+            </a:r>
+          </a:p>
+        </p:txBody>
+      </p:sp>
+      <p:cxnSp>
+        <p:nvCxnSpPr>
+          <p:cNvPr id="11" name="Straight Connector 10">
+            <a:extLst>
+              <a:ext uri="{FF2B5EF4-FFF2-40B4-BE49-F238E27FC236}">
+                <a16:creationId xmlns:a16="http://schemas.microsoft.com/office/drawing/2014/main" id="{A85FB9B0-F0F8-434D-A732-B9F83A8B1549}"/>
+              </a:ext>
+            </a:extLst>
+          </p:cNvPr>
+          <p:cNvCxnSpPr>
+            <a:stCxn id="4" idx="2"/>
+            <a:endCxn id="5" idx="0"/>
+          </p:cNvCxnSpPr>
+          <p:nvPr/>
+        </p:nvCxnSpPr>
+        <p:spPr>
+          <a:xfrm>
+            <a:off x="1706077" y="1220350"/>
+            <a:ext cx="0" cy="501445"/>
+          </a:xfrm>
+          <a:prstGeom prst="line">
+            <a:avLst/>
+          </a:prstGeom>
+          <a:ln/>
+        </p:spPr>
+        <p:style>
+          <a:lnRef idx="3">
+            <a:schemeClr val="accent2"/>
+          </a:lnRef>
+          <a:fillRef idx="0">
+            <a:schemeClr val="accent2"/>
+          </a:fillRef>
+          <a:effectRef idx="2">
+            <a:schemeClr val="accent2"/>
+          </a:effectRef>
+          <a:fontRef idx="minor">
+            <a:schemeClr val="tx1"/>
+          </a:fontRef>
+        </p:style>
+      </p:cxnSp>
+      <p:cxnSp>
+        <p:nvCxnSpPr>
+          <p:cNvPr id="13" name="Straight Connector 12">
+            <a:extLst>
+              <a:ext uri="{FF2B5EF4-FFF2-40B4-BE49-F238E27FC236}">
+                <a16:creationId xmlns:a16="http://schemas.microsoft.com/office/drawing/2014/main" id="{41F133E3-4D70-CB47-8A8B-32756BA9223D}"/>
+              </a:ext>
+            </a:extLst>
+          </p:cNvPr>
+          <p:cNvCxnSpPr>
+            <a:stCxn id="5" idx="2"/>
+            <a:endCxn id="6" idx="0"/>
+          </p:cNvCxnSpPr>
+          <p:nvPr/>
+        </p:nvCxnSpPr>
+        <p:spPr>
+          <a:xfrm>
+            <a:off x="1706077" y="2368126"/>
+            <a:ext cx="0" cy="501446"/>
+          </a:xfrm>
+          <a:prstGeom prst="line">
+            <a:avLst/>
+          </a:prstGeom>
+          <a:ln/>
+        </p:spPr>
+        <p:style>
+          <a:lnRef idx="3">
+            <a:schemeClr val="accent2"/>
+          </a:lnRef>
+          <a:fillRef idx="0">
+            <a:schemeClr val="accent2"/>
+          </a:fillRef>
+          <a:effectRef idx="2">
+            <a:schemeClr val="accent2"/>
+          </a:effectRef>
+          <a:fontRef idx="minor">
+            <a:schemeClr val="tx1"/>
+          </a:fontRef>
+        </p:style>
+      </p:cxnSp>
+      <p:cxnSp>
+        <p:nvCxnSpPr>
+          <p:cNvPr id="17" name="Straight Connector 16">
+            <a:extLst>
+              <a:ext uri="{FF2B5EF4-FFF2-40B4-BE49-F238E27FC236}">
+                <a16:creationId xmlns:a16="http://schemas.microsoft.com/office/drawing/2014/main" id="{94462E16-F161-4E45-A504-D8A410F9BE50}"/>
+              </a:ext>
+            </a:extLst>
+          </p:cNvPr>
+          <p:cNvCxnSpPr/>
+          <p:nvPr/>
+        </p:nvCxnSpPr>
+        <p:spPr>
+          <a:xfrm>
+            <a:off x="1400096" y="4032736"/>
+            <a:ext cx="551748" cy="0"/>
+          </a:xfrm>
+          <a:prstGeom prst="line">
+            <a:avLst/>
+          </a:prstGeom>
+        </p:spPr>
+        <p:style>
+          <a:lnRef idx="3">
+            <a:schemeClr val="accent2"/>
+          </a:lnRef>
+          <a:fillRef idx="0">
+            <a:schemeClr val="accent2"/>
+          </a:fillRef>
+          <a:effectRef idx="2">
+            <a:schemeClr val="accent2"/>
+          </a:effectRef>
+          <a:fontRef idx="minor">
+            <a:schemeClr val="tx1"/>
+          </a:fontRef>
+        </p:style>
+      </p:cxnSp>
+      <p:sp>
+        <p:nvSpPr>
+          <p:cNvPr id="18" name="TextBox 17">
+            <a:extLst>
+              <a:ext uri="{FF2B5EF4-FFF2-40B4-BE49-F238E27FC236}">
+                <a16:creationId xmlns:a16="http://schemas.microsoft.com/office/drawing/2014/main" id="{7741446F-188A-2041-AD56-5E189011FCAB}"/>
+              </a:ext>
+            </a:extLst>
+          </p:cNvPr>
+          <p:cNvSpPr txBox="1"/>
+          <p:nvPr/>
+        </p:nvSpPr>
+        <p:spPr>
+          <a:xfrm>
+            <a:off x="2020661" y="3878848"/>
+            <a:ext cx="938462" cy="307777"/>
+          </a:xfrm>
+          <a:prstGeom prst="rect">
+            <a:avLst/>
+          </a:prstGeom>
+          <a:noFill/>
+        </p:spPr>
+        <p:txBody>
+          <a:bodyPr wrap="none" rtlCol="0">
+            <a:spAutoFit/>
+          </a:bodyPr>
+          <a:lstStyle/>
+          <a:p>
+            <a:r>
+              <a:rPr lang="en-US" sz="1400" dirty="0"/>
+              <a:t>Data array</a:t>
+            </a:r>
+          </a:p>
+        </p:txBody>
+      </p:sp>
+      <p:sp>
+        <p:nvSpPr>
+          <p:cNvPr id="19" name="Rectangle 18">
+            <a:extLst>
+              <a:ext uri="{FF2B5EF4-FFF2-40B4-BE49-F238E27FC236}">
+                <a16:creationId xmlns:a16="http://schemas.microsoft.com/office/drawing/2014/main" id="{F3DF7FAC-11CE-0C44-A079-86786780F889}"/>
+              </a:ext>
+            </a:extLst>
+          </p:cNvPr>
+          <p:cNvSpPr/>
+          <p:nvPr/>
+        </p:nvSpPr>
+        <p:spPr>
+          <a:xfrm>
+            <a:off x="1400096" y="4219218"/>
+            <a:ext cx="551748" cy="253484"/>
+          </a:xfrm>
+          <a:prstGeom prst="rect">
+            <a:avLst/>
+          </a:prstGeom>
+          <a:noFill/>
+          <a:ln w="28575">
+            <a:solidFill>
+              <a:srgbClr val="00B050"/>
+            </a:solidFill>
+          </a:ln>
+        </p:spPr>
+        <p:style>
+          <a:lnRef idx="2">
+            <a:schemeClr val="accent1">
+              <a:shade val="50000"/>
+            </a:schemeClr>
+          </a:lnRef>
+          <a:fillRef idx="1">
+            <a:schemeClr val="accent1"/>
+          </a:fillRef>
+          <a:effectRef idx="0">
+            <a:schemeClr val="accent1"/>
+          </a:effectRef>
+          <a:fontRef idx="minor">
+            <a:schemeClr val="lt1"/>
+          </a:fontRef>
+        </p:style>
+        <p:txBody>
+          <a:bodyPr rtlCol="0" anchor="ctr"/>
+          <a:lstStyle/>
+          <a:p>
+            <a:pPr algn="ctr"/>
+            <a:endParaRPr lang="en-US" dirty="0"/>
+          </a:p>
+        </p:txBody>
+      </p:sp>
+      <p:sp>
+        <p:nvSpPr>
+          <p:cNvPr id="20" name="TextBox 19">
+            <a:extLst>
+              <a:ext uri="{FF2B5EF4-FFF2-40B4-BE49-F238E27FC236}">
+                <a16:creationId xmlns:a16="http://schemas.microsoft.com/office/drawing/2014/main" id="{A9506E9B-AE8B-2945-944E-AF7979175CC7}"/>
+              </a:ext>
+            </a:extLst>
+          </p:cNvPr>
+          <p:cNvSpPr txBox="1"/>
+          <p:nvPr/>
+        </p:nvSpPr>
+        <p:spPr>
+          <a:xfrm>
+            <a:off x="2020661" y="4192072"/>
+            <a:ext cx="1063112" cy="307777"/>
+          </a:xfrm>
+          <a:prstGeom prst="rect">
+            <a:avLst/>
+          </a:prstGeom>
+          <a:noFill/>
+        </p:spPr>
+        <p:txBody>
+          <a:bodyPr wrap="none" rtlCol="0">
+            <a:spAutoFit/>
+          </a:bodyPr>
+          <a:lstStyle/>
+          <a:p>
+            <a:r>
+              <a:rPr lang="en-US" sz="1400" dirty="0"/>
+              <a:t>pmix_info_t</a:t>
+            </a:r>
+          </a:p>
+        </p:txBody>
+      </p:sp>
+      <p:sp>
+        <p:nvSpPr>
+          <p:cNvPr id="21" name="TextBox 20">
+            <a:extLst>
+              <a:ext uri="{FF2B5EF4-FFF2-40B4-BE49-F238E27FC236}">
+                <a16:creationId xmlns:a16="http://schemas.microsoft.com/office/drawing/2014/main" id="{9F7DCBBB-3EEB-8047-A18D-280D464A30A8}"/>
+              </a:ext>
+            </a:extLst>
+          </p:cNvPr>
+          <p:cNvSpPr txBox="1"/>
+          <p:nvPr/>
+        </p:nvSpPr>
+        <p:spPr>
+          <a:xfrm>
+            <a:off x="178517" y="254831"/>
+            <a:ext cx="881395" cy="523220"/>
+          </a:xfrm>
+          <a:prstGeom prst="rect">
+            <a:avLst/>
+          </a:prstGeom>
+          <a:noFill/>
+        </p:spPr>
+        <p:txBody>
+          <a:bodyPr wrap="none" rtlCol="0">
+            <a:spAutoFit/>
+          </a:bodyPr>
+          <a:lstStyle/>
+          <a:p>
+            <a:pPr algn="ctr"/>
+            <a:r>
+              <a:rPr lang="en-US" sz="1400" dirty="0"/>
+              <a:t>Returned</a:t>
+            </a:r>
+          </a:p>
+          <a:p>
+            <a:pPr algn="ctr"/>
+            <a:r>
+              <a:rPr lang="en-US" sz="1400" dirty="0"/>
+              <a:t>Info array</a:t>
+            </a:r>
+          </a:p>
+        </p:txBody>
+      </p:sp>
+      <p:cxnSp>
+        <p:nvCxnSpPr>
+          <p:cNvPr id="23" name="Elbow Connector 22">
+            <a:extLst>
+              <a:ext uri="{FF2B5EF4-FFF2-40B4-BE49-F238E27FC236}">
+                <a16:creationId xmlns:a16="http://schemas.microsoft.com/office/drawing/2014/main" id="{E3056230-0D04-A04B-AFBB-6E470BF6FA0F}"/>
+              </a:ext>
+            </a:extLst>
+          </p:cNvPr>
+          <p:cNvCxnSpPr>
+            <a:stCxn id="21" idx="2"/>
+            <a:endCxn id="4" idx="1"/>
+          </p:cNvCxnSpPr>
+          <p:nvPr/>
+        </p:nvCxnSpPr>
+        <p:spPr>
+          <a:xfrm rot="16200000" flipH="1">
+            <a:off x="756334" y="640932"/>
+            <a:ext cx="257633" cy="531870"/>
+          </a:xfrm>
+          <a:prstGeom prst="bentConnector2">
+            <a:avLst/>
+          </a:prstGeom>
+        </p:spPr>
+        <p:style>
+          <a:lnRef idx="1">
+            <a:schemeClr val="accent1"/>
+          </a:lnRef>
+          <a:fillRef idx="0">
+            <a:schemeClr val="accent1"/>
+          </a:fillRef>
+          <a:effectRef idx="0">
+            <a:schemeClr val="accent1"/>
+          </a:effectRef>
+          <a:fontRef idx="minor">
+            <a:schemeClr val="tx1"/>
+          </a:fontRef>
+        </p:style>
+      </p:cxnSp>
+      <p:sp>
+        <p:nvSpPr>
+          <p:cNvPr id="24" name="Rectangle 23">
+            <a:extLst>
+              <a:ext uri="{FF2B5EF4-FFF2-40B4-BE49-F238E27FC236}">
+                <a16:creationId xmlns:a16="http://schemas.microsoft.com/office/drawing/2014/main" id="{AA07468E-C8F5-D744-BB4B-D8D246D25617}"/>
+              </a:ext>
+            </a:extLst>
+          </p:cNvPr>
+          <p:cNvSpPr/>
+          <p:nvPr/>
+        </p:nvSpPr>
+        <p:spPr>
+          <a:xfrm>
+            <a:off x="1400096" y="4613759"/>
+            <a:ext cx="551748" cy="253484"/>
+          </a:xfrm>
+          <a:prstGeom prst="rect">
+            <a:avLst/>
+          </a:prstGeom>
+          <a:noFill/>
+          <a:ln w="28575">
+            <a:solidFill>
+              <a:srgbClr val="FF0000"/>
+            </a:solidFill>
+          </a:ln>
+        </p:spPr>
+        <p:style>
+          <a:lnRef idx="2">
+            <a:schemeClr val="accent1">
+              <a:shade val="50000"/>
+            </a:schemeClr>
+          </a:lnRef>
+          <a:fillRef idx="1">
+            <a:schemeClr val="accent1"/>
+          </a:fillRef>
+          <a:effectRef idx="0">
+            <a:schemeClr val="accent1"/>
+          </a:effectRef>
+          <a:fontRef idx="minor">
+            <a:schemeClr val="lt1"/>
+          </a:fontRef>
+        </p:style>
+        <p:txBody>
+          <a:bodyPr rtlCol="0" anchor="ctr"/>
+          <a:lstStyle/>
+          <a:p>
+            <a:pPr algn="ctr"/>
+            <a:endParaRPr lang="en-US" dirty="0"/>
+          </a:p>
+        </p:txBody>
+      </p:sp>
+      <p:sp>
+        <p:nvSpPr>
+          <p:cNvPr id="25" name="TextBox 24">
+            <a:extLst>
+              <a:ext uri="{FF2B5EF4-FFF2-40B4-BE49-F238E27FC236}">
+                <a16:creationId xmlns:a16="http://schemas.microsoft.com/office/drawing/2014/main" id="{823EAB2E-28BA-9C48-B78B-E44D80D53DF0}"/>
+              </a:ext>
+            </a:extLst>
+          </p:cNvPr>
+          <p:cNvSpPr txBox="1"/>
+          <p:nvPr/>
+        </p:nvSpPr>
+        <p:spPr>
+          <a:xfrm>
+            <a:off x="2020661" y="4586613"/>
+            <a:ext cx="1280800" cy="307777"/>
+          </a:xfrm>
+          <a:prstGeom prst="rect">
+            <a:avLst/>
+          </a:prstGeom>
+          <a:noFill/>
+        </p:spPr>
+        <p:txBody>
+          <a:bodyPr wrap="none" rtlCol="0">
+            <a:spAutoFit/>
+          </a:bodyPr>
+          <a:lstStyle/>
+          <a:p>
+            <a:r>
+              <a:rPr lang="en-US" sz="1400" dirty="0"/>
+              <a:t>pmix_regattr_t</a:t>
+            </a:r>
+          </a:p>
+        </p:txBody>
+      </p:sp>
+      <p:sp>
+        <p:nvSpPr>
+          <p:cNvPr id="26" name="TextBox 25">
+            <a:extLst>
+              <a:ext uri="{FF2B5EF4-FFF2-40B4-BE49-F238E27FC236}">
+                <a16:creationId xmlns:a16="http://schemas.microsoft.com/office/drawing/2014/main" id="{D14AC1F7-BCC8-314F-A10C-04324538ECF8}"/>
+              </a:ext>
+            </a:extLst>
+          </p:cNvPr>
+          <p:cNvSpPr txBox="1"/>
+          <p:nvPr/>
+        </p:nvSpPr>
+        <p:spPr>
+          <a:xfrm>
+            <a:off x="2504928" y="1860294"/>
+            <a:ext cx="659668" cy="369332"/>
+          </a:xfrm>
+          <a:prstGeom prst="rect">
+            <a:avLst/>
+          </a:prstGeom>
+          <a:noFill/>
+          <a:ln w="28575">
+            <a:solidFill>
+              <a:srgbClr val="FF0000"/>
+            </a:solidFill>
+          </a:ln>
+        </p:spPr>
+        <p:txBody>
+          <a:bodyPr wrap="none" rtlCol="0">
+            <a:spAutoFit/>
+          </a:bodyPr>
+          <a:lstStyle/>
+          <a:p>
+            <a:r>
+              <a:rPr lang="en-US" dirty="0"/>
+              <a:t>Attr1</a:t>
+            </a:r>
+          </a:p>
+        </p:txBody>
+      </p:sp>
+      <p:sp>
+        <p:nvSpPr>
+          <p:cNvPr id="27" name="TextBox 26">
+            <a:extLst>
+              <a:ext uri="{FF2B5EF4-FFF2-40B4-BE49-F238E27FC236}">
+                <a16:creationId xmlns:a16="http://schemas.microsoft.com/office/drawing/2014/main" id="{2D1B3FD3-6F64-7146-8979-B87B533F51DE}"/>
+              </a:ext>
+            </a:extLst>
+          </p:cNvPr>
+          <p:cNvSpPr txBox="1"/>
+          <p:nvPr/>
+        </p:nvSpPr>
+        <p:spPr>
+          <a:xfrm>
+            <a:off x="3447903" y="1860294"/>
+            <a:ext cx="659668" cy="369332"/>
+          </a:xfrm>
+          <a:prstGeom prst="rect">
+            <a:avLst/>
+          </a:prstGeom>
+          <a:noFill/>
+          <a:ln w="28575">
+            <a:solidFill>
+              <a:srgbClr val="FF0000"/>
+            </a:solidFill>
+          </a:ln>
+        </p:spPr>
+        <p:txBody>
+          <a:bodyPr wrap="none" rtlCol="0">
+            <a:spAutoFit/>
+          </a:bodyPr>
+          <a:lstStyle/>
+          <a:p>
+            <a:r>
+              <a:rPr lang="en-US" dirty="0"/>
+              <a:t>Attr2</a:t>
+            </a:r>
+          </a:p>
+        </p:txBody>
+      </p:sp>
+      <p:sp>
+        <p:nvSpPr>
+          <p:cNvPr id="28" name="TextBox 27">
+            <a:extLst>
+              <a:ext uri="{FF2B5EF4-FFF2-40B4-BE49-F238E27FC236}">
+                <a16:creationId xmlns:a16="http://schemas.microsoft.com/office/drawing/2014/main" id="{BA2DD757-7426-1142-B5FC-A9C1A3033086}"/>
+              </a:ext>
+            </a:extLst>
+          </p:cNvPr>
+          <p:cNvSpPr txBox="1"/>
+          <p:nvPr/>
+        </p:nvSpPr>
+        <p:spPr>
+          <a:xfrm>
+            <a:off x="2504928" y="3008071"/>
+            <a:ext cx="659668" cy="369332"/>
+          </a:xfrm>
+          <a:prstGeom prst="rect">
+            <a:avLst/>
+          </a:prstGeom>
+          <a:noFill/>
+          <a:ln w="28575">
+            <a:solidFill>
+              <a:srgbClr val="FF0000"/>
+            </a:solidFill>
+          </a:ln>
+        </p:spPr>
+        <p:txBody>
+          <a:bodyPr wrap="none" rtlCol="0">
+            <a:spAutoFit/>
+          </a:bodyPr>
+          <a:lstStyle/>
+          <a:p>
+            <a:r>
+              <a:rPr lang="en-US" dirty="0"/>
+              <a:t>Attr1</a:t>
+            </a:r>
+          </a:p>
+        </p:txBody>
+      </p:sp>
+      <p:cxnSp>
+        <p:nvCxnSpPr>
+          <p:cNvPr id="30" name="Straight Connector 29">
+            <a:extLst>
+              <a:ext uri="{FF2B5EF4-FFF2-40B4-BE49-F238E27FC236}">
+                <a16:creationId xmlns:a16="http://schemas.microsoft.com/office/drawing/2014/main" id="{34311AD0-A8F4-1844-9BD4-2D0CBE875717}"/>
+              </a:ext>
+            </a:extLst>
+          </p:cNvPr>
+          <p:cNvCxnSpPr>
+            <a:stCxn id="5" idx="3"/>
+            <a:endCxn id="26" idx="1"/>
+          </p:cNvCxnSpPr>
+          <p:nvPr/>
+        </p:nvCxnSpPr>
+        <p:spPr>
+          <a:xfrm flipV="1">
+            <a:off x="2069061" y="2044960"/>
+            <a:ext cx="435867" cy="1"/>
+          </a:xfrm>
+          <a:prstGeom prst="line">
+            <a:avLst/>
+          </a:prstGeom>
+        </p:spPr>
+        <p:style>
+          <a:lnRef idx="3">
+            <a:schemeClr val="accent2"/>
+          </a:lnRef>
+          <a:fillRef idx="0">
+            <a:schemeClr val="accent2"/>
+          </a:fillRef>
+          <a:effectRef idx="2">
+            <a:schemeClr val="accent2"/>
+          </a:effectRef>
+          <a:fontRef idx="minor">
+            <a:schemeClr val="tx1"/>
+          </a:fontRef>
+        </p:style>
+      </p:cxnSp>
+      <p:cxnSp>
+        <p:nvCxnSpPr>
+          <p:cNvPr id="32" name="Straight Connector 31">
+            <a:extLst>
+              <a:ext uri="{FF2B5EF4-FFF2-40B4-BE49-F238E27FC236}">
+                <a16:creationId xmlns:a16="http://schemas.microsoft.com/office/drawing/2014/main" id="{E394F3A3-AD3F-6140-8DC6-1E27C08A7080}"/>
+              </a:ext>
+            </a:extLst>
+          </p:cNvPr>
+          <p:cNvCxnSpPr>
+            <a:stCxn id="26" idx="3"/>
+            <a:endCxn id="27" idx="1"/>
+          </p:cNvCxnSpPr>
+          <p:nvPr/>
+        </p:nvCxnSpPr>
+        <p:spPr>
+          <a:xfrm>
+            <a:off x="3164596" y="2044960"/>
+            <a:ext cx="283307" cy="0"/>
+          </a:xfrm>
+          <a:prstGeom prst="line">
+            <a:avLst/>
+          </a:prstGeom>
+        </p:spPr>
+        <p:style>
+          <a:lnRef idx="3">
+            <a:schemeClr val="accent2"/>
+          </a:lnRef>
+          <a:fillRef idx="0">
+            <a:schemeClr val="accent2"/>
+          </a:fillRef>
+          <a:effectRef idx="2">
+            <a:schemeClr val="accent2"/>
+          </a:effectRef>
+          <a:fontRef idx="minor">
+            <a:schemeClr val="tx1"/>
+          </a:fontRef>
+        </p:style>
+      </p:cxnSp>
+      <p:cxnSp>
+        <p:nvCxnSpPr>
+          <p:cNvPr id="34" name="Straight Connector 33">
+            <a:extLst>
+              <a:ext uri="{FF2B5EF4-FFF2-40B4-BE49-F238E27FC236}">
+                <a16:creationId xmlns:a16="http://schemas.microsoft.com/office/drawing/2014/main" id="{3DBA2582-38FE-6C41-9BA1-3788AC715B24}"/>
+              </a:ext>
+            </a:extLst>
+          </p:cNvPr>
+          <p:cNvCxnSpPr>
+            <a:stCxn id="6" idx="3"/>
+            <a:endCxn id="28" idx="1"/>
+          </p:cNvCxnSpPr>
+          <p:nvPr/>
+        </p:nvCxnSpPr>
+        <p:spPr>
+          <a:xfrm flipV="1">
+            <a:off x="2098909" y="3192737"/>
+            <a:ext cx="406019" cy="1"/>
+          </a:xfrm>
+          <a:prstGeom prst="line">
+            <a:avLst/>
+          </a:prstGeom>
+        </p:spPr>
+        <p:style>
+          <a:lnRef idx="3">
+            <a:schemeClr val="accent2"/>
+          </a:lnRef>
+          <a:fillRef idx="0">
+            <a:schemeClr val="accent2"/>
+          </a:fillRef>
+          <a:effectRef idx="2">
+            <a:schemeClr val="accent2"/>
+          </a:effectRef>
+          <a:fontRef idx="minor">
+            <a:schemeClr val="tx1"/>
+          </a:fontRef>
+        </p:style>
+      </p:cxnSp>
+      <p:sp>
+        <p:nvSpPr>
+          <p:cNvPr id="35" name="TextBox 34">
+            <a:extLst>
+              <a:ext uri="{FF2B5EF4-FFF2-40B4-BE49-F238E27FC236}">
+                <a16:creationId xmlns:a16="http://schemas.microsoft.com/office/drawing/2014/main" id="{DBF0DB91-9D7E-1748-9D6D-64A798206895}"/>
+              </a:ext>
+            </a:extLst>
+          </p:cNvPr>
+          <p:cNvSpPr txBox="1"/>
+          <p:nvPr/>
+        </p:nvSpPr>
+        <p:spPr>
+          <a:xfrm>
+            <a:off x="4181943" y="844632"/>
+            <a:ext cx="1527854" cy="369332"/>
+          </a:xfrm>
+          <a:prstGeom prst="rect">
+            <a:avLst/>
+          </a:prstGeom>
+          <a:noFill/>
+          <a:ln w="28575">
+            <a:solidFill>
+              <a:srgbClr val="00B050"/>
+            </a:solidFill>
+          </a:ln>
+        </p:spPr>
+        <p:txBody>
+          <a:bodyPr wrap="none" rtlCol="0">
+            <a:spAutoFit/>
+          </a:bodyPr>
+          <a:lstStyle/>
+          <a:p>
+            <a:r>
+              <a:rPr lang="en-US" dirty="0"/>
+              <a:t>PMIx_Allocate</a:t>
+            </a:r>
+          </a:p>
+        </p:txBody>
+      </p:sp>
+      <p:sp>
+        <p:nvSpPr>
+          <p:cNvPr id="36" name="TextBox 35">
+            <a:extLst>
+              <a:ext uri="{FF2B5EF4-FFF2-40B4-BE49-F238E27FC236}">
+                <a16:creationId xmlns:a16="http://schemas.microsoft.com/office/drawing/2014/main" id="{713057B0-16A1-5245-8C50-8A7417D4963C}"/>
+              </a:ext>
+            </a:extLst>
+          </p:cNvPr>
+          <p:cNvSpPr txBox="1"/>
+          <p:nvPr/>
+        </p:nvSpPr>
+        <p:spPr>
+          <a:xfrm>
+            <a:off x="4582886" y="1721795"/>
+            <a:ext cx="725968" cy="646331"/>
+          </a:xfrm>
+          <a:prstGeom prst="rect">
+            <a:avLst/>
+          </a:prstGeom>
+          <a:noFill/>
+          <a:ln w="28575">
+            <a:solidFill>
+              <a:srgbClr val="00B050"/>
+            </a:solidFill>
+          </a:ln>
+        </p:spPr>
+        <p:txBody>
+          <a:bodyPr wrap="none" rtlCol="0">
+            <a:spAutoFit/>
+          </a:bodyPr>
+          <a:lstStyle/>
+          <a:p>
+            <a:pPr algn="ctr"/>
+            <a:r>
+              <a:rPr lang="en-US" dirty="0"/>
+              <a:t>Client</a:t>
+            </a:r>
+          </a:p>
+          <a:p>
+            <a:pPr algn="ctr"/>
+            <a:r>
+              <a:rPr lang="en-US" dirty="0"/>
+              <a:t>Level</a:t>
+            </a:r>
+          </a:p>
+        </p:txBody>
+      </p:sp>
+      <p:sp>
+        <p:nvSpPr>
+          <p:cNvPr id="37" name="TextBox 36">
+            <a:extLst>
+              <a:ext uri="{FF2B5EF4-FFF2-40B4-BE49-F238E27FC236}">
+                <a16:creationId xmlns:a16="http://schemas.microsoft.com/office/drawing/2014/main" id="{C8664B83-C52A-0041-8A2A-046873C9C7D2}"/>
+              </a:ext>
+            </a:extLst>
+          </p:cNvPr>
+          <p:cNvSpPr txBox="1"/>
+          <p:nvPr/>
+        </p:nvSpPr>
+        <p:spPr>
+          <a:xfrm>
+            <a:off x="4553038" y="2869572"/>
+            <a:ext cx="785664" cy="646331"/>
+          </a:xfrm>
+          <a:prstGeom prst="rect">
+            <a:avLst/>
+          </a:prstGeom>
+          <a:noFill/>
+          <a:ln w="28575">
+            <a:solidFill>
+              <a:srgbClr val="00B050"/>
+            </a:solidFill>
+          </a:ln>
+        </p:spPr>
+        <p:txBody>
+          <a:bodyPr wrap="none" rtlCol="0">
+            <a:spAutoFit/>
+          </a:bodyPr>
+          <a:lstStyle/>
+          <a:p>
+            <a:pPr algn="ctr"/>
+            <a:r>
+              <a:rPr lang="en-US" dirty="0"/>
+              <a:t>Server</a:t>
+            </a:r>
+          </a:p>
+          <a:p>
+            <a:pPr algn="ctr"/>
+            <a:r>
+              <a:rPr lang="en-US" dirty="0"/>
+              <a:t>Level</a:t>
+            </a:r>
+          </a:p>
+        </p:txBody>
+      </p:sp>
+      <p:sp>
+        <p:nvSpPr>
+          <p:cNvPr id="38" name="TextBox 37">
+            <a:extLst>
+              <a:ext uri="{FF2B5EF4-FFF2-40B4-BE49-F238E27FC236}">
+                <a16:creationId xmlns:a16="http://schemas.microsoft.com/office/drawing/2014/main" id="{F9805B42-8214-AF4F-996A-9C7DBDD43990}"/>
+              </a:ext>
+            </a:extLst>
+          </p:cNvPr>
+          <p:cNvSpPr txBox="1"/>
+          <p:nvPr/>
+        </p:nvSpPr>
+        <p:spPr>
+          <a:xfrm>
+            <a:off x="4609138" y="4017348"/>
+            <a:ext cx="666977" cy="646331"/>
+          </a:xfrm>
+          <a:prstGeom prst="rect">
+            <a:avLst/>
+          </a:prstGeom>
+          <a:noFill/>
+          <a:ln w="28575">
+            <a:solidFill>
+              <a:srgbClr val="00B050"/>
+            </a:solidFill>
+          </a:ln>
+        </p:spPr>
+        <p:txBody>
+          <a:bodyPr wrap="none" rtlCol="0">
+            <a:spAutoFit/>
+          </a:bodyPr>
+          <a:lstStyle/>
+          <a:p>
+            <a:pPr algn="ctr"/>
+            <a:r>
+              <a:rPr lang="en-US" dirty="0"/>
+              <a:t>Host</a:t>
+            </a:r>
+          </a:p>
+          <a:p>
+            <a:pPr algn="ctr"/>
+            <a:r>
+              <a:rPr lang="en-US" dirty="0"/>
+              <a:t>Level</a:t>
+            </a:r>
+          </a:p>
+        </p:txBody>
+      </p:sp>
+      <p:cxnSp>
+        <p:nvCxnSpPr>
+          <p:cNvPr id="39" name="Straight Connector 38">
+            <a:extLst>
+              <a:ext uri="{FF2B5EF4-FFF2-40B4-BE49-F238E27FC236}">
+                <a16:creationId xmlns:a16="http://schemas.microsoft.com/office/drawing/2014/main" id="{91E09E28-F989-7544-AE06-22A09A513F9C}"/>
+              </a:ext>
+            </a:extLst>
+          </p:cNvPr>
+          <p:cNvCxnSpPr>
+            <a:stCxn id="35" idx="2"/>
+            <a:endCxn id="36" idx="0"/>
+          </p:cNvCxnSpPr>
+          <p:nvPr/>
+        </p:nvCxnSpPr>
+        <p:spPr>
+          <a:xfrm>
+            <a:off x="4945870" y="1213964"/>
+            <a:ext cx="0" cy="507831"/>
+          </a:xfrm>
+          <a:prstGeom prst="line">
+            <a:avLst/>
+          </a:prstGeom>
+          <a:ln/>
+        </p:spPr>
+        <p:style>
+          <a:lnRef idx="3">
+            <a:schemeClr val="accent2"/>
+          </a:lnRef>
+          <a:fillRef idx="0">
+            <a:schemeClr val="accent2"/>
+          </a:fillRef>
+          <a:effectRef idx="2">
+            <a:schemeClr val="accent2"/>
+          </a:effectRef>
+          <a:fontRef idx="minor">
+            <a:schemeClr val="tx1"/>
+          </a:fontRef>
+        </p:style>
+      </p:cxnSp>
+      <p:cxnSp>
+        <p:nvCxnSpPr>
+          <p:cNvPr id="40" name="Straight Connector 39">
+            <a:extLst>
+              <a:ext uri="{FF2B5EF4-FFF2-40B4-BE49-F238E27FC236}">
+                <a16:creationId xmlns:a16="http://schemas.microsoft.com/office/drawing/2014/main" id="{A6856A07-0092-3442-BE4E-400582DB4B4B}"/>
+              </a:ext>
+            </a:extLst>
+          </p:cNvPr>
+          <p:cNvCxnSpPr>
+            <a:stCxn id="36" idx="2"/>
+            <a:endCxn id="37" idx="0"/>
+          </p:cNvCxnSpPr>
+          <p:nvPr/>
+        </p:nvCxnSpPr>
+        <p:spPr>
+          <a:xfrm>
+            <a:off x="4945870" y="2368126"/>
+            <a:ext cx="0" cy="501446"/>
+          </a:xfrm>
+          <a:prstGeom prst="line">
+            <a:avLst/>
+          </a:prstGeom>
+          <a:ln/>
+        </p:spPr>
+        <p:style>
+          <a:lnRef idx="3">
+            <a:schemeClr val="accent2"/>
+          </a:lnRef>
+          <a:fillRef idx="0">
+            <a:schemeClr val="accent2"/>
+          </a:fillRef>
+          <a:effectRef idx="2">
+            <a:schemeClr val="accent2"/>
+          </a:effectRef>
+          <a:fontRef idx="minor">
+            <a:schemeClr val="tx1"/>
+          </a:fontRef>
+        </p:style>
+      </p:cxnSp>
+      <p:cxnSp>
+        <p:nvCxnSpPr>
+          <p:cNvPr id="41" name="Straight Connector 40">
+            <a:extLst>
+              <a:ext uri="{FF2B5EF4-FFF2-40B4-BE49-F238E27FC236}">
+                <a16:creationId xmlns:a16="http://schemas.microsoft.com/office/drawing/2014/main" id="{23971A55-7A18-D84A-B24A-C8E7C91C878A}"/>
+              </a:ext>
+            </a:extLst>
+          </p:cNvPr>
+          <p:cNvCxnSpPr>
+            <a:stCxn id="37" idx="2"/>
+            <a:endCxn id="38" idx="0"/>
+          </p:cNvCxnSpPr>
+          <p:nvPr/>
+        </p:nvCxnSpPr>
+        <p:spPr>
+          <a:xfrm flipH="1">
+            <a:off x="4942627" y="3515903"/>
+            <a:ext cx="3243" cy="501445"/>
+          </a:xfrm>
+          <a:prstGeom prst="line">
+            <a:avLst/>
+          </a:prstGeom>
+          <a:ln/>
+        </p:spPr>
+        <p:style>
+          <a:lnRef idx="3">
+            <a:schemeClr val="accent2"/>
+          </a:lnRef>
+          <a:fillRef idx="0">
+            <a:schemeClr val="accent2"/>
+          </a:fillRef>
+          <a:effectRef idx="2">
+            <a:schemeClr val="accent2"/>
+          </a:effectRef>
+          <a:fontRef idx="minor">
+            <a:schemeClr val="tx1"/>
+          </a:fontRef>
+        </p:style>
+      </p:cxnSp>
+      <p:cxnSp>
+        <p:nvCxnSpPr>
+          <p:cNvPr id="44" name="Straight Connector 43">
+            <a:extLst>
+              <a:ext uri="{FF2B5EF4-FFF2-40B4-BE49-F238E27FC236}">
+                <a16:creationId xmlns:a16="http://schemas.microsoft.com/office/drawing/2014/main" id="{98AC0311-5073-2149-8BB4-2719CE9647B8}"/>
+              </a:ext>
+            </a:extLst>
+          </p:cNvPr>
+          <p:cNvCxnSpPr>
+            <a:stCxn id="4" idx="3"/>
+            <a:endCxn id="35" idx="1"/>
+          </p:cNvCxnSpPr>
+          <p:nvPr/>
+        </p:nvCxnSpPr>
+        <p:spPr>
+          <a:xfrm flipV="1">
+            <a:off x="2261069" y="1029298"/>
+            <a:ext cx="1920874" cy="6386"/>
+          </a:xfrm>
+          <a:prstGeom prst="line">
+            <a:avLst/>
+          </a:prstGeom>
+        </p:spPr>
+        <p:style>
+          <a:lnRef idx="1">
+            <a:schemeClr val="accent1"/>
+          </a:lnRef>
+          <a:fillRef idx="0">
+            <a:schemeClr val="accent1"/>
+          </a:fillRef>
+          <a:effectRef idx="0">
+            <a:schemeClr val="accent1"/>
+          </a:effectRef>
+          <a:fontRef idx="minor">
+            <a:schemeClr val="tx1"/>
+          </a:fontRef>
+        </p:style>
+      </p:cxnSp>
+      <p:sp>
+        <p:nvSpPr>
+          <p:cNvPr id="45" name="TextBox 44">
+            <a:extLst>
+              <a:ext uri="{FF2B5EF4-FFF2-40B4-BE49-F238E27FC236}">
+                <a16:creationId xmlns:a16="http://schemas.microsoft.com/office/drawing/2014/main" id="{AF473AF1-D8F2-AE41-B1E8-4E887BEC03A9}"/>
+              </a:ext>
+            </a:extLst>
+          </p:cNvPr>
+          <p:cNvSpPr txBox="1"/>
+          <p:nvPr/>
+        </p:nvSpPr>
+        <p:spPr>
+          <a:xfrm>
+            <a:off x="5761903" y="1857102"/>
+            <a:ext cx="659668" cy="369332"/>
+          </a:xfrm>
+          <a:prstGeom prst="rect">
+            <a:avLst/>
+          </a:prstGeom>
+          <a:noFill/>
+          <a:ln w="28575">
+            <a:solidFill>
+              <a:srgbClr val="FF0000"/>
+            </a:solidFill>
+          </a:ln>
+        </p:spPr>
+        <p:txBody>
+          <a:bodyPr wrap="none" rtlCol="0">
+            <a:spAutoFit/>
+          </a:bodyPr>
+          <a:lstStyle/>
+          <a:p>
+            <a:r>
+              <a:rPr lang="en-US" dirty="0"/>
+              <a:t>Attr1</a:t>
+            </a:r>
+          </a:p>
+        </p:txBody>
+      </p:sp>
+      <p:sp>
+        <p:nvSpPr>
+          <p:cNvPr id="46" name="TextBox 45">
+            <a:extLst>
+              <a:ext uri="{FF2B5EF4-FFF2-40B4-BE49-F238E27FC236}">
+                <a16:creationId xmlns:a16="http://schemas.microsoft.com/office/drawing/2014/main" id="{FCE30464-E903-C545-83DE-CE07A564F843}"/>
+              </a:ext>
+            </a:extLst>
+          </p:cNvPr>
+          <p:cNvSpPr txBox="1"/>
+          <p:nvPr/>
+        </p:nvSpPr>
+        <p:spPr>
+          <a:xfrm>
+            <a:off x="6704878" y="1857102"/>
+            <a:ext cx="659668" cy="369332"/>
+          </a:xfrm>
+          <a:prstGeom prst="rect">
+            <a:avLst/>
+          </a:prstGeom>
+          <a:noFill/>
+          <a:ln w="28575">
+            <a:solidFill>
+              <a:srgbClr val="FF0000"/>
+            </a:solidFill>
+          </a:ln>
+        </p:spPr>
+        <p:txBody>
+          <a:bodyPr wrap="none" rtlCol="0">
+            <a:spAutoFit/>
+          </a:bodyPr>
+          <a:lstStyle/>
+          <a:p>
+            <a:r>
+              <a:rPr lang="en-US" dirty="0"/>
+              <a:t>Attr2</a:t>
+            </a:r>
+          </a:p>
+        </p:txBody>
+      </p:sp>
+      <p:cxnSp>
+        <p:nvCxnSpPr>
+          <p:cNvPr id="47" name="Straight Connector 46">
+            <a:extLst>
+              <a:ext uri="{FF2B5EF4-FFF2-40B4-BE49-F238E27FC236}">
+                <a16:creationId xmlns:a16="http://schemas.microsoft.com/office/drawing/2014/main" id="{525BC51C-5F47-034A-8E2F-240345CC449C}"/>
+              </a:ext>
+            </a:extLst>
+          </p:cNvPr>
+          <p:cNvCxnSpPr>
+            <a:endCxn id="45" idx="1"/>
+          </p:cNvCxnSpPr>
+          <p:nvPr/>
+        </p:nvCxnSpPr>
+        <p:spPr>
+          <a:xfrm flipV="1">
+            <a:off x="5326036" y="2041768"/>
+            <a:ext cx="435867" cy="1"/>
+          </a:xfrm>
+          <a:prstGeom prst="line">
+            <a:avLst/>
+          </a:prstGeom>
+        </p:spPr>
+        <p:style>
+          <a:lnRef idx="3">
+            <a:schemeClr val="accent2"/>
+          </a:lnRef>
+          <a:fillRef idx="0">
+            <a:schemeClr val="accent2"/>
+          </a:fillRef>
+          <a:effectRef idx="2">
+            <a:schemeClr val="accent2"/>
+          </a:effectRef>
+          <a:fontRef idx="minor">
+            <a:schemeClr val="tx1"/>
+          </a:fontRef>
+        </p:style>
+      </p:cxnSp>
+      <p:cxnSp>
+        <p:nvCxnSpPr>
+          <p:cNvPr id="48" name="Straight Connector 47">
+            <a:extLst>
+              <a:ext uri="{FF2B5EF4-FFF2-40B4-BE49-F238E27FC236}">
+                <a16:creationId xmlns:a16="http://schemas.microsoft.com/office/drawing/2014/main" id="{F2EC85CB-9265-B644-B4BF-6BAA25EA1F4B}"/>
+              </a:ext>
+            </a:extLst>
+          </p:cNvPr>
+          <p:cNvCxnSpPr>
+            <a:stCxn id="45" idx="3"/>
+            <a:endCxn id="46" idx="1"/>
+          </p:cNvCxnSpPr>
+          <p:nvPr/>
+        </p:nvCxnSpPr>
+        <p:spPr>
+          <a:xfrm>
+            <a:off x="6421571" y="2041768"/>
+            <a:ext cx="283307" cy="0"/>
+          </a:xfrm>
+          <a:prstGeom prst="line">
+            <a:avLst/>
+          </a:prstGeom>
+        </p:spPr>
+        <p:style>
+          <a:lnRef idx="3">
+            <a:schemeClr val="accent2"/>
+          </a:lnRef>
+          <a:fillRef idx="0">
+            <a:schemeClr val="accent2"/>
+          </a:fillRef>
+          <a:effectRef idx="2">
+            <a:schemeClr val="accent2"/>
+          </a:effectRef>
+          <a:fontRef idx="minor">
+            <a:schemeClr val="tx1"/>
+          </a:fontRef>
+        </p:style>
+      </p:cxnSp>
+      <p:sp>
+        <p:nvSpPr>
+          <p:cNvPr id="49" name="TextBox 48">
+            <a:extLst>
+              <a:ext uri="{FF2B5EF4-FFF2-40B4-BE49-F238E27FC236}">
+                <a16:creationId xmlns:a16="http://schemas.microsoft.com/office/drawing/2014/main" id="{55A3E213-5EBD-4B43-BF74-D91EF20C980D}"/>
+              </a:ext>
+            </a:extLst>
+          </p:cNvPr>
+          <p:cNvSpPr txBox="1"/>
+          <p:nvPr/>
+        </p:nvSpPr>
+        <p:spPr>
+          <a:xfrm>
+            <a:off x="5784169" y="3005670"/>
+            <a:ext cx="659668" cy="369332"/>
+          </a:xfrm>
+          <a:prstGeom prst="rect">
+            <a:avLst/>
+          </a:prstGeom>
+          <a:noFill/>
+          <a:ln w="28575">
+            <a:solidFill>
+              <a:srgbClr val="FF0000"/>
+            </a:solidFill>
+          </a:ln>
+        </p:spPr>
+        <p:txBody>
+          <a:bodyPr wrap="none" rtlCol="0">
+            <a:spAutoFit/>
+          </a:bodyPr>
+          <a:lstStyle/>
+          <a:p>
+            <a:r>
+              <a:rPr lang="en-US" dirty="0"/>
+              <a:t>Attr1</a:t>
+            </a:r>
+          </a:p>
+        </p:txBody>
+      </p:sp>
+      <p:sp>
+        <p:nvSpPr>
+          <p:cNvPr id="50" name="TextBox 49">
+            <a:extLst>
+              <a:ext uri="{FF2B5EF4-FFF2-40B4-BE49-F238E27FC236}">
+                <a16:creationId xmlns:a16="http://schemas.microsoft.com/office/drawing/2014/main" id="{B70C4A57-7CBB-A441-8B7D-A26BAAA0A3E0}"/>
+              </a:ext>
+            </a:extLst>
+          </p:cNvPr>
+          <p:cNvSpPr txBox="1"/>
+          <p:nvPr/>
+        </p:nvSpPr>
+        <p:spPr>
+          <a:xfrm>
+            <a:off x="6727144" y="3005670"/>
+            <a:ext cx="659668" cy="369332"/>
+          </a:xfrm>
+          <a:prstGeom prst="rect">
+            <a:avLst/>
+          </a:prstGeom>
+          <a:noFill/>
+          <a:ln w="28575">
+            <a:solidFill>
+              <a:srgbClr val="FF0000"/>
+            </a:solidFill>
+          </a:ln>
+        </p:spPr>
+        <p:txBody>
+          <a:bodyPr wrap="none" rtlCol="0">
+            <a:spAutoFit/>
+          </a:bodyPr>
+          <a:lstStyle/>
+          <a:p>
+            <a:r>
+              <a:rPr lang="en-US" dirty="0"/>
+              <a:t>Attr2</a:t>
+            </a:r>
+          </a:p>
+        </p:txBody>
+      </p:sp>
+      <p:cxnSp>
+        <p:nvCxnSpPr>
+          <p:cNvPr id="51" name="Straight Connector 50">
+            <a:extLst>
+              <a:ext uri="{FF2B5EF4-FFF2-40B4-BE49-F238E27FC236}">
+                <a16:creationId xmlns:a16="http://schemas.microsoft.com/office/drawing/2014/main" id="{6B8003E7-7664-7A49-B93A-1DB1439CF0FA}"/>
+              </a:ext>
+            </a:extLst>
+          </p:cNvPr>
+          <p:cNvCxnSpPr>
+            <a:endCxn id="49" idx="1"/>
+          </p:cNvCxnSpPr>
+          <p:nvPr/>
+        </p:nvCxnSpPr>
+        <p:spPr>
+          <a:xfrm flipV="1">
+            <a:off x="5348302" y="3190336"/>
+            <a:ext cx="435867" cy="1"/>
+          </a:xfrm>
+          <a:prstGeom prst="line">
+            <a:avLst/>
+          </a:prstGeom>
+        </p:spPr>
+        <p:style>
+          <a:lnRef idx="3">
+            <a:schemeClr val="accent2"/>
+          </a:lnRef>
+          <a:fillRef idx="0">
+            <a:schemeClr val="accent2"/>
+          </a:fillRef>
+          <a:effectRef idx="2">
+            <a:schemeClr val="accent2"/>
+          </a:effectRef>
+          <a:fontRef idx="minor">
+            <a:schemeClr val="tx1"/>
+          </a:fontRef>
+        </p:style>
+      </p:cxnSp>
+      <p:cxnSp>
+        <p:nvCxnSpPr>
+          <p:cNvPr id="52" name="Straight Connector 51">
+            <a:extLst>
+              <a:ext uri="{FF2B5EF4-FFF2-40B4-BE49-F238E27FC236}">
+                <a16:creationId xmlns:a16="http://schemas.microsoft.com/office/drawing/2014/main" id="{04D1680B-D892-624E-A667-89157D437331}"/>
+              </a:ext>
+            </a:extLst>
+          </p:cNvPr>
+          <p:cNvCxnSpPr>
+            <a:stCxn id="49" idx="3"/>
+            <a:endCxn id="50" idx="1"/>
+          </p:cNvCxnSpPr>
+          <p:nvPr/>
+        </p:nvCxnSpPr>
+        <p:spPr>
+          <a:xfrm>
+            <a:off x="6443837" y="3190336"/>
+            <a:ext cx="283307" cy="0"/>
+          </a:xfrm>
+          <a:prstGeom prst="line">
+            <a:avLst/>
+          </a:prstGeom>
+        </p:spPr>
+        <p:style>
+          <a:lnRef idx="3">
+            <a:schemeClr val="accent2"/>
+          </a:lnRef>
+          <a:fillRef idx="0">
+            <a:schemeClr val="accent2"/>
+          </a:fillRef>
+          <a:effectRef idx="2">
+            <a:schemeClr val="accent2"/>
+          </a:effectRef>
+          <a:fontRef idx="minor">
+            <a:schemeClr val="tx1"/>
+          </a:fontRef>
+        </p:style>
+      </p:cxnSp>
+      <p:sp>
+        <p:nvSpPr>
+          <p:cNvPr id="53" name="TextBox 52">
+            <a:extLst>
+              <a:ext uri="{FF2B5EF4-FFF2-40B4-BE49-F238E27FC236}">
+                <a16:creationId xmlns:a16="http://schemas.microsoft.com/office/drawing/2014/main" id="{C1F7D1A3-EDCB-6D4C-AFA5-2968C268A0F4}"/>
+              </a:ext>
+            </a:extLst>
+          </p:cNvPr>
+          <p:cNvSpPr txBox="1"/>
+          <p:nvPr/>
+        </p:nvSpPr>
+        <p:spPr>
+          <a:xfrm>
+            <a:off x="5704753" y="4155921"/>
+            <a:ext cx="659668" cy="369332"/>
+          </a:xfrm>
+          <a:prstGeom prst="rect">
+            <a:avLst/>
+          </a:prstGeom>
+          <a:noFill/>
+          <a:ln w="28575">
+            <a:solidFill>
+              <a:srgbClr val="FF0000"/>
+            </a:solidFill>
+          </a:ln>
+        </p:spPr>
+        <p:txBody>
+          <a:bodyPr wrap="none" rtlCol="0">
+            <a:spAutoFit/>
+          </a:bodyPr>
+          <a:lstStyle/>
+          <a:p>
+            <a:r>
+              <a:rPr lang="en-US" dirty="0"/>
+              <a:t>Attr1</a:t>
+            </a:r>
+          </a:p>
+        </p:txBody>
+      </p:sp>
+      <p:sp>
+        <p:nvSpPr>
+          <p:cNvPr id="54" name="TextBox 53">
+            <a:extLst>
+              <a:ext uri="{FF2B5EF4-FFF2-40B4-BE49-F238E27FC236}">
+                <a16:creationId xmlns:a16="http://schemas.microsoft.com/office/drawing/2014/main" id="{68505CE1-2C8F-9B40-98DF-FD9D50FECDB1}"/>
+              </a:ext>
+            </a:extLst>
+          </p:cNvPr>
+          <p:cNvSpPr txBox="1"/>
+          <p:nvPr/>
+        </p:nvSpPr>
+        <p:spPr>
+          <a:xfrm>
+            <a:off x="6647728" y="4155921"/>
+            <a:ext cx="659668" cy="369332"/>
+          </a:xfrm>
+          <a:prstGeom prst="rect">
+            <a:avLst/>
+          </a:prstGeom>
+          <a:noFill/>
+          <a:ln w="28575">
+            <a:solidFill>
+              <a:srgbClr val="FF0000"/>
+            </a:solidFill>
+          </a:ln>
+        </p:spPr>
+        <p:txBody>
+          <a:bodyPr wrap="none" rtlCol="0">
+            <a:spAutoFit/>
+          </a:bodyPr>
+          <a:lstStyle/>
+          <a:p>
+            <a:r>
+              <a:rPr lang="en-US" dirty="0"/>
+              <a:t>Attr2</a:t>
+            </a:r>
+          </a:p>
+        </p:txBody>
+      </p:sp>
+      <p:cxnSp>
+        <p:nvCxnSpPr>
+          <p:cNvPr id="55" name="Straight Connector 54">
+            <a:extLst>
+              <a:ext uri="{FF2B5EF4-FFF2-40B4-BE49-F238E27FC236}">
+                <a16:creationId xmlns:a16="http://schemas.microsoft.com/office/drawing/2014/main" id="{10006350-CB13-114C-90E4-FD5D485E50FB}"/>
+              </a:ext>
+            </a:extLst>
+          </p:cNvPr>
+          <p:cNvCxnSpPr>
+            <a:endCxn id="53" idx="1"/>
+          </p:cNvCxnSpPr>
+          <p:nvPr/>
+        </p:nvCxnSpPr>
+        <p:spPr>
+          <a:xfrm flipV="1">
+            <a:off x="5268886" y="4340587"/>
+            <a:ext cx="435867" cy="1"/>
+          </a:xfrm>
+          <a:prstGeom prst="line">
+            <a:avLst/>
+          </a:prstGeom>
+        </p:spPr>
+        <p:style>
+          <a:lnRef idx="3">
+            <a:schemeClr val="accent2"/>
+          </a:lnRef>
+          <a:fillRef idx="0">
+            <a:schemeClr val="accent2"/>
+          </a:fillRef>
+          <a:effectRef idx="2">
+            <a:schemeClr val="accent2"/>
+          </a:effectRef>
+          <a:fontRef idx="minor">
+            <a:schemeClr val="tx1"/>
+          </a:fontRef>
+        </p:style>
+      </p:cxnSp>
+      <p:cxnSp>
+        <p:nvCxnSpPr>
+          <p:cNvPr id="56" name="Straight Connector 55">
+            <a:extLst>
+              <a:ext uri="{FF2B5EF4-FFF2-40B4-BE49-F238E27FC236}">
+                <a16:creationId xmlns:a16="http://schemas.microsoft.com/office/drawing/2014/main" id="{87295BBC-AEF5-A84B-A1C7-CFB26462E999}"/>
+              </a:ext>
+            </a:extLst>
+          </p:cNvPr>
+          <p:cNvCxnSpPr>
+            <a:stCxn id="53" idx="3"/>
+            <a:endCxn id="54" idx="1"/>
+          </p:cNvCxnSpPr>
+          <p:nvPr/>
+        </p:nvCxnSpPr>
+        <p:spPr>
+          <a:xfrm>
+            <a:off x="6364421" y="4340587"/>
+            <a:ext cx="283307" cy="0"/>
+          </a:xfrm>
+          <a:prstGeom prst="line">
+            <a:avLst/>
+          </a:prstGeom>
+        </p:spPr>
+        <p:style>
+          <a:lnRef idx="3">
+            <a:schemeClr val="accent2"/>
+          </a:lnRef>
+          <a:fillRef idx="0">
+            <a:schemeClr val="accent2"/>
+          </a:fillRef>
+          <a:effectRef idx="2">
+            <a:schemeClr val="accent2"/>
+          </a:effectRef>
+          <a:fontRef idx="minor">
+            <a:schemeClr val="tx1"/>
+          </a:fontRef>
+        </p:style>
+      </p:cxnSp>
+      <p:sp>
+        <p:nvSpPr>
+          <p:cNvPr id="57" name="TextBox 56">
+            <a:extLst>
+              <a:ext uri="{FF2B5EF4-FFF2-40B4-BE49-F238E27FC236}">
+                <a16:creationId xmlns:a16="http://schemas.microsoft.com/office/drawing/2014/main" id="{CCDCCD55-8CB9-4042-ABA9-D2BD33390679}"/>
+              </a:ext>
+            </a:extLst>
+          </p:cNvPr>
+          <p:cNvSpPr txBox="1"/>
+          <p:nvPr/>
+        </p:nvSpPr>
+        <p:spPr>
+          <a:xfrm>
+            <a:off x="7590703" y="4155921"/>
+            <a:ext cx="659668" cy="369332"/>
+          </a:xfrm>
+          <a:prstGeom prst="rect">
+            <a:avLst/>
+          </a:prstGeom>
+          <a:noFill/>
+          <a:ln w="28575">
+            <a:solidFill>
+              <a:srgbClr val="FF0000"/>
+            </a:solidFill>
+          </a:ln>
+        </p:spPr>
+        <p:txBody>
+          <a:bodyPr wrap="none" rtlCol="0">
+            <a:spAutoFit/>
+          </a:bodyPr>
+          <a:lstStyle/>
+          <a:p>
+            <a:r>
+              <a:rPr lang="en-US" dirty="0"/>
+              <a:t>Attr3</a:t>
+            </a:r>
+          </a:p>
+        </p:txBody>
+      </p:sp>
+      <p:sp>
+        <p:nvSpPr>
+          <p:cNvPr id="58" name="TextBox 57">
+            <a:extLst>
+              <a:ext uri="{FF2B5EF4-FFF2-40B4-BE49-F238E27FC236}">
+                <a16:creationId xmlns:a16="http://schemas.microsoft.com/office/drawing/2014/main" id="{481F43BC-3D92-094B-93EC-D494532983BC}"/>
+              </a:ext>
+            </a:extLst>
+          </p:cNvPr>
+          <p:cNvSpPr txBox="1"/>
+          <p:nvPr/>
+        </p:nvSpPr>
+        <p:spPr>
+          <a:xfrm>
+            <a:off x="8535399" y="4155847"/>
+            <a:ext cx="659668" cy="369332"/>
+          </a:xfrm>
+          <a:prstGeom prst="rect">
+            <a:avLst/>
+          </a:prstGeom>
+          <a:noFill/>
+          <a:ln w="28575">
+            <a:solidFill>
+              <a:srgbClr val="FF0000"/>
+            </a:solidFill>
+          </a:ln>
+        </p:spPr>
+        <p:txBody>
+          <a:bodyPr wrap="none" rtlCol="0">
+            <a:spAutoFit/>
+          </a:bodyPr>
+          <a:lstStyle/>
+          <a:p>
+            <a:r>
+              <a:rPr lang="en-US" dirty="0"/>
+              <a:t>Attr4</a:t>
+            </a:r>
+          </a:p>
+        </p:txBody>
+      </p:sp>
+      <p:cxnSp>
+        <p:nvCxnSpPr>
+          <p:cNvPr id="60" name="Straight Connector 59">
+            <a:extLst>
+              <a:ext uri="{FF2B5EF4-FFF2-40B4-BE49-F238E27FC236}">
+                <a16:creationId xmlns:a16="http://schemas.microsoft.com/office/drawing/2014/main" id="{BAD39BA5-76E4-934A-B7C7-E4EF9F476ABA}"/>
+              </a:ext>
+            </a:extLst>
+          </p:cNvPr>
+          <p:cNvCxnSpPr>
+            <a:stCxn id="54" idx="3"/>
+            <a:endCxn id="57" idx="1"/>
+          </p:cNvCxnSpPr>
+          <p:nvPr/>
+        </p:nvCxnSpPr>
+        <p:spPr>
+          <a:xfrm>
+            <a:off x="7307396" y="4340587"/>
+            <a:ext cx="283307" cy="0"/>
+          </a:xfrm>
+          <a:prstGeom prst="line">
+            <a:avLst/>
+          </a:prstGeom>
+        </p:spPr>
+        <p:style>
+          <a:lnRef idx="3">
+            <a:schemeClr val="accent2"/>
+          </a:lnRef>
+          <a:fillRef idx="0">
+            <a:schemeClr val="accent2"/>
+          </a:fillRef>
+          <a:effectRef idx="2">
+            <a:schemeClr val="accent2"/>
+          </a:effectRef>
+          <a:fontRef idx="minor">
+            <a:schemeClr val="tx1"/>
+          </a:fontRef>
+        </p:style>
+      </p:cxnSp>
+      <p:cxnSp>
+        <p:nvCxnSpPr>
+          <p:cNvPr id="62" name="Straight Connector 61">
+            <a:extLst>
+              <a:ext uri="{FF2B5EF4-FFF2-40B4-BE49-F238E27FC236}">
+                <a16:creationId xmlns:a16="http://schemas.microsoft.com/office/drawing/2014/main" id="{CFD2E665-5478-734B-A5D9-A1890690EEB3}"/>
+              </a:ext>
+            </a:extLst>
+          </p:cNvPr>
+          <p:cNvCxnSpPr>
+            <a:stCxn id="57" idx="3"/>
+            <a:endCxn id="58" idx="1"/>
+          </p:cNvCxnSpPr>
+          <p:nvPr/>
+        </p:nvCxnSpPr>
+        <p:spPr>
+          <a:xfrm flipV="1">
+            <a:off x="8250371" y="4340513"/>
+            <a:ext cx="285028" cy="74"/>
+          </a:xfrm>
+          <a:prstGeom prst="line">
+            <a:avLst/>
+          </a:prstGeom>
+        </p:spPr>
+        <p:style>
+          <a:lnRef idx="3">
+            <a:schemeClr val="accent2"/>
+          </a:lnRef>
+          <a:fillRef idx="0">
+            <a:schemeClr val="accent2"/>
+          </a:fillRef>
+          <a:effectRef idx="2">
+            <a:schemeClr val="accent2"/>
+          </a:effectRef>
+          <a:fontRef idx="minor">
+            <a:schemeClr val="tx1"/>
+          </a:fontRef>
+        </p:style>
+      </p:cxnSp>
+    </p:spTree>
+    <p:extLst>
+      <p:ext uri="{BB962C8B-B14F-4D97-AF65-F5344CB8AC3E}">
+        <p14:creationId xmlns:p14="http://schemas.microsoft.com/office/powerpoint/2010/main" val="3036110764"/>
+      </p:ext>
+    </p:extLst>
+  </p:cSld>
+  <p:clrMapOvr>
+    <a:masterClrMapping/>
+  </p:clrMapOvr>
+</p:sld>
+</file>
+
 <file path=ppt/theme/theme1.xml><?xml version="1.0" encoding="utf-8"?>
 <a:theme xmlns:a="http://schemas.openxmlformats.org/drawingml/2006/main" name="Office Theme">
   <a:themeElements>

</xml_diff>

<commit_message>
Cleanup registration info description
Remove the reference to the pmix.org URL in the PMIx_Get description and
replace it with a reference to the PMIx_server_register_nspace function
where the required/optional information is defined along with a
statement on how to access the various provided info. Access methods are
a part of the Standard and are not implentation-specific.

Rewrite the PMIx_server_register_nspace attribute section to more
clearly delineate what is required vs optional, and to split out the
session, job, app, proc, and node-level sections.

Deprecate PMIX_PROC_DATA in favor of PMIX_PROC_INFO_ARRAY for symmetry
so it corresponds to its session, job, app, and node brethren.

Signed-off-by: Ralph Castain <rhc@pmix.org>
</commit_message>
<xml_diff>
--- a/figs/drawings.pptx
+++ b/figs/drawings.pptx
@@ -264,7 +264,7 @@
           <a:p>
             <a:fld id="{4597F392-DBDF-6842-8400-5A8310564639}" type="datetimeFigureOut">
               <a:rPr lang="en-US" smtClean="0"/>
-              <a:t>1/25/19</a:t>
+              <a:t>7/4/20</a:t>
             </a:fld>
             <a:endParaRPr lang="en-US" dirty="0"/>
           </a:p>
@@ -462,7 +462,7 @@
           <a:p>
             <a:fld id="{4597F392-DBDF-6842-8400-5A8310564639}" type="datetimeFigureOut">
               <a:rPr lang="en-US" smtClean="0"/>
-              <a:t>1/25/19</a:t>
+              <a:t>7/4/20</a:t>
             </a:fld>
             <a:endParaRPr lang="en-US" dirty="0"/>
           </a:p>
@@ -670,7 +670,7 @@
           <a:p>
             <a:fld id="{4597F392-DBDF-6842-8400-5A8310564639}" type="datetimeFigureOut">
               <a:rPr lang="en-US" smtClean="0"/>
-              <a:t>1/25/19</a:t>
+              <a:t>7/4/20</a:t>
             </a:fld>
             <a:endParaRPr lang="en-US" dirty="0"/>
           </a:p>
@@ -868,7 +868,7 @@
           <a:p>
             <a:fld id="{4597F392-DBDF-6842-8400-5A8310564639}" type="datetimeFigureOut">
               <a:rPr lang="en-US" smtClean="0"/>
-              <a:t>1/25/19</a:t>
+              <a:t>7/4/20</a:t>
             </a:fld>
             <a:endParaRPr lang="en-US" dirty="0"/>
           </a:p>
@@ -1143,7 +1143,7 @@
           <a:p>
             <a:fld id="{4597F392-DBDF-6842-8400-5A8310564639}" type="datetimeFigureOut">
               <a:rPr lang="en-US" smtClean="0"/>
-              <a:t>1/25/19</a:t>
+              <a:t>7/4/20</a:t>
             </a:fld>
             <a:endParaRPr lang="en-US" dirty="0"/>
           </a:p>
@@ -1408,7 +1408,7 @@
           <a:p>
             <a:fld id="{4597F392-DBDF-6842-8400-5A8310564639}" type="datetimeFigureOut">
               <a:rPr lang="en-US" smtClean="0"/>
-              <a:t>1/25/19</a:t>
+              <a:t>7/4/20</a:t>
             </a:fld>
             <a:endParaRPr lang="en-US" dirty="0"/>
           </a:p>
@@ -1820,7 +1820,7 @@
           <a:p>
             <a:fld id="{4597F392-DBDF-6842-8400-5A8310564639}" type="datetimeFigureOut">
               <a:rPr lang="en-US" smtClean="0"/>
-              <a:t>1/25/19</a:t>
+              <a:t>7/4/20</a:t>
             </a:fld>
             <a:endParaRPr lang="en-US" dirty="0"/>
           </a:p>
@@ -1961,7 +1961,7 @@
           <a:p>
             <a:fld id="{4597F392-DBDF-6842-8400-5A8310564639}" type="datetimeFigureOut">
               <a:rPr lang="en-US" smtClean="0"/>
-              <a:t>1/25/19</a:t>
+              <a:t>7/4/20</a:t>
             </a:fld>
             <a:endParaRPr lang="en-US" dirty="0"/>
           </a:p>
@@ -2074,7 +2074,7 @@
           <a:p>
             <a:fld id="{4597F392-DBDF-6842-8400-5A8310564639}" type="datetimeFigureOut">
               <a:rPr lang="en-US" smtClean="0"/>
-              <a:t>1/25/19</a:t>
+              <a:t>7/4/20</a:t>
             </a:fld>
             <a:endParaRPr lang="en-US" dirty="0"/>
           </a:p>
@@ -2385,7 +2385,7 @@
           <a:p>
             <a:fld id="{4597F392-DBDF-6842-8400-5A8310564639}" type="datetimeFigureOut">
               <a:rPr lang="en-US" smtClean="0"/>
-              <a:t>1/25/19</a:t>
+              <a:t>7/4/20</a:t>
             </a:fld>
             <a:endParaRPr lang="en-US" dirty="0"/>
           </a:p>
@@ -2673,7 +2673,7 @@
           <a:p>
             <a:fld id="{4597F392-DBDF-6842-8400-5A8310564639}" type="datetimeFigureOut">
               <a:rPr lang="en-US" smtClean="0"/>
-              <a:t>1/25/19</a:t>
+              <a:t>7/4/20</a:t>
             </a:fld>
             <a:endParaRPr lang="en-US" dirty="0"/>
           </a:p>
@@ -2914,7 +2914,7 @@
           <a:p>
             <a:fld id="{4597F392-DBDF-6842-8400-5A8310564639}" type="datetimeFigureOut">
               <a:rPr lang="en-US" smtClean="0"/>
-              <a:t>1/25/19</a:t>
+              <a:t>7/4/20</a:t>
             </a:fld>
             <a:endParaRPr lang="en-US" dirty="0"/>
           </a:p>
@@ -4812,7 +4812,7 @@
             <a:pPr algn="ctr"/>
             <a:r>
               <a:rPr lang="en-US" dirty="0"/>
-              <a:t>data</a:t>
+              <a:t>info</a:t>
             </a:r>
           </a:p>
         </p:txBody>
@@ -5163,7 +5163,7 @@
             <a:pPr algn="ctr"/>
             <a:r>
               <a:rPr lang="en-US" dirty="0"/>
-              <a:t>data</a:t>
+              <a:t>info</a:t>
             </a:r>
           </a:p>
         </p:txBody>
@@ -6881,10 +6881,10 @@
       </p:grpSpPr>
       <p:pic>
         <p:nvPicPr>
-          <p:cNvPr id="4" name="Picture 3">
-            <a:extLst>
-              <a:ext uri="{FF2B5EF4-FFF2-40B4-BE49-F238E27FC236}">
-                <a16:creationId xmlns:a16="http://schemas.microsoft.com/office/drawing/2014/main" id="{5110F769-AD01-CB40-8BE9-C3CE95591BD8}"/>
+          <p:cNvPr id="2" name="Picture 1">
+            <a:extLst>
+              <a:ext uri="{FF2B5EF4-FFF2-40B4-BE49-F238E27FC236}">
+                <a16:creationId xmlns:a16="http://schemas.microsoft.com/office/drawing/2014/main" id="{E9B78EEE-2DEF-6444-87E4-C677C83B80B4}"/>
               </a:ext>
             </a:extLst>
           </p:cNvPr>
@@ -6901,8 +6901,8 @@
         </p:blipFill>
         <p:spPr>
           <a:xfrm>
-            <a:off x="2165350" y="450850"/>
-            <a:ext cx="7861300" cy="5956300"/>
+            <a:off x="1911714" y="118267"/>
+            <a:ext cx="8662253" cy="6621466"/>
           </a:xfrm>
           <a:prstGeom prst="rect">
             <a:avLst/>
@@ -6941,10 +6941,10 @@
       </p:grpSpPr>
       <p:pic>
         <p:nvPicPr>
-          <p:cNvPr id="3" name="Picture 2">
-            <a:extLst>
-              <a:ext uri="{FF2B5EF4-FFF2-40B4-BE49-F238E27FC236}">
-                <a16:creationId xmlns:a16="http://schemas.microsoft.com/office/drawing/2014/main" id="{32F6E2A8-036B-1543-8D46-C06D7943EFB3}"/>
+          <p:cNvPr id="2" name="Picture 1">
+            <a:extLst>
+              <a:ext uri="{FF2B5EF4-FFF2-40B4-BE49-F238E27FC236}">
+                <a16:creationId xmlns:a16="http://schemas.microsoft.com/office/drawing/2014/main" id="{2387BF6A-4ADC-B14B-9915-541F1A929C59}"/>
               </a:ext>
             </a:extLst>
           </p:cNvPr>
@@ -6961,8 +6961,8 @@
         </p:blipFill>
         <p:spPr>
           <a:xfrm>
-            <a:off x="2705100" y="450850"/>
-            <a:ext cx="6781800" cy="5956300"/>
+            <a:off x="2599664" y="430725"/>
+            <a:ext cx="6709706" cy="5996549"/>
           </a:xfrm>
           <a:prstGeom prst="rect">
             <a:avLst/>

</xml_diff>